<commit_message>
Doc finale + présentation finale Aurélien
</commit_message>
<xml_diff>
--- a/documents/v2.0/Presentation.pptx
+++ b/documents/v2.0/Presentation.pptx
@@ -234,7 +234,7 @@
             <a:fld id="{D761A794-15E8-4C19-9429-90557F78B1C8}" type="datetimeFigureOut">
               <a:rPr lang="fr-FR" smtClean="0"/>
               <a:pPr/>
-              <a:t>10/06/2010</a:t>
+              <a:t>11/06/2010</a:t>
             </a:fld>
             <a:endParaRPr lang="fr-CH" dirty="0"/>
           </a:p>
@@ -796,7 +796,7 @@
             <a:fld id="{1FD82F67-3604-455A-AA94-463E3F4A9835}" type="datetime1">
               <a:rPr lang="fr-CH" smtClean="0"/>
               <a:pPr/>
-              <a:t>10.06.2010</a:t>
+              <a:t>11.06.2010</a:t>
             </a:fld>
             <a:endParaRPr lang="fr-FR" dirty="0"/>
           </a:p>
@@ -982,7 +982,7 @@
             <a:fld id="{55B3CD59-5DD5-41C3-B883-761C206A7252}" type="datetime1">
               <a:rPr lang="fr-CH" smtClean="0"/>
               <a:pPr/>
-              <a:t>10.06.2010</a:t>
+              <a:t>11.06.2010</a:t>
             </a:fld>
             <a:endParaRPr lang="fr-FR" dirty="0"/>
           </a:p>
@@ -1178,7 +1178,7 @@
             <a:fld id="{3B04A12F-0005-45B2-8940-F8EFEAD0E451}" type="datetime1">
               <a:rPr lang="fr-CH" smtClean="0"/>
               <a:pPr/>
-              <a:t>10.06.2010</a:t>
+              <a:t>11.06.2010</a:t>
             </a:fld>
             <a:endParaRPr lang="fr-FR" dirty="0"/>
           </a:p>
@@ -1493,7 +1493,7 @@
             <a:fld id="{529FBE9A-CF7D-433F-8346-C0E52BDADA61}" type="datetime1">
               <a:rPr lang="fr-CH" smtClean="0"/>
               <a:pPr/>
-              <a:t>10.06.2010</a:t>
+              <a:t>11.06.2010</a:t>
             </a:fld>
             <a:endParaRPr lang="fr-FR" dirty="0"/>
           </a:p>
@@ -1676,7 +1676,7 @@
             <a:fld id="{FE683641-4180-4030-9871-18F1FE65C087}" type="datetime1">
               <a:rPr lang="fr-CH" smtClean="0"/>
               <a:pPr/>
-              <a:t>10.06.2010</a:t>
+              <a:t>11.06.2010</a:t>
             </a:fld>
             <a:endParaRPr lang="fr-FR" dirty="0"/>
           </a:p>
@@ -1872,7 +1872,7 @@
             <a:fld id="{DE3EECC3-BAC3-4A29-8636-7743FF9A3806}" type="datetime1">
               <a:rPr lang="fr-CH" smtClean="0"/>
               <a:pPr/>
-              <a:t>10.06.2010</a:t>
+              <a:t>11.06.2010</a:t>
             </a:fld>
             <a:endParaRPr lang="fr-FR" dirty="0"/>
           </a:p>
@@ -2080,7 +2080,7 @@
             <a:fld id="{F154968F-2762-4F3B-BC70-F7C39B89A9B8}" type="datetime1">
               <a:rPr lang="fr-CH" smtClean="0"/>
               <a:pPr/>
-              <a:t>10.06.2010</a:t>
+              <a:t>11.06.2010</a:t>
             </a:fld>
             <a:endParaRPr lang="fr-FR" dirty="0"/>
           </a:p>
@@ -2384,7 +2384,7 @@
             <a:fld id="{05BFEB41-E5CB-4CD1-9B55-92701C8EBC84}" type="datetime1">
               <a:rPr lang="fr-CH" smtClean="0"/>
               <a:pPr/>
-              <a:t>10.06.2010</a:t>
+              <a:t>11.06.2010</a:t>
             </a:fld>
             <a:endParaRPr lang="fr-FR" dirty="0"/>
           </a:p>
@@ -2822,7 +2822,7 @@
             <a:fld id="{2F6C9831-039A-4F5C-8AD2-A3AB876185B4}" type="datetime1">
               <a:rPr lang="fr-CH" smtClean="0"/>
               <a:pPr/>
-              <a:t>10.06.2010</a:t>
+              <a:t>11.06.2010</a:t>
             </a:fld>
             <a:endParaRPr lang="fr-FR" dirty="0"/>
           </a:p>
@@ -2956,7 +2956,7 @@
             <a:fld id="{DFFDC1B0-BD04-46D2-99EE-B853352D89B2}" type="datetime1">
               <a:rPr lang="fr-CH" smtClean="0"/>
               <a:pPr/>
-              <a:t>10.06.2010</a:t>
+              <a:t>11.06.2010</a:t>
             </a:fld>
             <a:endParaRPr lang="fr-FR" dirty="0"/>
           </a:p>
@@ -3067,7 +3067,7 @@
             <a:fld id="{0EE68050-7145-4A91-894E-A242682B636F}" type="datetime1">
               <a:rPr lang="fr-CH" smtClean="0"/>
               <a:pPr/>
-              <a:t>10.06.2010</a:t>
+              <a:t>11.06.2010</a:t>
             </a:fld>
             <a:endParaRPr lang="fr-FR" dirty="0"/>
           </a:p>
@@ -3360,7 +3360,7 @@
             <a:fld id="{3A01947D-F275-402E-B528-25DF2F067B3A}" type="datetime1">
               <a:rPr lang="fr-CH" smtClean="0"/>
               <a:pPr/>
-              <a:t>10.06.2010</a:t>
+              <a:t>11.06.2010</a:t>
             </a:fld>
             <a:endParaRPr lang="fr-FR" dirty="0"/>
           </a:p>
@@ -3629,7 +3629,7 @@
             <a:fld id="{99628070-4574-4C78-8FCC-ABF8CA883542}" type="datetime1">
               <a:rPr lang="fr-CH" smtClean="0"/>
               <a:pPr/>
-              <a:t>10.06.2010</a:t>
+              <a:t>11.06.2010</a:t>
             </a:fld>
             <a:endParaRPr lang="fr-FR" dirty="0"/>
           </a:p>
@@ -3882,7 +3882,7 @@
             <a:fld id="{0EBF62BA-94E3-4FC8-A8F1-27E713C8C858}" type="datetime1">
               <a:rPr lang="fr-CH" smtClean="0"/>
               <a:pPr/>
-              <a:t>10.06.2010</a:t>
+              <a:t>11.06.2010</a:t>
             </a:fld>
             <a:endParaRPr lang="fr-FR" dirty="0"/>
           </a:p>
@@ -4714,13 +4714,7 @@
               <a:rPr lang="fr-CH" sz="1400" b="1" u="none" dirty="0" smtClean="0">
                 <a:latin typeface="Trebuchet MS" pitchFamily="34" charset="0"/>
               </a:rPr>
-              <a:t>Pierre </a:t>
-            </a:r>
-            <a:r>
-              <a:rPr lang="fr-CH" sz="1400" b="1" u="none" dirty="0" smtClean="0">
-                <a:latin typeface="Trebuchet MS" pitchFamily="34" charset="0"/>
-              </a:rPr>
-              <a:t>-Dominique Putallaz</a:t>
+              <a:t>Pierre -Dominique Putallaz</a:t>
             </a:r>
           </a:p>
           <a:p>
@@ -4762,17 +4756,8 @@
               <a:rPr lang="fr-CH" sz="1400" b="1" u="none" dirty="0" smtClean="0">
                 <a:latin typeface="Trebuchet MS" pitchFamily="34" charset="0"/>
               </a:rPr>
-              <a:t>Aurélien Da </a:t>
-            </a:r>
-            <a:r>
-              <a:rPr lang="fr-CH" sz="1400" b="1" u="none" dirty="0" smtClean="0">
-                <a:latin typeface="Trebuchet MS" pitchFamily="34" charset="0"/>
-              </a:rPr>
-              <a:t>Campo</a:t>
-            </a:r>
-            <a:endParaRPr lang="fr-CH" sz="1400" b="1" u="none" dirty="0" smtClean="0">
-              <a:latin typeface="Trebuchet MS" pitchFamily="34" charset="0"/>
-            </a:endParaRPr>
+              <a:t>Aurélien Da Campo</a:t>
+            </a:r>
           </a:p>
         </p:txBody>
       </p:sp>
@@ -5097,7 +5082,7 @@
                 </a:solidFill>
               </a:rPr>
               <a:pPr/>
-              <a:t>10.06.2010</a:t>
+              <a:t>11.06.2010</a:t>
             </a:fld>
             <a:endParaRPr lang="fr-FR">
               <a:solidFill>
@@ -5199,18 +5184,7 @@
                   </a:schemeClr>
                 </a:solidFill>
               </a:rPr>
-              <a:t>ADO </a:t>
-            </a:r>
-            <a:r>
-              <a:rPr lang="fr-FR" dirty="0" smtClean="0">
-                <a:solidFill>
-                  <a:schemeClr val="tx1">
-                    <a:lumMod val="65000"/>
-                    <a:lumOff val="35000"/>
-                  </a:schemeClr>
-                </a:solidFill>
-              </a:rPr>
-              <a:t>– PPZ – LFH – RPN</a:t>
+              <a:t>ADO – PPZ – LFH – RPN</a:t>
             </a:r>
           </a:p>
         </p:txBody>
@@ -5634,7 +5608,7 @@
                 </a:solidFill>
               </a:rPr>
               <a:pPr/>
-              <a:t>10.06.2010</a:t>
+              <a:t>11.06.2010</a:t>
             </a:fld>
             <a:endParaRPr lang="fr-FR" dirty="0">
               <a:solidFill>
@@ -7223,7 +7197,7 @@
                 </a:solidFill>
               </a:rPr>
               <a:pPr/>
-              <a:t>10.06.2010</a:t>
+              <a:t>11.06.2010</a:t>
             </a:fld>
             <a:endParaRPr lang="fr-FR" dirty="0">
               <a:solidFill>
@@ -7669,7 +7643,7 @@
                 </a:solidFill>
               </a:rPr>
               <a:pPr/>
-              <a:t>10.06.2010</a:t>
+              <a:t>11.06.2010</a:t>
             </a:fld>
             <a:endParaRPr lang="fr-FR" dirty="0">
               <a:solidFill>
@@ -7768,9 +7742,6 @@
               </a:rPr>
               <a:t>Architecture</a:t>
             </a:r>
-            <a:endParaRPr lang="fr-FR" u="none" dirty="0" smtClean="0">
-              <a:latin typeface="Trebuchet MS" pitchFamily="34" charset="0"/>
-            </a:endParaRPr>
           </a:p>
           <a:p>
             <a:pPr marL="342900" indent="-342900">
@@ -7799,9 +7770,6 @@
               </a:rPr>
               <a:t>Client / Serveur</a:t>
             </a:r>
-            <a:endParaRPr lang="fr-FR" u="none" dirty="0" smtClean="0">
-              <a:latin typeface="Trebuchet MS" pitchFamily="34" charset="0"/>
-            </a:endParaRPr>
           </a:p>
           <a:p>
             <a:pPr marL="342900" indent="-342900">
@@ -7831,9 +7799,6 @@
               </a:rPr>
               <a:t>Conclusion</a:t>
             </a:r>
-            <a:endParaRPr lang="fr-FR" u="none" dirty="0" smtClean="0">
-              <a:latin typeface="Trebuchet MS" pitchFamily="34" charset="0"/>
-            </a:endParaRPr>
           </a:p>
           <a:p>
             <a:pPr marL="342900" indent="-342900">
@@ -7906,18 +7871,7 @@
                   </a:schemeClr>
                 </a:solidFill>
               </a:rPr>
-              <a:t>ADO </a:t>
-            </a:r>
-            <a:r>
-              <a:rPr lang="fr-FR" dirty="0" smtClean="0">
-                <a:solidFill>
-                  <a:schemeClr val="tx1">
-                    <a:lumMod val="65000"/>
-                    <a:lumOff val="35000"/>
-                  </a:schemeClr>
-                </a:solidFill>
-              </a:rPr>
-              <a:t>– PPZ – LFH – RPN</a:t>
+              <a:t>ADO – PPZ – LFH – RPN</a:t>
             </a:r>
           </a:p>
         </p:txBody>
@@ -8316,7 +8270,7 @@
                 </a:solidFill>
               </a:rPr>
               <a:pPr/>
-              <a:t>10.06.2010</a:t>
+              <a:t>11.06.2010</a:t>
             </a:fld>
             <a:endParaRPr lang="fr-FR" dirty="0">
               <a:solidFill>
@@ -8358,18 +8312,7 @@
                   </a:schemeClr>
                 </a:solidFill>
               </a:rPr>
-              <a:t>ADO </a:t>
-            </a:r>
-            <a:r>
-              <a:rPr lang="fr-FR" dirty="0" smtClean="0">
-                <a:solidFill>
-                  <a:schemeClr val="tx1">
-                    <a:lumMod val="65000"/>
-                    <a:lumOff val="35000"/>
-                  </a:schemeClr>
-                </a:solidFill>
-              </a:rPr>
-              <a:t>– PPZ – LFH – RPN</a:t>
+              <a:t>ADO – PPZ – LFH – RPN</a:t>
             </a:r>
           </a:p>
         </p:txBody>
@@ -8437,11 +8380,7 @@
             </a:pPr>
             <a:r>
               <a:rPr lang="es-ES" u="none" dirty="0" smtClean="0"/>
-              <a:t>Pierre </a:t>
-            </a:r>
-            <a:r>
-              <a:rPr lang="es-ES" u="none" dirty="0" smtClean="0"/>
-              <a:t>-Dominique </a:t>
+              <a:t>Pierre -Dominique </a:t>
             </a:r>
             <a:r>
               <a:rPr lang="es-ES" u="none" dirty="0" err="1" smtClean="0"/>
@@ -8501,15 +8440,7 @@
             </a:r>
             <a:r>
               <a:rPr lang="es-ES" u="none" dirty="0" smtClean="0"/>
-              <a:t> Da </a:t>
-            </a:r>
-            <a:r>
-              <a:rPr lang="es-ES" u="none" dirty="0" smtClean="0"/>
-              <a:t>Campo </a:t>
-            </a:r>
-            <a:r>
-              <a:rPr lang="es-ES" u="none" dirty="0" smtClean="0"/>
-              <a:t>(Chef de </a:t>
+              <a:t> Da Campo (Chef de </a:t>
             </a:r>
             <a:r>
               <a:rPr lang="es-ES" u="none" dirty="0" err="1" smtClean="0"/>
@@ -9033,7 +8964,7 @@
                 </a:solidFill>
               </a:rPr>
               <a:pPr/>
-              <a:t>10.06.2010</a:t>
+              <a:t>11.06.2010</a:t>
             </a:fld>
             <a:endParaRPr lang="fr-FR" dirty="0">
               <a:solidFill>
@@ -9075,18 +9006,7 @@
                   </a:schemeClr>
                 </a:solidFill>
               </a:rPr>
-              <a:t>ADO </a:t>
-            </a:r>
-            <a:r>
-              <a:rPr lang="fr-FR" dirty="0" smtClean="0">
-                <a:solidFill>
-                  <a:schemeClr val="tx1">
-                    <a:lumMod val="65000"/>
-                    <a:lumOff val="35000"/>
-                  </a:schemeClr>
-                </a:solidFill>
-              </a:rPr>
-              <a:t>– PPZ – LFH – RPN</a:t>
+              <a:t>ADO – PPZ – LFH – RPN</a:t>
             </a:r>
           </a:p>
         </p:txBody>
@@ -11508,32 +11428,6 @@
           </a:p>
         </p:txBody>
       </p:sp>
-      <p:pic>
-        <p:nvPicPr>
-          <p:cNvPr id="1025" name="Image 61" descr="araignee.png"/>
-          <p:cNvPicPr>
-            <a:picLocks noChangeAspect="1" noChangeArrowheads="1"/>
-          </p:cNvPicPr>
-          <p:nvPr/>
-        </p:nvPicPr>
-        <p:blipFill>
-          <a:blip r:embed="rId3" cstate="print"/>
-          <a:srcRect/>
-          <a:stretch>
-            <a:fillRect/>
-          </a:stretch>
-        </p:blipFill>
-        <p:spPr bwMode="auto">
-          <a:xfrm>
-            <a:off x="0" y="0"/>
-            <a:ext cx="142875" cy="142875"/>
-          </a:xfrm>
-          <a:prstGeom prst="rect">
-            <a:avLst/>
-          </a:prstGeom>
-          <a:noFill/>
-        </p:spPr>
-      </p:pic>
     </p:spTree>
   </p:cSld>
   <p:clrMapOvr>
@@ -11846,7 +11740,7 @@
                 </a:solidFill>
               </a:rPr>
               <a:pPr/>
-              <a:t>10.06.2010</a:t>
+              <a:t>11.06.2010</a:t>
             </a:fld>
             <a:endParaRPr lang="fr-FR">
               <a:solidFill>
@@ -11930,18 +11824,7 @@
                   </a:schemeClr>
                 </a:solidFill>
               </a:rPr>
-              <a:t>ADO </a:t>
-            </a:r>
-            <a:r>
-              <a:rPr lang="fr-FR" dirty="0" smtClean="0">
-                <a:solidFill>
-                  <a:schemeClr val="tx1">
-                    <a:lumMod val="65000"/>
-                    <a:lumOff val="35000"/>
-                  </a:schemeClr>
-                </a:solidFill>
-              </a:rPr>
-              <a:t>– PPZ – LFH – RPN</a:t>
+              <a:t>ADO – PPZ – LFH – RPN</a:t>
             </a:r>
           </a:p>
         </p:txBody>
@@ -12258,7 +12141,7 @@
                 </a:solidFill>
               </a:rPr>
               <a:pPr/>
-              <a:t>10.06.2010</a:t>
+              <a:t>11.06.2010</a:t>
             </a:fld>
             <a:endParaRPr lang="fr-FR" dirty="0">
               <a:solidFill>
@@ -12300,18 +12183,191 @@
                   </a:schemeClr>
                 </a:solidFill>
               </a:rPr>
-              <a:t>ADO </a:t>
-            </a:r>
-            <a:r>
-              <a:rPr lang="fr-FR" dirty="0" smtClean="0">
-                <a:solidFill>
-                  <a:schemeClr val="tx1">
-                    <a:lumMod val="65000"/>
-                    <a:lumOff val="35000"/>
-                  </a:schemeClr>
-                </a:solidFill>
-              </a:rPr>
-              <a:t>– PPZ – LFH – RPN</a:t>
+              <a:t>ADO – PPZ – LFH – RPN</a:t>
+            </a:r>
+          </a:p>
+        </p:txBody>
+      </p:sp>
+      <p:sp>
+        <p:nvSpPr>
+          <p:cNvPr id="10" name="ZoneTexte 9"/>
+          <p:cNvSpPr txBox="1"/>
+          <p:nvPr/>
+        </p:nvSpPr>
+        <p:spPr>
+          <a:xfrm>
+            <a:off x="431856" y="1603350"/>
+            <a:ext cx="8229600" cy="3970318"/>
+          </a:xfrm>
+          <a:prstGeom prst="rect">
+            <a:avLst/>
+          </a:prstGeom>
+          <a:noFill/>
+        </p:spPr>
+        <p:txBody>
+          <a:bodyPr wrap="square" rtlCol="0">
+            <a:spAutoFit/>
+          </a:bodyPr>
+          <a:lstStyle/>
+          <a:p>
+            <a:r>
+              <a:rPr lang="fr-FR" b="1" u="none" dirty="0" smtClean="0"/>
+              <a:t>Itération 1 – Serveur d’enregistrement + Interface graphique</a:t>
+            </a:r>
+          </a:p>
+          <a:p>
+            <a:r>
+              <a:rPr lang="fr-FR" u="none" dirty="0" smtClean="0"/>
+              <a:t>Durée : </a:t>
+            </a:r>
+            <a:r>
+              <a:rPr lang="fr-FR" u="none" dirty="0" smtClean="0"/>
+              <a:t>1 semaine </a:t>
+            </a:r>
+            <a:r>
+              <a:rPr lang="fr-FR" u="none" dirty="0" smtClean="0"/>
+              <a:t>(32 </a:t>
+            </a:r>
+            <a:r>
+              <a:rPr lang="fr-FR" u="none" dirty="0" smtClean="0"/>
+              <a:t>heures</a:t>
+            </a:r>
+            <a:r>
+              <a:rPr lang="fr-FR" u="none" dirty="0" smtClean="0"/>
+              <a:t>)</a:t>
+            </a:r>
+          </a:p>
+          <a:p>
+            <a:endParaRPr lang="fr-FR" u="none" dirty="0" smtClean="0"/>
+          </a:p>
+          <a:p>
+            <a:r>
+              <a:rPr lang="fr-FR" b="1" u="none" dirty="0" smtClean="0"/>
+              <a:t>Itération 2 – Serveur de Jeu + </a:t>
+            </a:r>
+            <a:r>
+              <a:rPr lang="fr-FR" b="1" u="none" dirty="0" smtClean="0"/>
+              <a:t>Architecture</a:t>
+            </a:r>
+          </a:p>
+          <a:p>
+            <a:r>
+              <a:rPr lang="fr-FR" u="none" dirty="0" smtClean="0"/>
+              <a:t>Durée </a:t>
+            </a:r>
+            <a:r>
+              <a:rPr lang="fr-FR" u="none" dirty="0" smtClean="0"/>
+              <a:t>: </a:t>
+            </a:r>
+            <a:r>
+              <a:rPr lang="fr-FR" u="none" dirty="0" smtClean="0"/>
+              <a:t>1 semaine (40 heures)</a:t>
+            </a:r>
+            <a:endParaRPr lang="fr-FR" u="none" dirty="0" smtClean="0"/>
+          </a:p>
+          <a:p>
+            <a:endParaRPr lang="fr-FR" u="none" dirty="0" smtClean="0"/>
+          </a:p>
+          <a:p>
+            <a:r>
+              <a:rPr lang="fr-FR" b="1" u="none" dirty="0" smtClean="0"/>
+              <a:t>Itération 3 </a:t>
+            </a:r>
+            <a:r>
+              <a:rPr lang="fr-FR" b="1" u="none" dirty="0" smtClean="0"/>
+              <a:t>– Intégration </a:t>
+            </a:r>
+            <a:r>
+              <a:rPr lang="fr-FR" b="1" u="none" dirty="0" smtClean="0"/>
+              <a:t>du serveur de jeu + Interface du Jeu en </a:t>
+            </a:r>
+            <a:r>
+              <a:rPr lang="fr-FR" b="1" u="none" dirty="0" smtClean="0"/>
+              <a:t>réseau</a:t>
+            </a:r>
+          </a:p>
+          <a:p>
+            <a:r>
+              <a:rPr lang="fr-FR" u="none" dirty="0" smtClean="0"/>
+              <a:t>Durée : 2 semaines (</a:t>
+            </a:r>
+            <a:r>
+              <a:rPr lang="fr-FR" u="none" dirty="0" smtClean="0"/>
+              <a:t>96</a:t>
+            </a:r>
+            <a:r>
+              <a:rPr lang="fr-FR" u="none" dirty="0" smtClean="0"/>
+              <a:t> heures)</a:t>
+            </a:r>
+          </a:p>
+          <a:p>
+            <a:endParaRPr lang="fr-FR" u="none" dirty="0" smtClean="0"/>
+          </a:p>
+          <a:p>
+            <a:r>
+              <a:rPr lang="fr-FR" b="1" u="none" dirty="0" smtClean="0"/>
+              <a:t>Itération 4 – Lifting de la GUI + Game Design +  Amélioration Mode </a:t>
+            </a:r>
+            <a:r>
+              <a:rPr lang="fr-FR" b="1" u="none" dirty="0" smtClean="0"/>
+              <a:t>Solo</a:t>
+            </a:r>
+          </a:p>
+          <a:p>
+            <a:r>
+              <a:rPr lang="fr-FR" u="none" dirty="0" smtClean="0"/>
+              <a:t>Durée : 1 </a:t>
+            </a:r>
+            <a:r>
+              <a:rPr lang="fr-FR" u="none" dirty="0" smtClean="0"/>
+              <a:t>semaine </a:t>
+            </a:r>
+            <a:r>
+              <a:rPr lang="fr-FR" u="none" dirty="0" smtClean="0"/>
+              <a:t>(</a:t>
+            </a:r>
+            <a:r>
+              <a:rPr lang="fr-FR" u="none" dirty="0" smtClean="0"/>
+              <a:t>40 heures</a:t>
+            </a:r>
+            <a:r>
+              <a:rPr lang="fr-FR" u="none" dirty="0" smtClean="0"/>
+              <a:t>)</a:t>
+            </a:r>
+          </a:p>
+          <a:p>
+            <a:endParaRPr lang="fr-FR" u="none" dirty="0" smtClean="0"/>
+          </a:p>
+          <a:p>
+            <a:r>
+              <a:rPr lang="fr-FR" b="1" u="none" dirty="0" smtClean="0"/>
+              <a:t>Itération 5 – Serveur Web (facultatif</a:t>
+            </a:r>
+            <a:r>
+              <a:rPr lang="fr-FR" b="1" u="none" dirty="0" smtClean="0"/>
+              <a:t>)</a:t>
+            </a:r>
+          </a:p>
+          <a:p>
+            <a:r>
+              <a:rPr lang="fr-FR" u="none" dirty="0" smtClean="0"/>
+              <a:t>Durée : </a:t>
+            </a:r>
+            <a:r>
+              <a:rPr lang="fr-FR" u="none" dirty="0" smtClean="0"/>
+              <a:t>moins d’une </a:t>
+            </a:r>
+            <a:r>
+              <a:rPr lang="fr-FR" u="none" dirty="0" smtClean="0"/>
+              <a:t>semaine (</a:t>
+            </a:r>
+            <a:r>
+              <a:rPr lang="fr-FR" u="none" dirty="0" smtClean="0"/>
+              <a:t>24 heures</a:t>
+            </a:r>
+            <a:r>
+              <a:rPr lang="fr-FR" u="none" dirty="0" smtClean="0"/>
+              <a:t>) </a:t>
             </a:r>
           </a:p>
         </p:txBody>
@@ -12568,7 +12624,7 @@
                 </a:solidFill>
               </a:rPr>
               <a:pPr/>
-              <a:t>10.06.2010</a:t>
+              <a:t>11.06.2010</a:t>
             </a:fld>
             <a:endParaRPr lang="fr-FR">
               <a:solidFill>
@@ -12670,52 +12726,43 @@
                   </a:schemeClr>
                 </a:solidFill>
               </a:rPr>
-              <a:t>ADO </a:t>
-            </a:r>
-            <a:r>
-              <a:rPr lang="fr-FR" dirty="0" smtClean="0">
-                <a:solidFill>
-                  <a:schemeClr val="tx1">
-                    <a:lumMod val="65000"/>
-                    <a:lumOff val="35000"/>
-                  </a:schemeClr>
-                </a:solidFill>
-              </a:rPr>
-              <a:t>– PPZ – LFH – RPN</a:t>
-            </a:r>
-          </a:p>
-        </p:txBody>
-      </p:sp>
-      <p:sp>
-        <p:nvSpPr>
-          <p:cNvPr id="16" name="ZoneTexte 15"/>
-          <p:cNvSpPr txBox="1"/>
+              <a:t>ADO – PPZ – LFH – RPN</a:t>
+            </a:r>
+          </a:p>
+        </p:txBody>
+      </p:sp>
+      <p:pic>
+        <p:nvPicPr>
+          <p:cNvPr id="1026" name="Picture 2"/>
+          <p:cNvPicPr>
+            <a:picLocks noChangeAspect="1" noChangeArrowheads="1"/>
+          </p:cNvPicPr>
           <p:nvPr/>
-        </p:nvSpPr>
-        <p:spPr>
-          <a:xfrm>
-            <a:off x="738135" y="1931967"/>
-            <a:ext cx="7948665" cy="369332"/>
+        </p:nvPicPr>
+        <p:blipFill>
+          <a:blip r:embed="rId2" cstate="print"/>
+          <a:srcRect/>
+          <a:stretch>
+            <a:fillRect/>
+          </a:stretch>
+        </p:blipFill>
+        <p:spPr bwMode="auto">
+          <a:xfrm>
+            <a:off x="2276475" y="1712889"/>
+            <a:ext cx="4591050" cy="4038600"/>
           </a:xfrm>
           <a:prstGeom prst="rect">
             <a:avLst/>
           </a:prstGeom>
           <a:noFill/>
-        </p:spPr>
-        <p:txBody>
-          <a:bodyPr wrap="square" rtlCol="0">
-            <a:spAutoFit/>
-          </a:bodyPr>
-          <a:lstStyle/>
-          <a:p>
-            <a:r>
-              <a:rPr lang="fr-CH" u="none" dirty="0" smtClean="0"/>
-              <a:t>Aurélien</a:t>
-            </a:r>
-            <a:endParaRPr lang="fr-CH" u="none" dirty="0"/>
-          </a:p>
-        </p:txBody>
-      </p:sp>
+          <a:ln w="9525">
+            <a:noFill/>
+            <a:miter lim="800000"/>
+            <a:headEnd/>
+            <a:tailEnd/>
+          </a:ln>
+        </p:spPr>
+      </p:pic>
     </p:spTree>
   </p:cSld>
   <p:clrMapOvr>
@@ -12968,7 +13015,7 @@
                 </a:solidFill>
               </a:rPr>
               <a:pPr/>
-              <a:t>10.06.2010</a:t>
+              <a:t>11.06.2010</a:t>
             </a:fld>
             <a:endParaRPr lang="fr-FR" dirty="0">
               <a:solidFill>
@@ -13070,18 +13117,7 @@
                   </a:schemeClr>
                 </a:solidFill>
               </a:rPr>
-              <a:t>ADO </a:t>
-            </a:r>
-            <a:r>
-              <a:rPr lang="fr-FR" dirty="0" smtClean="0">
-                <a:solidFill>
-                  <a:schemeClr val="tx1">
-                    <a:lumMod val="65000"/>
-                    <a:lumOff val="35000"/>
-                  </a:schemeClr>
-                </a:solidFill>
-              </a:rPr>
-              <a:t>– PPZ – LFH – RPN</a:t>
+              <a:t>ADO – PPZ – LFH – RPN</a:t>
             </a:r>
           </a:p>
         </p:txBody>
@@ -13194,7 +13230,7 @@
                 </a:solidFill>
               </a:rPr>
               <a:pPr/>
-              <a:t>10.06.2010</a:t>
+              <a:t>11.06.2010</a:t>
             </a:fld>
             <a:endParaRPr lang="fr-FR" dirty="0">
               <a:solidFill>
@@ -13518,18 +13554,7 @@
                   </a:schemeClr>
                 </a:solidFill>
               </a:rPr>
-              <a:t>ADO </a:t>
-            </a:r>
-            <a:r>
-              <a:rPr lang="fr-FR" dirty="0" smtClean="0">
-                <a:solidFill>
-                  <a:schemeClr val="tx1">
-                    <a:lumMod val="65000"/>
-                    <a:lumOff val="35000"/>
-                  </a:schemeClr>
-                </a:solidFill>
-              </a:rPr>
-              <a:t>– PPZ – LFH – RPN</a:t>
+              <a:t>ADO – PPZ – LFH – RPN</a:t>
             </a:r>
           </a:p>
         </p:txBody>

</xml_diff>

<commit_message>
présentation finale -> pour Pierre-do
</commit_message>
<xml_diff>
--- a/documents/v2.0/Presentation.pptx
+++ b/documents/v2.0/Presentation.pptx
@@ -4688,7 +4688,7 @@
         </p:nvSpPr>
         <p:spPr bwMode="auto">
           <a:xfrm>
-            <a:off x="0" y="1623536"/>
+            <a:off x="0" y="3933056"/>
             <a:ext cx="9144000" cy="954107"/>
           </a:xfrm>
           <a:prstGeom prst="rect">
@@ -4807,7 +4807,7 @@
       </p:pic>
       <p:pic>
         <p:nvPicPr>
-          <p:cNvPr id="12" name="Image 11" descr="menuPrincipal.png"/>
+          <p:cNvPr id="11" name="Image 10" descr="logo.png"/>
           <p:cNvPicPr>
             <a:picLocks noChangeAspect="1"/>
           </p:cNvPicPr>
@@ -4815,15 +4815,14 @@
         </p:nvPicPr>
         <p:blipFill>
           <a:blip r:embed="rId5" cstate="print"/>
-          <a:srcRect l="5277" t="11176" r="6688" b="54792"/>
           <a:stretch>
             <a:fillRect/>
           </a:stretch>
         </p:blipFill>
         <p:spPr>
           <a:xfrm>
-            <a:off x="611566" y="2628628"/>
-            <a:ext cx="8049890" cy="2333918"/>
+            <a:off x="3671900" y="2348880"/>
+            <a:ext cx="1702007" cy="936104"/>
           </a:xfrm>
           <a:prstGeom prst="rect">
             <a:avLst/>
@@ -4867,7 +4866,7 @@
       </p:grpSpPr>
       <p:sp>
         <p:nvSpPr>
-          <p:cNvPr id="29700" name="Rectangle 4"/>
+          <p:cNvPr id="14" name="Rectangle 4"/>
           <p:cNvSpPr>
             <a:spLocks noChangeArrowheads="1"/>
           </p:cNvSpPr>
@@ -4910,7 +4909,7 @@
       </p:sp>
       <p:sp>
         <p:nvSpPr>
-          <p:cNvPr id="29709" name="Rectangle 13"/>
+          <p:cNvPr id="17" name="Rectangle 13"/>
           <p:cNvSpPr>
             <a:spLocks noChangeArrowheads="1"/>
           </p:cNvSpPr>
@@ -4955,7 +4954,7 @@
       </p:sp>
       <p:sp>
         <p:nvSpPr>
-          <p:cNvPr id="29710" name="Rectangle 14"/>
+          <p:cNvPr id="18" name="Rectangle 14"/>
           <p:cNvSpPr>
             <a:spLocks noChangeArrowheads="1"/>
           </p:cNvSpPr>
@@ -5000,7 +4999,7 @@
       </p:sp>
       <p:sp>
         <p:nvSpPr>
-          <p:cNvPr id="12" name="Espace réservé du numéro de diapositive 11"/>
+          <p:cNvPr id="19" name="Espace réservé du numéro de diapositive 11"/>
           <p:cNvSpPr>
             <a:spLocks noGrp="1"/>
           </p:cNvSpPr>
@@ -5039,7 +5038,7 @@
                   </a:schemeClr>
                 </a:solidFill>
               </a:rPr>
-              <a:t>/13</a:t>
+              <a:t>/12</a:t>
             </a:r>
             <a:endParaRPr lang="fr-FR" dirty="0">
               <a:solidFill>
@@ -5054,7 +5053,7 @@
       </p:sp>
       <p:sp>
         <p:nvSpPr>
-          <p:cNvPr id="13" name="Espace réservé de la date 12"/>
+          <p:cNvPr id="20" name="Espace réservé de la date 12"/>
           <p:cNvSpPr>
             <a:spLocks noGrp="1"/>
           </p:cNvSpPr>
@@ -5097,7 +5096,7 @@
       </p:sp>
       <p:sp>
         <p:nvSpPr>
-          <p:cNvPr id="16" name="Text Box 5"/>
+          <p:cNvPr id="21" name="Text Box 5"/>
           <p:cNvSpPr txBox="1">
             <a:spLocks noChangeArrowheads="1"/>
           </p:cNvSpPr>
@@ -5157,7 +5156,7 @@
       </p:sp>
       <p:sp>
         <p:nvSpPr>
-          <p:cNvPr id="10" name="Espace réservé du pied de page 13"/>
+          <p:cNvPr id="22" name="Espace réservé du pied de page 13"/>
           <p:cNvSpPr>
             <a:spLocks noGrp="1"/>
           </p:cNvSpPr>
@@ -5191,19 +5190,82 @@
       </p:sp>
       <p:sp>
         <p:nvSpPr>
-          <p:cNvPr id="11" name="ZoneTexte 10"/>
-          <p:cNvSpPr txBox="1"/>
+          <p:cNvPr id="23" name="Rectangle 22"/>
+          <p:cNvSpPr/>
           <p:nvPr/>
         </p:nvSpPr>
-        <p:spPr>
-          <a:xfrm>
-            <a:off x="847674" y="1492785"/>
-            <a:ext cx="7598617" cy="1477328"/>
+        <p:spPr bwMode="auto">
+          <a:xfrm>
+            <a:off x="745232" y="1854116"/>
+            <a:ext cx="7607188" cy="4212468"/>
           </a:xfrm>
           <a:prstGeom prst="rect">
             <a:avLst/>
           </a:prstGeom>
           <a:noFill/>
+          <a:ln w="15875" cap="flat" cmpd="sng" algn="ctr">
+            <a:solidFill>
+              <a:schemeClr val="tx1"/>
+            </a:solidFill>
+            <a:prstDash val="solid"/>
+            <a:round/>
+            <a:headEnd type="none" w="med" len="med"/>
+            <a:tailEnd type="none" w="med" len="med"/>
+          </a:ln>
+          <a:effectLst/>
+        </p:spPr>
+        <p:txBody>
+          <a:bodyPr vert="horz" wrap="square" lIns="91440" tIns="45720" rIns="91440" bIns="45720" numCol="1" rtlCol="0" anchor="t" anchorCtr="0" compatLnSpc="1">
+            <a:prstTxWarp prst="textNoShape">
+              <a:avLst/>
+            </a:prstTxWarp>
+          </a:bodyPr>
+          <a:lstStyle/>
+          <a:p>
+            <a:pPr marL="0" marR="0" indent="0" defTabSz="914400" rtl="0" eaLnBrk="1" fontAlgn="base" latinLnBrk="0" hangingPunct="1">
+              <a:lnSpc>
+                <a:spcPct val="100000"/>
+              </a:lnSpc>
+              <a:spcBef>
+                <a:spcPct val="0"/>
+              </a:spcBef>
+              <a:spcAft>
+                <a:spcPct val="0"/>
+              </a:spcAft>
+              <a:buClrTx/>
+              <a:buSzTx/>
+              <a:buFontTx/>
+              <a:buNone/>
+              <a:tabLst/>
+            </a:pPr>
+            <a:endParaRPr kumimoji="0" lang="fr-CH" sz="1800" b="0" i="0" u="sng" strike="noStrike" cap="none" normalizeH="0" baseline="0" dirty="0" smtClean="0">
+              <a:ln>
+                <a:noFill/>
+              </a:ln>
+              <a:solidFill>
+                <a:schemeClr val="tx1"/>
+              </a:solidFill>
+              <a:effectLst/>
+              <a:latin typeface="Arial" charset="0"/>
+            </a:endParaRPr>
+          </a:p>
+        </p:txBody>
+      </p:sp>
+      <p:sp>
+        <p:nvSpPr>
+          <p:cNvPr id="24" name="ZoneTexte 23"/>
+          <p:cNvSpPr txBox="1"/>
+          <p:nvPr/>
+        </p:nvSpPr>
+        <p:spPr>
+          <a:xfrm>
+            <a:off x="637220" y="1556792"/>
+            <a:ext cx="2160240" cy="369332"/>
+          </a:xfrm>
+          <a:prstGeom prst="rect">
+            <a:avLst/>
+          </a:prstGeom>
+          <a:noFill/>
         </p:spPr>
         <p:txBody>
           <a:bodyPr wrap="square" rtlCol="0">
@@ -5211,53 +5273,422 @@
           </a:bodyPr>
           <a:lstStyle/>
           <a:p>
-            <a:pPr>
-              <a:lnSpc>
-                <a:spcPct val="250000"/>
-              </a:lnSpc>
-            </a:pPr>
-            <a:r>
-              <a:rPr lang="fr-CH" u="none" dirty="0" err="1" smtClean="0"/>
-              <a:t>Lazhar</a:t>
-            </a:r>
-            <a:endParaRPr lang="fr-CH" u="none" dirty="0" smtClean="0"/>
-          </a:p>
-          <a:p>
-            <a:pPr>
-              <a:lnSpc>
-                <a:spcPct val="250000"/>
-              </a:lnSpc>
-            </a:pPr>
-            <a:endParaRPr lang="fr-CH" i="1" u="none" dirty="0"/>
-          </a:p>
-        </p:txBody>
-      </p:sp>
-      <p:pic>
-        <p:nvPicPr>
-          <p:cNvPr id="15" name="Picture 3" descr="C:\Documents and Settings\Administrateur\Bureau\images\14.01.png"/>
-          <p:cNvPicPr>
-            <a:picLocks noChangeAspect="1" noChangeArrowheads="1"/>
-          </p:cNvPicPr>
+            <a:r>
+              <a:rPr lang="fr-CH" u="none" dirty="0" smtClean="0"/>
+              <a:t>Réseau local</a:t>
+            </a:r>
+            <a:endParaRPr lang="fr-CH" u="none" dirty="0"/>
+          </a:p>
+        </p:txBody>
+      </p:sp>
+      <p:grpSp>
+        <p:nvGrpSpPr>
+          <p:cNvPr id="25" name="Groupe 24"/>
+          <p:cNvGrpSpPr/>
           <p:nvPr/>
-        </p:nvPicPr>
-        <p:blipFill>
-          <a:blip r:embed="rId2" cstate="print"/>
-          <a:srcRect/>
-          <a:stretch>
-            <a:fillRect/>
-          </a:stretch>
-        </p:blipFill>
+        </p:nvGrpSpPr>
+        <p:grpSpPr>
+          <a:xfrm>
+            <a:off x="6811888" y="3032956"/>
+            <a:ext cx="2152600" cy="1282452"/>
+            <a:chOff x="6228184" y="2096852"/>
+            <a:chExt cx="2152600" cy="1282452"/>
+          </a:xfrm>
+        </p:grpSpPr>
+        <p:pic>
+          <p:nvPicPr>
+            <p:cNvPr id="26" name="Picture 2" descr="C:\Documents and Settings\Lazhar.NB-FARJALLL\Local Settings\Temporary Internet Files\Content.IE5\QGQ2KYU0\MC900434845[1].png"/>
+            <p:cNvPicPr>
+              <a:picLocks noChangeAspect="1" noChangeArrowheads="1"/>
+            </p:cNvPicPr>
+            <p:nvPr/>
+          </p:nvPicPr>
+          <p:blipFill>
+            <a:blip r:embed="rId2" cstate="print"/>
+            <a:srcRect/>
+            <a:stretch>
+              <a:fillRect/>
+            </a:stretch>
+          </p:blipFill>
+          <p:spPr bwMode="auto">
+            <a:xfrm>
+              <a:off x="6553200" y="2564904"/>
+              <a:ext cx="814400" cy="814400"/>
+            </a:xfrm>
+            <a:prstGeom prst="rect">
+              <a:avLst/>
+            </a:prstGeom>
+            <a:ln>
+              <a:noFill/>
+            </a:ln>
+            <a:effectLst>
+              <a:outerShdw blurRad="292100" dist="139700" dir="2700000" algn="tl" rotWithShape="0">
+                <a:srgbClr val="333333">
+                  <a:alpha val="65000"/>
+                </a:srgbClr>
+              </a:outerShdw>
+            </a:effectLst>
+          </p:spPr>
+        </p:pic>
+        <p:sp>
+          <p:nvSpPr>
+            <p:cNvPr id="27" name="ZoneTexte 26"/>
+            <p:cNvSpPr txBox="1"/>
+            <p:nvPr/>
+          </p:nvSpPr>
+          <p:spPr>
+            <a:xfrm>
+              <a:off x="6228184" y="2096852"/>
+              <a:ext cx="2152600" cy="523220"/>
+            </a:xfrm>
+            <a:prstGeom prst="rect">
+              <a:avLst/>
+            </a:prstGeom>
+            <a:noFill/>
+          </p:spPr>
+          <p:txBody>
+            <a:bodyPr wrap="square" rtlCol="0">
+              <a:spAutoFit/>
+            </a:bodyPr>
+            <a:lstStyle/>
+            <a:p>
+              <a:r>
+                <a:rPr lang="fr-CH" sz="1400" u="none" dirty="0" smtClean="0"/>
+                <a:t>Serveur d’enregistrement</a:t>
+              </a:r>
+              <a:endParaRPr lang="fr-CH" sz="1400" u="none" dirty="0"/>
+            </a:p>
+          </p:txBody>
+        </p:sp>
+      </p:grpSp>
+      <p:grpSp>
+        <p:nvGrpSpPr>
+          <p:cNvPr id="28" name="Groupe 27"/>
+          <p:cNvGrpSpPr/>
+          <p:nvPr/>
+        </p:nvGrpSpPr>
+        <p:grpSpPr>
+          <a:xfrm>
+            <a:off x="1007604" y="2142148"/>
+            <a:ext cx="5221560" cy="3663116"/>
+            <a:chOff x="1331640" y="2070140"/>
+            <a:chExt cx="5221560" cy="3663116"/>
+          </a:xfrm>
+        </p:grpSpPr>
+        <p:pic>
+          <p:nvPicPr>
+            <p:cNvPr id="29" name="Picture 2"/>
+            <p:cNvPicPr>
+              <a:picLocks noChangeAspect="1" noChangeArrowheads="1"/>
+            </p:cNvPicPr>
+            <p:nvPr/>
+          </p:nvPicPr>
+          <p:blipFill>
+            <a:blip r:embed="rId3" cstate="print"/>
+            <a:srcRect/>
+            <a:stretch>
+              <a:fillRect/>
+            </a:stretch>
+          </p:blipFill>
+          <p:spPr bwMode="auto">
+            <a:xfrm>
+              <a:off x="1630102" y="2276872"/>
+              <a:ext cx="3409950" cy="942975"/>
+            </a:xfrm>
+            <a:prstGeom prst="rect">
+              <a:avLst/>
+            </a:prstGeom>
+            <a:noFill/>
+            <a:ln w="9525">
+              <a:noFill/>
+              <a:miter lim="800000"/>
+              <a:headEnd/>
+              <a:tailEnd/>
+            </a:ln>
+          </p:spPr>
+        </p:pic>
+        <p:pic>
+          <p:nvPicPr>
+            <p:cNvPr id="30" name="Picture 3"/>
+            <p:cNvPicPr>
+              <a:picLocks noChangeAspect="1" noChangeArrowheads="1"/>
+            </p:cNvPicPr>
+            <p:nvPr/>
+          </p:nvPicPr>
+          <p:blipFill>
+            <a:blip r:embed="rId4" cstate="print"/>
+            <a:srcRect/>
+            <a:stretch>
+              <a:fillRect/>
+            </a:stretch>
+          </p:blipFill>
+          <p:spPr bwMode="auto">
+            <a:xfrm>
+              <a:off x="1655676" y="4076674"/>
+              <a:ext cx="923925" cy="1152525"/>
+            </a:xfrm>
+            <a:prstGeom prst="rect">
+              <a:avLst/>
+            </a:prstGeom>
+            <a:noFill/>
+            <a:ln w="9525">
+              <a:noFill/>
+              <a:miter lim="800000"/>
+              <a:headEnd/>
+              <a:tailEnd/>
+            </a:ln>
+          </p:spPr>
+        </p:pic>
+        <p:pic>
+          <p:nvPicPr>
+            <p:cNvPr id="31" name="Picture 4"/>
+            <p:cNvPicPr>
+              <a:picLocks noChangeAspect="1" noChangeArrowheads="1"/>
+            </p:cNvPicPr>
+            <p:nvPr/>
+          </p:nvPicPr>
+          <p:blipFill>
+            <a:blip r:embed="rId5" cstate="print"/>
+            <a:srcRect/>
+            <a:stretch>
+              <a:fillRect/>
+            </a:stretch>
+          </p:blipFill>
+          <p:spPr bwMode="auto">
+            <a:xfrm>
+              <a:off x="3540063" y="4076674"/>
+              <a:ext cx="923925" cy="1152525"/>
+            </a:xfrm>
+            <a:prstGeom prst="rect">
+              <a:avLst/>
+            </a:prstGeom>
+            <a:noFill/>
+            <a:ln w="9525">
+              <a:noFill/>
+              <a:miter lim="800000"/>
+              <a:headEnd/>
+              <a:tailEnd/>
+            </a:ln>
+          </p:spPr>
+        </p:pic>
+        <p:pic>
+          <p:nvPicPr>
+            <p:cNvPr id="32" name="Picture 5"/>
+            <p:cNvPicPr>
+              <a:picLocks noChangeAspect="1" noChangeArrowheads="1"/>
+            </p:cNvPicPr>
+            <p:nvPr/>
+          </p:nvPicPr>
+          <p:blipFill>
+            <a:blip r:embed="rId6" cstate="print"/>
+            <a:srcRect/>
+            <a:stretch>
+              <a:fillRect/>
+            </a:stretch>
+          </p:blipFill>
+          <p:spPr bwMode="auto">
+            <a:xfrm>
+              <a:off x="5184068" y="4076675"/>
+              <a:ext cx="923925" cy="1152525"/>
+            </a:xfrm>
+            <a:prstGeom prst="rect">
+              <a:avLst/>
+            </a:prstGeom>
+            <a:noFill/>
+            <a:ln w="9525">
+              <a:noFill/>
+              <a:miter lim="800000"/>
+              <a:headEnd/>
+              <a:tailEnd/>
+            </a:ln>
+          </p:spPr>
+        </p:pic>
+        <p:cxnSp>
+          <p:nvCxnSpPr>
+            <p:cNvPr id="33" name="Connecteur droit avec flèche 32"/>
+            <p:cNvCxnSpPr>
+              <a:stCxn id="30" idx="0"/>
+            </p:cNvCxnSpPr>
+            <p:nvPr/>
+          </p:nvCxnSpPr>
+          <p:spPr bwMode="auto">
+            <a:xfrm rot="5400000" flipH="1" flipV="1">
+              <a:off x="2191155" y="3146332"/>
+              <a:ext cx="856826" cy="1003859"/>
+            </a:xfrm>
+            <a:prstGeom prst="straightConnector1">
+              <a:avLst/>
+            </a:prstGeom>
+            <a:solidFill>
+              <a:schemeClr val="accent1"/>
+            </a:solidFill>
+            <a:ln w="9525" cap="flat" cmpd="sng" algn="ctr">
+              <a:solidFill>
+                <a:schemeClr val="tx1"/>
+              </a:solidFill>
+              <a:prstDash val="solid"/>
+              <a:round/>
+              <a:headEnd type="arrow"/>
+              <a:tailEnd type="arrow"/>
+            </a:ln>
+            <a:effectLst/>
+          </p:spPr>
+        </p:cxnSp>
+        <p:cxnSp>
+          <p:nvCxnSpPr>
+            <p:cNvPr id="34" name="Connecteur droit avec flèche 33"/>
+            <p:cNvCxnSpPr>
+              <a:stCxn id="31" idx="0"/>
+            </p:cNvCxnSpPr>
+            <p:nvPr/>
+          </p:nvCxnSpPr>
+          <p:spPr bwMode="auto">
+            <a:xfrm rot="16200000" flipV="1">
+              <a:off x="3422360" y="3497007"/>
+              <a:ext cx="697370" cy="461963"/>
+            </a:xfrm>
+            <a:prstGeom prst="straightConnector1">
+              <a:avLst/>
+            </a:prstGeom>
+            <a:solidFill>
+              <a:schemeClr val="accent1"/>
+            </a:solidFill>
+            <a:ln w="9525" cap="flat" cmpd="sng" algn="ctr">
+              <a:solidFill>
+                <a:schemeClr val="tx1"/>
+              </a:solidFill>
+              <a:prstDash val="solid"/>
+              <a:round/>
+              <a:headEnd type="arrow"/>
+              <a:tailEnd type="arrow"/>
+            </a:ln>
+            <a:effectLst/>
+          </p:spPr>
+        </p:cxnSp>
+        <p:cxnSp>
+          <p:nvCxnSpPr>
+            <p:cNvPr id="35" name="Connecteur droit avec flèche 34"/>
+            <p:cNvCxnSpPr>
+              <a:stCxn id="32" idx="0"/>
+            </p:cNvCxnSpPr>
+            <p:nvPr/>
+          </p:nvCxnSpPr>
+          <p:spPr bwMode="auto">
+            <a:xfrm rot="16200000" flipV="1">
+              <a:off x="4335521" y="2766164"/>
+              <a:ext cx="856827" cy="1764195"/>
+            </a:xfrm>
+            <a:prstGeom prst="straightConnector1">
+              <a:avLst/>
+            </a:prstGeom>
+            <a:solidFill>
+              <a:schemeClr val="accent1"/>
+            </a:solidFill>
+            <a:ln w="9525" cap="flat" cmpd="sng" algn="ctr">
+              <a:solidFill>
+                <a:schemeClr val="tx1"/>
+              </a:solidFill>
+              <a:prstDash val="solid"/>
+              <a:round/>
+              <a:headEnd type="arrow"/>
+              <a:tailEnd type="arrow"/>
+            </a:ln>
+            <a:effectLst/>
+          </p:spPr>
+        </p:cxnSp>
+        <p:sp>
+          <p:nvSpPr>
+            <p:cNvPr id="36" name="Rectangle 35"/>
+            <p:cNvSpPr/>
+            <p:nvPr/>
+          </p:nvSpPr>
+          <p:spPr bwMode="auto">
+            <a:xfrm>
+              <a:off x="1331640" y="2070140"/>
+              <a:ext cx="5221560" cy="3663116"/>
+            </a:xfrm>
+            <a:prstGeom prst="rect">
+              <a:avLst/>
+            </a:prstGeom>
+            <a:noFill/>
+            <a:ln w="9525" cap="flat" cmpd="sng" algn="ctr">
+              <a:solidFill>
+                <a:schemeClr val="tx1"/>
+              </a:solidFill>
+              <a:prstDash val="solid"/>
+              <a:round/>
+              <a:headEnd type="none" w="med" len="med"/>
+              <a:tailEnd type="none" w="med" len="med"/>
+            </a:ln>
+            <a:effectLst/>
+          </p:spPr>
+          <p:txBody>
+            <a:bodyPr vert="horz" wrap="square" lIns="91440" tIns="45720" rIns="91440" bIns="45720" numCol="1" rtlCol="0" anchor="t" anchorCtr="0" compatLnSpc="1">
+              <a:prstTxWarp prst="textNoShape">
+                <a:avLst/>
+              </a:prstTxWarp>
+            </a:bodyPr>
+            <a:lstStyle/>
+            <a:p>
+              <a:pPr marL="0" marR="0" indent="0" algn="l" defTabSz="914400" rtl="0" eaLnBrk="1" fontAlgn="base" latinLnBrk="0" hangingPunct="1">
+                <a:lnSpc>
+                  <a:spcPct val="100000"/>
+                </a:lnSpc>
+                <a:spcBef>
+                  <a:spcPct val="0"/>
+                </a:spcBef>
+                <a:spcAft>
+                  <a:spcPct val="0"/>
+                </a:spcAft>
+                <a:buClrTx/>
+                <a:buSzTx/>
+                <a:buFontTx/>
+                <a:buNone/>
+                <a:tabLst/>
+              </a:pPr>
+              <a:endParaRPr kumimoji="0" lang="fr-CH" sz="1800" b="0" i="0" u="sng" strike="noStrike" cap="none" normalizeH="0" baseline="0" smtClean="0">
+                <a:ln>
+                  <a:noFill/>
+                </a:ln>
+                <a:solidFill>
+                  <a:schemeClr val="tx1"/>
+                </a:solidFill>
+                <a:effectLst/>
+                <a:latin typeface="Arial" charset="0"/>
+              </a:endParaRPr>
+            </a:p>
+          </p:txBody>
+        </p:sp>
+      </p:grpSp>
+      <p:cxnSp>
+        <p:nvCxnSpPr>
+          <p:cNvPr id="37" name="Connecteur droit avec flèche 36"/>
+          <p:cNvCxnSpPr/>
+          <p:nvPr/>
+        </p:nvCxnSpPr>
         <p:spPr bwMode="auto">
           <a:xfrm>
-            <a:off x="2590800" y="1603350"/>
-            <a:ext cx="5811702" cy="4564125"/>
-          </a:xfrm>
-          <a:prstGeom prst="rect">
+            <a:off x="6228184" y="3861048"/>
+            <a:ext cx="1008112" cy="1588"/>
+          </a:xfrm>
+          <a:prstGeom prst="straightConnector1">
             <a:avLst/>
           </a:prstGeom>
-          <a:noFill/>
-        </p:spPr>
-      </p:pic>
+          <a:solidFill>
+            <a:schemeClr val="accent1"/>
+          </a:solidFill>
+          <a:ln w="9525" cap="flat" cmpd="sng" algn="ctr">
+            <a:solidFill>
+              <a:schemeClr val="tx1"/>
+            </a:solidFill>
+            <a:prstDash val="solid"/>
+            <a:round/>
+            <a:headEnd type="arrow"/>
+            <a:tailEnd type="arrow"/>
+          </a:ln>
+          <a:effectLst/>
+        </p:spPr>
+      </p:cxnSp>
     </p:spTree>
   </p:cSld>
   <p:clrMapOvr>
@@ -5565,7 +5996,7 @@
                   </a:schemeClr>
                 </a:solidFill>
               </a:rPr>
-              <a:t>/13</a:t>
+              <a:t>/12</a:t>
             </a:r>
             <a:endParaRPr lang="fr-FR" dirty="0">
               <a:solidFill>
@@ -5770,6 +6201,9 @@
               </a:rPr>
               <a:t>Remerciements</a:t>
             </a:r>
+            <a:endParaRPr lang="fr-FR" u="none" dirty="0" smtClean="0">
+              <a:latin typeface="Trebuchet MS" pitchFamily="34" charset="0"/>
+            </a:endParaRPr>
           </a:p>
         </p:txBody>
       </p:sp>
@@ -7154,7 +7588,7 @@
                   </a:schemeClr>
                 </a:solidFill>
               </a:rPr>
-              <a:t>/13</a:t>
+              <a:t>/12</a:t>
             </a:r>
             <a:endParaRPr lang="fr-FR" dirty="0">
               <a:solidFill>
@@ -7600,7 +8034,7 @@
                   </a:schemeClr>
                 </a:solidFill>
               </a:rPr>
-              <a:t>/13</a:t>
+              <a:t>/12</a:t>
             </a:r>
             <a:endParaRPr lang="fr-FR" dirty="0">
               <a:solidFill>
@@ -8227,7 +8661,7 @@
                   </a:schemeClr>
                 </a:solidFill>
               </a:rPr>
-              <a:t>/13</a:t>
+              <a:t>/12</a:t>
             </a:r>
             <a:endParaRPr lang="fr-FR" dirty="0">
               <a:solidFill>
@@ -8921,7 +9355,7 @@
                   </a:schemeClr>
                 </a:solidFill>
               </a:rPr>
-              <a:t>/13</a:t>
+              <a:t>/12</a:t>
             </a:r>
             <a:endParaRPr lang="fr-FR" dirty="0">
               <a:solidFill>
@@ -11697,7 +12131,7 @@
                   </a:schemeClr>
                 </a:solidFill>
               </a:rPr>
-              <a:t>/13</a:t>
+              <a:t>/12</a:t>
             </a:r>
             <a:endParaRPr lang="fr-FR" dirty="0">
               <a:solidFill>
@@ -12098,7 +12532,7 @@
                   </a:schemeClr>
                 </a:solidFill>
               </a:rPr>
-              <a:t>/13</a:t>
+              <a:t>/12</a:t>
             </a:r>
             <a:endParaRPr lang="fr-FR" dirty="0">
               <a:solidFill>
@@ -12218,156 +12652,67 @@
           <a:p>
             <a:r>
               <a:rPr lang="fr-FR" u="none" dirty="0" smtClean="0"/>
-              <a:t>Durée : </a:t>
-            </a:r>
+              <a:t>Durée : 1 semaine (32 heures)</a:t>
+            </a:r>
+          </a:p>
+          <a:p>
+            <a:endParaRPr lang="fr-FR" u="none" dirty="0" smtClean="0"/>
+          </a:p>
+          <a:p>
+            <a:r>
+              <a:rPr lang="fr-FR" b="1" u="none" dirty="0" smtClean="0"/>
+              <a:t>Itération 2 – Serveur de Jeu + Architecture</a:t>
+            </a:r>
+          </a:p>
+          <a:p>
             <a:r>
               <a:rPr lang="fr-FR" u="none" dirty="0" smtClean="0"/>
-              <a:t>1 semaine </a:t>
-            </a:r>
+              <a:t>Durée : 1 semaine (40 heures)</a:t>
+            </a:r>
+          </a:p>
+          <a:p>
+            <a:endParaRPr lang="fr-FR" u="none" dirty="0" smtClean="0"/>
+          </a:p>
+          <a:p>
+            <a:r>
+              <a:rPr lang="fr-FR" b="1" u="none" dirty="0" smtClean="0"/>
+              <a:t>Itération 3 – Intégration du serveur de jeu + Interface du Jeu en réseau</a:t>
+            </a:r>
+          </a:p>
+          <a:p>
             <a:r>
               <a:rPr lang="fr-FR" u="none" dirty="0" smtClean="0"/>
-              <a:t>(32 </a:t>
-            </a:r>
+              <a:t>Durée : 2 semaines (96 heures)</a:t>
+            </a:r>
+          </a:p>
+          <a:p>
+            <a:endParaRPr lang="fr-FR" u="none" dirty="0" smtClean="0"/>
+          </a:p>
+          <a:p>
+            <a:r>
+              <a:rPr lang="fr-FR" b="1" u="none" dirty="0" smtClean="0"/>
+              <a:t>Itération 4 – Lifting de la GUI + Game Design +  Amélioration Mode Solo</a:t>
+            </a:r>
+          </a:p>
+          <a:p>
             <a:r>
               <a:rPr lang="fr-FR" u="none" dirty="0" smtClean="0"/>
-              <a:t>heures</a:t>
-            </a:r>
+              <a:t>Durée : 1 semaine (40 heures)</a:t>
+            </a:r>
+          </a:p>
+          <a:p>
+            <a:endParaRPr lang="fr-FR" u="none" dirty="0" smtClean="0"/>
+          </a:p>
+          <a:p>
+            <a:r>
+              <a:rPr lang="fr-FR" b="1" u="none" dirty="0" smtClean="0"/>
+              <a:t>Itération 5 – Serveur Web (facultatif)</a:t>
+            </a:r>
+          </a:p>
+          <a:p>
             <a:r>
               <a:rPr lang="fr-FR" u="none" dirty="0" smtClean="0"/>
-              <a:t>)</a:t>
-            </a:r>
-          </a:p>
-          <a:p>
-            <a:endParaRPr lang="fr-FR" u="none" dirty="0" smtClean="0"/>
-          </a:p>
-          <a:p>
-            <a:r>
-              <a:rPr lang="fr-FR" b="1" u="none" dirty="0" smtClean="0"/>
-              <a:t>Itération 2 – Serveur de Jeu + </a:t>
-            </a:r>
-            <a:r>
-              <a:rPr lang="fr-FR" b="1" u="none" dirty="0" smtClean="0"/>
-              <a:t>Architecture</a:t>
-            </a:r>
-          </a:p>
-          <a:p>
-            <a:r>
-              <a:rPr lang="fr-FR" u="none" dirty="0" smtClean="0"/>
-              <a:t>Durée </a:t>
-            </a:r>
-            <a:r>
-              <a:rPr lang="fr-FR" u="none" dirty="0" smtClean="0"/>
-              <a:t>: </a:t>
-            </a:r>
-            <a:r>
-              <a:rPr lang="fr-FR" u="none" dirty="0" smtClean="0"/>
-              <a:t>1 semaine (40 heures)</a:t>
-            </a:r>
-            <a:endParaRPr lang="fr-FR" u="none" dirty="0" smtClean="0"/>
-          </a:p>
-          <a:p>
-            <a:endParaRPr lang="fr-FR" u="none" dirty="0" smtClean="0"/>
-          </a:p>
-          <a:p>
-            <a:r>
-              <a:rPr lang="fr-FR" b="1" u="none" dirty="0" smtClean="0"/>
-              <a:t>Itération 3 </a:t>
-            </a:r>
-            <a:r>
-              <a:rPr lang="fr-FR" b="1" u="none" dirty="0" smtClean="0"/>
-              <a:t>– Intégration </a:t>
-            </a:r>
-            <a:r>
-              <a:rPr lang="fr-FR" b="1" u="none" dirty="0" smtClean="0"/>
-              <a:t>du serveur de jeu + Interface du Jeu en </a:t>
-            </a:r>
-            <a:r>
-              <a:rPr lang="fr-FR" b="1" u="none" dirty="0" smtClean="0"/>
-              <a:t>réseau</a:t>
-            </a:r>
-          </a:p>
-          <a:p>
-            <a:r>
-              <a:rPr lang="fr-FR" u="none" dirty="0" smtClean="0"/>
-              <a:t>Durée : 2 semaines (</a:t>
-            </a:r>
-            <a:r>
-              <a:rPr lang="fr-FR" u="none" dirty="0" smtClean="0"/>
-              <a:t>96</a:t>
-            </a:r>
-            <a:r>
-              <a:rPr lang="fr-FR" u="none" dirty="0" smtClean="0"/>
-              <a:t> heures)</a:t>
-            </a:r>
-          </a:p>
-          <a:p>
-            <a:endParaRPr lang="fr-FR" u="none" dirty="0" smtClean="0"/>
-          </a:p>
-          <a:p>
-            <a:r>
-              <a:rPr lang="fr-FR" b="1" u="none" dirty="0" smtClean="0"/>
-              <a:t>Itération 4 – Lifting de la GUI + Game Design +  Amélioration Mode </a:t>
-            </a:r>
-            <a:r>
-              <a:rPr lang="fr-FR" b="1" u="none" dirty="0" smtClean="0"/>
-              <a:t>Solo</a:t>
-            </a:r>
-          </a:p>
-          <a:p>
-            <a:r>
-              <a:rPr lang="fr-FR" u="none" dirty="0" smtClean="0"/>
-              <a:t>Durée : 1 </a:t>
-            </a:r>
-            <a:r>
-              <a:rPr lang="fr-FR" u="none" dirty="0" smtClean="0"/>
-              <a:t>semaine </a:t>
-            </a:r>
-            <a:r>
-              <a:rPr lang="fr-FR" u="none" dirty="0" smtClean="0"/>
-              <a:t>(</a:t>
-            </a:r>
-            <a:r>
-              <a:rPr lang="fr-FR" u="none" dirty="0" smtClean="0"/>
-              <a:t>40 heures</a:t>
-            </a:r>
-            <a:r>
-              <a:rPr lang="fr-FR" u="none" dirty="0" smtClean="0"/>
-              <a:t>)</a:t>
-            </a:r>
-          </a:p>
-          <a:p>
-            <a:endParaRPr lang="fr-FR" u="none" dirty="0" smtClean="0"/>
-          </a:p>
-          <a:p>
-            <a:r>
-              <a:rPr lang="fr-FR" b="1" u="none" dirty="0" smtClean="0"/>
-              <a:t>Itération 5 – Serveur Web (facultatif</a:t>
-            </a:r>
-            <a:r>
-              <a:rPr lang="fr-FR" b="1" u="none" dirty="0" smtClean="0"/>
-              <a:t>)</a:t>
-            </a:r>
-          </a:p>
-          <a:p>
-            <a:r>
-              <a:rPr lang="fr-FR" u="none" dirty="0" smtClean="0"/>
-              <a:t>Durée : </a:t>
-            </a:r>
-            <a:r>
-              <a:rPr lang="fr-FR" u="none" dirty="0" smtClean="0"/>
-              <a:t>moins d’une </a:t>
-            </a:r>
-            <a:r>
-              <a:rPr lang="fr-FR" u="none" dirty="0" smtClean="0"/>
-              <a:t>semaine (</a:t>
-            </a:r>
-            <a:r>
-              <a:rPr lang="fr-FR" u="none" dirty="0" smtClean="0"/>
-              <a:t>24 heures</a:t>
-            </a:r>
-            <a:r>
-              <a:rPr lang="fr-FR" u="none" dirty="0" smtClean="0"/>
-              <a:t>) </a:t>
+              <a:t>Durée : moins d’une semaine (24 heures) </a:t>
             </a:r>
           </a:p>
         </p:txBody>
@@ -12581,7 +12926,7 @@
                   </a:schemeClr>
                 </a:solidFill>
               </a:rPr>
-              <a:t>/13</a:t>
+              <a:t>/12</a:t>
             </a:r>
             <a:endParaRPr lang="fr-FR" dirty="0">
               <a:solidFill>
@@ -12800,7 +13145,7 @@
       </p:grpSpPr>
       <p:sp>
         <p:nvSpPr>
-          <p:cNvPr id="28676" name="Rectangle 4"/>
+          <p:cNvPr id="44" name="Rectangle 4"/>
           <p:cNvSpPr>
             <a:spLocks noChangeArrowheads="1"/>
           </p:cNvSpPr>
@@ -12843,7 +13188,7 @@
       </p:sp>
       <p:sp>
         <p:nvSpPr>
-          <p:cNvPr id="28705" name="Rectangle 33"/>
+          <p:cNvPr id="45" name="Rectangle 33"/>
           <p:cNvSpPr>
             <a:spLocks noChangeArrowheads="1"/>
           </p:cNvSpPr>
@@ -12888,7 +13233,7 @@
       </p:sp>
       <p:sp>
         <p:nvSpPr>
-          <p:cNvPr id="28706" name="Rectangle 34"/>
+          <p:cNvPr id="46" name="Rectangle 34"/>
           <p:cNvSpPr>
             <a:spLocks noChangeArrowheads="1"/>
           </p:cNvSpPr>
@@ -12933,7 +13278,7 @@
       </p:sp>
       <p:sp>
         <p:nvSpPr>
-          <p:cNvPr id="25" name="Espace réservé du numéro de diapositive 24"/>
+          <p:cNvPr id="47" name="Espace réservé du numéro de diapositive 24"/>
           <p:cNvSpPr>
             <a:spLocks noGrp="1"/>
           </p:cNvSpPr>
@@ -12972,7 +13317,7 @@
                   </a:schemeClr>
                 </a:solidFill>
               </a:rPr>
-              <a:t>/13</a:t>
+              <a:t>/12</a:t>
             </a:r>
             <a:endParaRPr lang="fr-FR" dirty="0">
               <a:solidFill>
@@ -12987,7 +13332,7 @@
       </p:sp>
       <p:sp>
         <p:nvSpPr>
-          <p:cNvPr id="26" name="Espace réservé de la date 25"/>
+          <p:cNvPr id="48" name="Espace réservé de la date 25"/>
           <p:cNvSpPr>
             <a:spLocks noGrp="1"/>
           </p:cNvSpPr>
@@ -13030,7 +13375,7 @@
       </p:sp>
       <p:sp>
         <p:nvSpPr>
-          <p:cNvPr id="28" name="Text Box 5"/>
+          <p:cNvPr id="49" name="Text Box 5"/>
           <p:cNvSpPr txBox="1">
             <a:spLocks noChangeArrowheads="1"/>
           </p:cNvSpPr>
@@ -13090,7 +13435,7 @@
       </p:sp>
       <p:sp>
         <p:nvSpPr>
-          <p:cNvPr id="15" name="Espace réservé du pied de page 13"/>
+          <p:cNvPr id="50" name="Espace réservé du pied de page 13"/>
           <p:cNvSpPr>
             <a:spLocks noGrp="1"/>
           </p:cNvSpPr>
@@ -13122,16 +13467,440 @@
           </a:p>
         </p:txBody>
       </p:sp>
-      <p:sp>
-        <p:nvSpPr>
-          <p:cNvPr id="16" name="ZoneTexte 15"/>
+      <p:pic>
+        <p:nvPicPr>
+          <p:cNvPr id="51" name="Picture 2" descr="C:\Documents and Settings\Lazhar.NB-FARJALLL\Local Settings\Temporary Internet Files\Content.IE5\QGQ2KYU0\MC900434845[1].png"/>
+          <p:cNvPicPr>
+            <a:picLocks noChangeAspect="1" noChangeArrowheads="1"/>
+          </p:cNvPicPr>
+          <p:nvPr/>
+        </p:nvPicPr>
+        <p:blipFill>
+          <a:blip r:embed="rId2" cstate="print"/>
+          <a:srcRect/>
+          <a:stretch>
+            <a:fillRect/>
+          </a:stretch>
+        </p:blipFill>
+        <p:spPr bwMode="auto">
+          <a:xfrm>
+            <a:off x="3613584" y="1592796"/>
+            <a:ext cx="1714500" cy="1714500"/>
+          </a:xfrm>
+          <a:prstGeom prst="rect">
+            <a:avLst/>
+          </a:prstGeom>
+          <a:ln>
+            <a:noFill/>
+          </a:ln>
+          <a:effectLst>
+            <a:outerShdw blurRad="292100" dist="139700" dir="2700000" algn="tl" rotWithShape="0">
+              <a:srgbClr val="333333">
+                <a:alpha val="65000"/>
+              </a:srgbClr>
+            </a:outerShdw>
+          </a:effectLst>
+        </p:spPr>
+      </p:pic>
+      <p:cxnSp>
+        <p:nvCxnSpPr>
+          <p:cNvPr id="52" name="Connecteur droit avec flèche 51"/>
+          <p:cNvCxnSpPr/>
+          <p:nvPr/>
+        </p:nvCxnSpPr>
+        <p:spPr bwMode="auto">
+          <a:xfrm rot="10800000">
+            <a:off x="5328084" y="2359254"/>
+            <a:ext cx="1061416" cy="1"/>
+          </a:xfrm>
+          <a:prstGeom prst="straightConnector1">
+            <a:avLst/>
+          </a:prstGeom>
+          <a:solidFill>
+            <a:schemeClr val="accent1"/>
+          </a:solidFill>
+          <a:ln w="9525" cap="flat" cmpd="sng" algn="ctr">
+            <a:solidFill>
+              <a:schemeClr val="tx1"/>
+            </a:solidFill>
+            <a:prstDash val="solid"/>
+            <a:round/>
+            <a:headEnd type="arrow"/>
+            <a:tailEnd type="arrow"/>
+          </a:ln>
+          <a:effectLst/>
+        </p:spPr>
+      </p:cxnSp>
+      <p:cxnSp>
+        <p:nvCxnSpPr>
+          <p:cNvPr id="53" name="Connecteur droit avec flèche 52"/>
+          <p:cNvCxnSpPr/>
+          <p:nvPr/>
+        </p:nvCxnSpPr>
+        <p:spPr bwMode="auto">
+          <a:xfrm rot="16200000" flipH="1">
+            <a:off x="4780915" y="3400104"/>
+            <a:ext cx="2088231" cy="1569957"/>
+          </a:xfrm>
+          <a:prstGeom prst="straightConnector1">
+            <a:avLst/>
+          </a:prstGeom>
+          <a:solidFill>
+            <a:schemeClr val="accent1"/>
+          </a:solidFill>
+          <a:ln w="9525" cap="flat" cmpd="sng" algn="ctr">
+            <a:solidFill>
+              <a:schemeClr val="tx1"/>
+            </a:solidFill>
+            <a:prstDash val="solid"/>
+            <a:round/>
+            <a:headEnd type="arrow"/>
+            <a:tailEnd type="arrow"/>
+          </a:ln>
+          <a:effectLst/>
+        </p:spPr>
+      </p:cxnSp>
+      <p:grpSp>
+        <p:nvGrpSpPr>
+          <p:cNvPr id="54" name="Groupe 53"/>
+          <p:cNvGrpSpPr/>
+          <p:nvPr/>
+        </p:nvGrpSpPr>
+        <p:grpSpPr>
+          <a:xfrm>
+            <a:off x="6389500" y="1623073"/>
+            <a:ext cx="2466976" cy="2368297"/>
+            <a:chOff x="6044908" y="1492751"/>
+            <a:chExt cx="2466976" cy="2368297"/>
+          </a:xfrm>
+        </p:grpSpPr>
+        <p:pic>
+          <p:nvPicPr>
+            <p:cNvPr id="55" name="Picture 3" descr="C:\Documents and Settings\Lazhar.NB-FARJALLL\Local Settings\Temporary Internet Files\Content.IE5\052DF60R\MC900239921[1].wmf"/>
+            <p:cNvPicPr>
+              <a:picLocks noChangeAspect="1" noChangeArrowheads="1"/>
+            </p:cNvPicPr>
+            <p:nvPr/>
+          </p:nvPicPr>
+          <p:blipFill>
+            <a:blip r:embed="rId3" cstate="print"/>
+            <a:srcRect/>
+            <a:stretch>
+              <a:fillRect/>
+            </a:stretch>
+          </p:blipFill>
+          <p:spPr bwMode="auto">
+            <a:xfrm>
+              <a:off x="6516659" y="1920822"/>
+              <a:ext cx="756230" cy="616201"/>
+            </a:xfrm>
+            <a:prstGeom prst="rect">
+              <a:avLst/>
+            </a:prstGeom>
+            <a:ln>
+              <a:noFill/>
+            </a:ln>
+            <a:effectLst>
+              <a:outerShdw blurRad="292100" dist="139700" dir="2700000" algn="tl" rotWithShape="0">
+                <a:srgbClr val="333333">
+                  <a:alpha val="65000"/>
+                </a:srgbClr>
+              </a:outerShdw>
+            </a:effectLst>
+          </p:spPr>
+        </p:pic>
+        <p:pic>
+          <p:nvPicPr>
+            <p:cNvPr id="56" name="Picture 3" descr="C:\Documents and Settings\Lazhar.NB-FARJALLL\Local Settings\Temporary Internet Files\Content.IE5\052DF60R\MC900239921[1].wmf"/>
+            <p:cNvPicPr>
+              <a:picLocks noChangeAspect="1" noChangeArrowheads="1"/>
+            </p:cNvPicPr>
+            <p:nvPr/>
+          </p:nvPicPr>
+          <p:blipFill>
+            <a:blip r:embed="rId3" cstate="print"/>
+            <a:srcRect/>
+            <a:stretch>
+              <a:fillRect/>
+            </a:stretch>
+          </p:blipFill>
+          <p:spPr bwMode="auto">
+            <a:xfrm>
+              <a:off x="7448814" y="1926393"/>
+              <a:ext cx="756230" cy="616201"/>
+            </a:xfrm>
+            <a:prstGeom prst="rect">
+              <a:avLst/>
+            </a:prstGeom>
+            <a:ln>
+              <a:noFill/>
+            </a:ln>
+            <a:effectLst>
+              <a:outerShdw blurRad="292100" dist="139700" dir="2700000" algn="tl" rotWithShape="0">
+                <a:srgbClr val="333333">
+                  <a:alpha val="65000"/>
+                </a:srgbClr>
+              </a:outerShdw>
+            </a:effectLst>
+          </p:spPr>
+        </p:pic>
+        <p:pic>
+          <p:nvPicPr>
+            <p:cNvPr id="57" name="Picture 3" descr="C:\Documents and Settings\Lazhar.NB-FARJALLL\Local Settings\Temporary Internet Files\Content.IE5\052DF60R\MC900239921[1].wmf"/>
+            <p:cNvPicPr>
+              <a:picLocks noChangeAspect="1" noChangeArrowheads="1"/>
+            </p:cNvPicPr>
+            <p:nvPr/>
+          </p:nvPicPr>
+          <p:blipFill>
+            <a:blip r:embed="rId3" cstate="print"/>
+            <a:srcRect/>
+            <a:stretch>
+              <a:fillRect/>
+            </a:stretch>
+          </p:blipFill>
+          <p:spPr bwMode="auto">
+            <a:xfrm>
+              <a:off x="6387648" y="2760855"/>
+              <a:ext cx="756230" cy="616201"/>
+            </a:xfrm>
+            <a:prstGeom prst="rect">
+              <a:avLst/>
+            </a:prstGeom>
+            <a:ln>
+              <a:noFill/>
+            </a:ln>
+            <a:effectLst>
+              <a:outerShdw blurRad="292100" dist="139700" dir="2700000" algn="tl" rotWithShape="0">
+                <a:srgbClr val="333333">
+                  <a:alpha val="65000"/>
+                </a:srgbClr>
+              </a:outerShdw>
+            </a:effectLst>
+          </p:spPr>
+        </p:pic>
+        <p:sp>
+          <p:nvSpPr>
+            <p:cNvPr id="58" name="Ellipse 57"/>
+            <p:cNvSpPr/>
+            <p:nvPr/>
+          </p:nvSpPr>
+          <p:spPr bwMode="auto">
+            <a:xfrm>
+              <a:off x="6044908" y="1492751"/>
+              <a:ext cx="2466976" cy="2368297"/>
+            </a:xfrm>
+            <a:prstGeom prst="ellipse">
+              <a:avLst/>
+            </a:prstGeom>
+            <a:noFill/>
+            <a:ln w="9525" cap="flat" cmpd="sng" algn="ctr">
+              <a:solidFill>
+                <a:schemeClr val="tx1"/>
+              </a:solidFill>
+              <a:prstDash val="solid"/>
+              <a:round/>
+              <a:headEnd type="none" w="med" len="med"/>
+              <a:tailEnd type="none" w="med" len="med"/>
+            </a:ln>
+            <a:effectLst/>
+          </p:spPr>
+          <p:txBody>
+            <a:bodyPr vert="horz" wrap="square" lIns="91440" tIns="45720" rIns="91440" bIns="45720" numCol="1" rtlCol="0" anchor="t" anchorCtr="0" compatLnSpc="1">
+              <a:prstTxWarp prst="textNoShape">
+                <a:avLst/>
+              </a:prstTxWarp>
+            </a:bodyPr>
+            <a:lstStyle/>
+            <a:p>
+              <a:pPr marL="0" marR="0" indent="0" algn="l" defTabSz="914400" rtl="0" eaLnBrk="1" fontAlgn="base" latinLnBrk="0" hangingPunct="1">
+                <a:lnSpc>
+                  <a:spcPct val="100000"/>
+                </a:lnSpc>
+                <a:spcBef>
+                  <a:spcPct val="0"/>
+                </a:spcBef>
+                <a:spcAft>
+                  <a:spcPct val="0"/>
+                </a:spcAft>
+                <a:buClrTx/>
+                <a:buSzTx/>
+                <a:buFontTx/>
+                <a:buNone/>
+                <a:tabLst/>
+              </a:pPr>
+              <a:endParaRPr kumimoji="0" lang="fr-CH" sz="1800" b="0" i="0" u="sng" strike="noStrike" cap="none" normalizeH="0" baseline="0" smtClean="0">
+                <a:ln>
+                  <a:noFill/>
+                </a:ln>
+                <a:solidFill>
+                  <a:schemeClr val="tx1"/>
+                </a:solidFill>
+                <a:effectLst/>
+                <a:latin typeface="Arial" charset="0"/>
+              </a:endParaRPr>
+            </a:p>
+          </p:txBody>
+        </p:sp>
+      </p:grpSp>
+      <p:grpSp>
+        <p:nvGrpSpPr>
+          <p:cNvPr id="59" name="Groupe 58"/>
+          <p:cNvGrpSpPr/>
+          <p:nvPr/>
+        </p:nvGrpSpPr>
+        <p:grpSpPr>
+          <a:xfrm>
+            <a:off x="6696340" y="4562637"/>
+            <a:ext cx="1898266" cy="1822335"/>
+            <a:chOff x="6301958" y="4813087"/>
+            <a:chExt cx="1898266" cy="1822335"/>
+          </a:xfrm>
+        </p:grpSpPr>
+        <p:pic>
+          <p:nvPicPr>
+            <p:cNvPr id="60" name="Picture 3" descr="C:\Documents and Settings\Lazhar.NB-FARJALLL\Local Settings\Temporary Internet Files\Content.IE5\052DF60R\MC900239921[1].wmf"/>
+            <p:cNvPicPr>
+              <a:picLocks noChangeAspect="1" noChangeArrowheads="1"/>
+            </p:cNvPicPr>
+            <p:nvPr/>
+          </p:nvPicPr>
+          <p:blipFill>
+            <a:blip r:embed="rId3" cstate="print"/>
+            <a:srcRect/>
+            <a:stretch>
+              <a:fillRect/>
+            </a:stretch>
+          </p:blipFill>
+          <p:spPr bwMode="auto">
+            <a:xfrm>
+              <a:off x="6466869" y="5625244"/>
+              <a:ext cx="756230" cy="616201"/>
+            </a:xfrm>
+            <a:prstGeom prst="rect">
+              <a:avLst/>
+            </a:prstGeom>
+            <a:ln>
+              <a:noFill/>
+            </a:ln>
+            <a:effectLst>
+              <a:outerShdw blurRad="292100" dist="139700" dir="2700000" algn="tl" rotWithShape="0">
+                <a:srgbClr val="333333">
+                  <a:alpha val="65000"/>
+                </a:srgbClr>
+              </a:outerShdw>
+            </a:effectLst>
+          </p:spPr>
+        </p:pic>
+        <p:pic>
+          <p:nvPicPr>
+            <p:cNvPr id="61" name="Picture 3" descr="C:\Documents and Settings\Lazhar.NB-FARJALLL\Local Settings\Temporary Internet Files\Content.IE5\052DF60R\MC900239921[1].wmf"/>
+            <p:cNvPicPr>
+              <a:picLocks noChangeAspect="1" noChangeArrowheads="1"/>
+            </p:cNvPicPr>
+            <p:nvPr/>
+          </p:nvPicPr>
+          <p:blipFill>
+            <a:blip r:embed="rId3" cstate="print"/>
+            <a:srcRect/>
+            <a:stretch>
+              <a:fillRect/>
+            </a:stretch>
+          </p:blipFill>
+          <p:spPr bwMode="auto">
+            <a:xfrm>
+              <a:off x="6841914" y="5007465"/>
+              <a:ext cx="756230" cy="616201"/>
+            </a:xfrm>
+            <a:prstGeom prst="rect">
+              <a:avLst/>
+            </a:prstGeom>
+            <a:ln>
+              <a:noFill/>
+            </a:ln>
+            <a:effectLst>
+              <a:outerShdw blurRad="292100" dist="139700" dir="2700000" algn="tl" rotWithShape="0">
+                <a:srgbClr val="333333">
+                  <a:alpha val="65000"/>
+                </a:srgbClr>
+              </a:outerShdw>
+            </a:effectLst>
+          </p:spPr>
+        </p:pic>
+        <p:sp>
+          <p:nvSpPr>
+            <p:cNvPr id="62" name="Ellipse 61"/>
+            <p:cNvSpPr/>
+            <p:nvPr/>
+          </p:nvSpPr>
+          <p:spPr bwMode="auto">
+            <a:xfrm>
+              <a:off x="6301958" y="4813087"/>
+              <a:ext cx="1898266" cy="1822335"/>
+            </a:xfrm>
+            <a:prstGeom prst="ellipse">
+              <a:avLst/>
+            </a:prstGeom>
+            <a:noFill/>
+            <a:ln w="9525" cap="flat" cmpd="sng" algn="ctr">
+              <a:solidFill>
+                <a:schemeClr val="tx1"/>
+              </a:solidFill>
+              <a:prstDash val="solid"/>
+              <a:round/>
+              <a:headEnd type="none" w="med" len="med"/>
+              <a:tailEnd type="none" w="med" len="med"/>
+            </a:ln>
+            <a:effectLst/>
+          </p:spPr>
+          <p:txBody>
+            <a:bodyPr vert="horz" wrap="square" lIns="91440" tIns="45720" rIns="91440" bIns="45720" numCol="1" rtlCol="0" anchor="t" anchorCtr="0" compatLnSpc="1">
+              <a:prstTxWarp prst="textNoShape">
+                <a:avLst/>
+              </a:prstTxWarp>
+            </a:bodyPr>
+            <a:lstStyle/>
+            <a:p>
+              <a:pPr marL="0" marR="0" indent="0" algn="l" defTabSz="914400" rtl="0" eaLnBrk="1" fontAlgn="base" latinLnBrk="0" hangingPunct="1">
+                <a:lnSpc>
+                  <a:spcPct val="100000"/>
+                </a:lnSpc>
+                <a:spcBef>
+                  <a:spcPct val="0"/>
+                </a:spcBef>
+                <a:spcAft>
+                  <a:spcPct val="0"/>
+                </a:spcAft>
+                <a:buClrTx/>
+                <a:buSzTx/>
+                <a:buFontTx/>
+                <a:buNone/>
+                <a:tabLst/>
+              </a:pPr>
+              <a:endParaRPr kumimoji="0" lang="fr-CH" sz="1800" b="0" i="0" u="sng" strike="noStrike" cap="none" normalizeH="0" baseline="0" smtClean="0">
+                <a:ln>
+                  <a:noFill/>
+                </a:ln>
+                <a:solidFill>
+                  <a:schemeClr val="tx1"/>
+                </a:solidFill>
+                <a:effectLst/>
+                <a:latin typeface="Arial" charset="0"/>
+              </a:endParaRPr>
+            </a:p>
+          </p:txBody>
+        </p:sp>
+      </p:grpSp>
+      <p:sp>
+        <p:nvSpPr>
+          <p:cNvPr id="63" name="ZoneTexte 62"/>
           <p:cNvSpPr txBox="1"/>
           <p:nvPr/>
         </p:nvSpPr>
         <p:spPr>
           <a:xfrm>
-            <a:off x="847674" y="1492785"/>
-            <a:ext cx="7598617" cy="1477328"/>
+            <a:off x="6587348" y="1304764"/>
+            <a:ext cx="2088232" cy="369332"/>
           </a:xfrm>
           <a:prstGeom prst="rect">
             <a:avLst/>
@@ -13144,27 +13913,484 @@
           </a:bodyPr>
           <a:lstStyle/>
           <a:p>
+            <a:pPr algn="ctr"/>
+            <a:r>
+              <a:rPr lang="fr-CH" u="none" dirty="0" smtClean="0"/>
+              <a:t>Partie 1</a:t>
+            </a:r>
+            <a:endParaRPr lang="fr-CH" u="none" dirty="0"/>
+          </a:p>
+        </p:txBody>
+      </p:sp>
+      <p:sp>
+        <p:nvSpPr>
+          <p:cNvPr id="64" name="ZoneTexte 63"/>
+          <p:cNvSpPr txBox="1"/>
+          <p:nvPr/>
+        </p:nvSpPr>
+        <p:spPr>
+          <a:xfrm>
+            <a:off x="6623352" y="3969060"/>
+            <a:ext cx="2088232" cy="646331"/>
+          </a:xfrm>
+          <a:prstGeom prst="rect">
+            <a:avLst/>
+          </a:prstGeom>
+          <a:noFill/>
+        </p:spPr>
+        <p:txBody>
+          <a:bodyPr wrap="square" rtlCol="0">
+            <a:spAutoFit/>
+          </a:bodyPr>
+          <a:lstStyle/>
+          <a:p>
+            <a:pPr algn="ctr"/>
+            <a:r>
+              <a:rPr lang="fr-CH" u="none" dirty="0" smtClean="0"/>
+              <a:t>…</a:t>
+            </a:r>
+          </a:p>
+          <a:p>
+            <a:pPr algn="ctr"/>
+            <a:r>
+              <a:rPr lang="fr-CH" u="none" dirty="0" smtClean="0"/>
+              <a:t>Partie N</a:t>
+            </a:r>
+            <a:endParaRPr lang="fr-CH" u="none" dirty="0"/>
+          </a:p>
+        </p:txBody>
+      </p:sp>
+      <p:pic>
+        <p:nvPicPr>
+          <p:cNvPr id="65" name="Picture 3" descr="C:\Documents and Settings\Lazhar.NB-FARJALLL\Local Settings\Temporary Internet Files\Content.IE5\052DF60R\MC900239921[1].wmf"/>
+          <p:cNvPicPr>
+            <a:picLocks noChangeAspect="1" noChangeArrowheads="1"/>
+          </p:cNvPicPr>
+          <p:nvPr/>
+        </p:nvPicPr>
+        <p:blipFill>
+          <a:blip r:embed="rId3" cstate="print"/>
+          <a:srcRect/>
+          <a:stretch>
+            <a:fillRect/>
+          </a:stretch>
+        </p:blipFill>
+        <p:spPr bwMode="auto">
+          <a:xfrm>
+            <a:off x="4081900" y="5393797"/>
+            <a:ext cx="756230" cy="616201"/>
+          </a:xfrm>
+          <a:prstGeom prst="rect">
+            <a:avLst/>
+          </a:prstGeom>
+          <a:ln>
+            <a:noFill/>
+          </a:ln>
+          <a:effectLst>
+            <a:outerShdw blurRad="292100" dist="139700" dir="2700000" algn="tl" rotWithShape="0">
+              <a:srgbClr val="333333">
+                <a:alpha val="65000"/>
+              </a:srgbClr>
+            </a:outerShdw>
+          </a:effectLst>
+        </p:spPr>
+      </p:pic>
+      <p:sp>
+        <p:nvSpPr>
+          <p:cNvPr id="66" name="ZoneTexte 65"/>
+          <p:cNvSpPr txBox="1"/>
+          <p:nvPr/>
+        </p:nvSpPr>
+        <p:spPr>
+          <a:xfrm>
+            <a:off x="3418996" y="5085184"/>
+            <a:ext cx="2088232" cy="369332"/>
+          </a:xfrm>
+          <a:prstGeom prst="rect">
+            <a:avLst/>
+          </a:prstGeom>
+          <a:noFill/>
+        </p:spPr>
+        <p:txBody>
+          <a:bodyPr wrap="square" rtlCol="0">
+            <a:spAutoFit/>
+          </a:bodyPr>
+          <a:lstStyle/>
+          <a:p>
+            <a:pPr algn="ctr"/>
+            <a:r>
+              <a:rPr lang="fr-CH" u="none" dirty="0" smtClean="0"/>
+              <a:t>Joueur X</a:t>
+            </a:r>
+            <a:endParaRPr lang="fr-CH" u="none" dirty="0"/>
+          </a:p>
+        </p:txBody>
+      </p:sp>
+      <p:cxnSp>
+        <p:nvCxnSpPr>
+          <p:cNvPr id="67" name="Connecteur droit avec flèche 66"/>
+          <p:cNvCxnSpPr/>
+          <p:nvPr/>
+        </p:nvCxnSpPr>
+        <p:spPr bwMode="auto">
+          <a:xfrm rot="16200000" flipV="1">
+            <a:off x="3710221" y="4225061"/>
+            <a:ext cx="1435369" cy="3"/>
+          </a:xfrm>
+          <a:prstGeom prst="straightConnector1">
+            <a:avLst/>
+          </a:prstGeom>
+          <a:solidFill>
+            <a:schemeClr val="accent1"/>
+          </a:solidFill>
+          <a:ln w="9525" cap="flat" cmpd="sng" algn="ctr">
+            <a:solidFill>
+              <a:schemeClr val="tx1"/>
+            </a:solidFill>
+            <a:prstDash val="solid"/>
+            <a:round/>
+            <a:headEnd type="none" w="med" len="med"/>
+            <a:tailEnd type="arrow"/>
+          </a:ln>
+          <a:effectLst/>
+        </p:spPr>
+      </p:cxnSp>
+      <p:sp>
+        <p:nvSpPr>
+          <p:cNvPr id="68" name="ZoneTexte 67"/>
+          <p:cNvSpPr txBox="1"/>
+          <p:nvPr/>
+        </p:nvSpPr>
+        <p:spPr>
+          <a:xfrm>
+            <a:off x="3671900" y="4067780"/>
+            <a:ext cx="2088232" cy="369332"/>
+          </a:xfrm>
+          <a:prstGeom prst="rect">
+            <a:avLst/>
+          </a:prstGeom>
+          <a:noFill/>
+        </p:spPr>
+        <p:txBody>
+          <a:bodyPr wrap="square" rtlCol="0">
+            <a:spAutoFit/>
+          </a:bodyPr>
+          <a:lstStyle/>
+          <a:p>
+            <a:pPr algn="ctr"/>
+            <a:r>
+              <a:rPr lang="fr-CH" u="none" dirty="0" smtClean="0"/>
+              <a:t>???</a:t>
+            </a:r>
+            <a:endParaRPr lang="fr-CH" u="none" dirty="0"/>
+          </a:p>
+        </p:txBody>
+      </p:sp>
+      <p:sp>
+        <p:nvSpPr>
+          <p:cNvPr id="69" name="Ellipse 68"/>
+          <p:cNvSpPr/>
+          <p:nvPr/>
+        </p:nvSpPr>
+        <p:spPr bwMode="auto">
+          <a:xfrm>
+            <a:off x="7746225" y="5373216"/>
+            <a:ext cx="636617" cy="636617"/>
+          </a:xfrm>
+          <a:prstGeom prst="ellipse">
+            <a:avLst/>
+          </a:prstGeom>
+          <a:noFill/>
+          <a:ln w="9525" cap="flat" cmpd="sng" algn="ctr">
+            <a:solidFill>
+              <a:schemeClr val="tx1"/>
+            </a:solidFill>
+            <a:prstDash val="dash"/>
+            <a:round/>
+            <a:headEnd type="none" w="med" len="med"/>
+            <a:tailEnd type="none" w="med" len="med"/>
+          </a:ln>
+          <a:effectLst/>
+        </p:spPr>
+        <p:txBody>
+          <a:bodyPr vert="horz" wrap="square" lIns="91440" tIns="45720" rIns="91440" bIns="45720" numCol="1" rtlCol="0" anchor="t" anchorCtr="0" compatLnSpc="1">
+            <a:prstTxWarp prst="textNoShape">
+              <a:avLst/>
+            </a:prstTxWarp>
+          </a:bodyPr>
+          <a:lstStyle/>
+          <a:p>
+            <a:pPr marL="0" marR="0" indent="0" algn="l" defTabSz="914400" rtl="0" eaLnBrk="1" fontAlgn="base" latinLnBrk="0" hangingPunct="1">
+              <a:lnSpc>
+                <a:spcPct val="100000"/>
+              </a:lnSpc>
+              <a:spcBef>
+                <a:spcPct val="0"/>
+              </a:spcBef>
+              <a:spcAft>
+                <a:spcPct val="0"/>
+              </a:spcAft>
+              <a:buClrTx/>
+              <a:buSzTx/>
+              <a:buFontTx/>
+              <a:buNone/>
+              <a:tabLst/>
+            </a:pPr>
+            <a:endParaRPr kumimoji="0" lang="fr-CH" sz="1800" b="0" i="0" u="sng" strike="noStrike" cap="none" normalizeH="0" baseline="0" smtClean="0">
+              <a:ln>
+                <a:noFill/>
+              </a:ln>
+              <a:solidFill>
+                <a:schemeClr val="tx1"/>
+              </a:solidFill>
+              <a:effectLst/>
+              <a:latin typeface="Arial" charset="0"/>
+            </a:endParaRPr>
+          </a:p>
+        </p:txBody>
+      </p:sp>
+      <p:sp>
+        <p:nvSpPr>
+          <p:cNvPr id="70" name="Ellipse 69"/>
+          <p:cNvSpPr/>
+          <p:nvPr/>
+        </p:nvSpPr>
+        <p:spPr bwMode="auto">
+          <a:xfrm>
+            <a:off x="7776356" y="2936399"/>
+            <a:ext cx="636617" cy="636617"/>
+          </a:xfrm>
+          <a:prstGeom prst="ellipse">
+            <a:avLst/>
+          </a:prstGeom>
+          <a:noFill/>
+          <a:ln w="9525" cap="flat" cmpd="sng" algn="ctr">
+            <a:solidFill>
+              <a:schemeClr val="tx1"/>
+            </a:solidFill>
+            <a:prstDash val="dash"/>
+            <a:round/>
+            <a:headEnd type="none" w="med" len="med"/>
+            <a:tailEnd type="none" w="med" len="med"/>
+          </a:ln>
+          <a:effectLst/>
+        </p:spPr>
+        <p:txBody>
+          <a:bodyPr vert="horz" wrap="square" lIns="91440" tIns="45720" rIns="91440" bIns="45720" numCol="1" rtlCol="0" anchor="t" anchorCtr="0" compatLnSpc="1">
+            <a:prstTxWarp prst="textNoShape">
+              <a:avLst/>
+            </a:prstTxWarp>
+          </a:bodyPr>
+          <a:lstStyle/>
+          <a:p>
+            <a:pPr marL="0" marR="0" indent="0" algn="l" defTabSz="914400" rtl="0" eaLnBrk="1" fontAlgn="base" latinLnBrk="0" hangingPunct="1">
+              <a:lnSpc>
+                <a:spcPct val="100000"/>
+              </a:lnSpc>
+              <a:spcBef>
+                <a:spcPct val="0"/>
+              </a:spcBef>
+              <a:spcAft>
+                <a:spcPct val="0"/>
+              </a:spcAft>
+              <a:buClrTx/>
+              <a:buSzTx/>
+              <a:buFontTx/>
+              <a:buNone/>
+              <a:tabLst/>
+            </a:pPr>
+            <a:endParaRPr kumimoji="0" lang="fr-CH" sz="1800" b="0" i="0" u="sng" strike="noStrike" cap="none" normalizeH="0" baseline="0" smtClean="0">
+              <a:ln>
+                <a:noFill/>
+              </a:ln>
+              <a:solidFill>
+                <a:schemeClr val="tx1"/>
+              </a:solidFill>
+              <a:effectLst/>
+              <a:latin typeface="Arial" charset="0"/>
+            </a:endParaRPr>
+          </a:p>
+        </p:txBody>
+      </p:sp>
+      <p:sp>
+        <p:nvSpPr>
+          <p:cNvPr id="71" name="ZoneTexte 70"/>
+          <p:cNvSpPr txBox="1"/>
+          <p:nvPr/>
+        </p:nvSpPr>
+        <p:spPr>
+          <a:xfrm>
+            <a:off x="467544" y="1412776"/>
+            <a:ext cx="3515786" cy="4907818"/>
+          </a:xfrm>
+          <a:prstGeom prst="rect">
+            <a:avLst/>
+          </a:prstGeom>
+          <a:noFill/>
+        </p:spPr>
+        <p:txBody>
+          <a:bodyPr wrap="square" rtlCol="0">
+            <a:spAutoFit/>
+          </a:bodyPr>
+          <a:lstStyle/>
+          <a:p>
             <a:pPr>
               <a:lnSpc>
-                <a:spcPct val="250000"/>
+                <a:spcPts val="3800"/>
               </a:lnSpc>
+              <a:buFont typeface="Arial" pitchFamily="34" charset="0"/>
+              <a:buChar char="•"/>
             </a:pPr>
             <a:r>
-              <a:rPr lang="fr-CH" u="none" dirty="0" err="1" smtClean="0"/>
-              <a:t>Lazhar</a:t>
-            </a:r>
-            <a:endParaRPr lang="fr-CH" u="none" dirty="0" smtClean="0"/>
+              <a:rPr lang="fr-CH" sz="2800" u="none" dirty="0" smtClean="0"/>
+              <a:t>  Transparent</a:t>
+            </a:r>
           </a:p>
           <a:p>
             <a:pPr>
               <a:lnSpc>
-                <a:spcPct val="250000"/>
+                <a:spcPts val="3800"/>
               </a:lnSpc>
+              <a:buFont typeface="Arial" pitchFamily="34" charset="0"/>
+              <a:buChar char="•"/>
             </a:pPr>
-            <a:endParaRPr lang="fr-CH" i="1" u="none" dirty="0"/>
-          </a:p>
-        </p:txBody>
-      </p:sp>
+            <a:r>
+              <a:rPr lang="fr-CH" sz="2800" u="none" dirty="0" smtClean="0"/>
+              <a:t>  Simple</a:t>
+            </a:r>
+          </a:p>
+          <a:p>
+            <a:pPr>
+              <a:lnSpc>
+                <a:spcPts val="3800"/>
+              </a:lnSpc>
+              <a:buFont typeface="Arial" pitchFamily="34" charset="0"/>
+              <a:buChar char="•"/>
+            </a:pPr>
+            <a:r>
+              <a:rPr lang="fr-CH" sz="2800" u="none" dirty="0" smtClean="0"/>
+              <a:t>  Interactif</a:t>
+            </a:r>
+          </a:p>
+          <a:p>
+            <a:pPr>
+              <a:lnSpc>
+                <a:spcPts val="3800"/>
+              </a:lnSpc>
+              <a:buFont typeface="Arial" pitchFamily="34" charset="0"/>
+              <a:buChar char="•"/>
+            </a:pPr>
+            <a:r>
+              <a:rPr lang="fr-CH" sz="2800" u="none" dirty="0" smtClean="0"/>
+              <a:t>  Portable</a:t>
+            </a:r>
+          </a:p>
+          <a:p>
+            <a:pPr>
+              <a:lnSpc>
+                <a:spcPts val="3800"/>
+              </a:lnSpc>
+              <a:buFont typeface="Arial" pitchFamily="34" charset="0"/>
+              <a:buChar char="•"/>
+            </a:pPr>
+            <a:r>
+              <a:rPr lang="fr-CH" sz="2800" u="none" dirty="0" smtClean="0"/>
+              <a:t>  Léger</a:t>
+            </a:r>
+          </a:p>
+          <a:p>
+            <a:pPr>
+              <a:lnSpc>
+                <a:spcPts val="3800"/>
+              </a:lnSpc>
+              <a:buFont typeface="Arial" pitchFamily="34" charset="0"/>
+              <a:buChar char="•"/>
+            </a:pPr>
+            <a:r>
+              <a:rPr lang="fr-CH" sz="2800" u="none" dirty="0" smtClean="0"/>
+              <a:t>  Evolutif</a:t>
+            </a:r>
+          </a:p>
+          <a:p>
+            <a:pPr>
+              <a:lnSpc>
+                <a:spcPts val="3800"/>
+              </a:lnSpc>
+              <a:buFont typeface="Arial" pitchFamily="34" charset="0"/>
+              <a:buChar char="•"/>
+            </a:pPr>
+            <a:r>
+              <a:rPr lang="fr-CH" sz="2800" u="none" dirty="0" smtClean="0"/>
+              <a:t>  Mobile</a:t>
+            </a:r>
+          </a:p>
+          <a:p>
+            <a:pPr>
+              <a:lnSpc>
+                <a:spcPts val="3800"/>
+              </a:lnSpc>
+              <a:buFont typeface="Arial" pitchFamily="34" charset="0"/>
+              <a:buChar char="•"/>
+            </a:pPr>
+            <a:r>
+              <a:rPr lang="fr-CH" sz="2800" u="none" dirty="0" smtClean="0"/>
+              <a:t>  Décentralisé</a:t>
+            </a:r>
+          </a:p>
+          <a:p>
+            <a:pPr>
+              <a:lnSpc>
+                <a:spcPts val="3800"/>
+              </a:lnSpc>
+              <a:buFont typeface="Arial" pitchFamily="34" charset="0"/>
+              <a:buChar char="•"/>
+            </a:pPr>
+            <a:r>
+              <a:rPr lang="fr-CH" sz="2800" u="none" dirty="0" smtClean="0"/>
+              <a:t>  Visible</a:t>
+            </a:r>
+          </a:p>
+          <a:p>
+            <a:pPr>
+              <a:lnSpc>
+                <a:spcPts val="3800"/>
+              </a:lnSpc>
+              <a:buFont typeface="Arial" pitchFamily="34" charset="0"/>
+              <a:buChar char="•"/>
+            </a:pPr>
+            <a:r>
+              <a:rPr lang="fr-CH" sz="2800" u="none" dirty="0" smtClean="0"/>
+              <a:t>  Commun</a:t>
+            </a:r>
+          </a:p>
+        </p:txBody>
+      </p:sp>
+      <p:pic>
+        <p:nvPicPr>
+          <p:cNvPr id="72" name="Image 61" descr="araignee.png"/>
+          <p:cNvPicPr>
+            <a:picLocks noChangeAspect="1" noChangeArrowheads="1"/>
+          </p:cNvPicPr>
+          <p:nvPr/>
+        </p:nvPicPr>
+        <p:blipFill>
+          <a:blip r:embed="rId4" cstate="print"/>
+          <a:srcRect/>
+          <a:stretch>
+            <a:fillRect/>
+          </a:stretch>
+        </p:blipFill>
+        <p:spPr bwMode="auto">
+          <a:xfrm>
+            <a:off x="4497755" y="2056374"/>
+            <a:ext cx="110249" cy="110249"/>
+          </a:xfrm>
+          <a:prstGeom prst="rect">
+            <a:avLst/>
+          </a:prstGeom>
+          <a:noFill/>
+        </p:spPr>
+      </p:pic>
     </p:spTree>
   </p:cSld>
   <p:clrMapOvr>
@@ -13284,7 +14510,7 @@
                   </a:schemeClr>
                 </a:solidFill>
               </a:rPr>
-              <a:t>/13</a:t>
+              <a:t>/12</a:t>
             </a:r>
             <a:endParaRPr lang="fr-FR" dirty="0">
               <a:solidFill>

</xml_diff>

<commit_message>
Tentative d'intégration dans la présentation finale.
</commit_message>
<xml_diff>
--- a/documents/v2.0/Presentation.pptx
+++ b/documents/v2.0/Presentation.pptx
@@ -5,7 +5,7 @@
     <p:sldMasterId id="2147483648" r:id="rId1"/>
   </p:sldMasterIdLst>
   <p:notesMasterIdLst>
-    <p:notesMasterId r:id="rId14"/>
+    <p:notesMasterId r:id="rId15"/>
   </p:notesMasterIdLst>
   <p:sldIdLst>
     <p:sldId id="256" r:id="rId2"/>
@@ -16,10 +16,11 @@
     <p:sldId id="266" r:id="rId7"/>
     <p:sldId id="267" r:id="rId8"/>
     <p:sldId id="269" r:id="rId9"/>
-    <p:sldId id="275" r:id="rId10"/>
-    <p:sldId id="270" r:id="rId11"/>
-    <p:sldId id="268" r:id="rId12"/>
-    <p:sldId id="264" r:id="rId13"/>
+    <p:sldId id="277" r:id="rId10"/>
+    <p:sldId id="278" r:id="rId11"/>
+    <p:sldId id="270" r:id="rId12"/>
+    <p:sldId id="268" r:id="rId13"/>
+    <p:sldId id="264" r:id="rId14"/>
   </p:sldIdLst>
   <p:sldSz cx="9144000" cy="6858000" type="screen4x3"/>
   <p:notesSz cx="6797675" cy="9874250"/>
@@ -651,6 +652,88 @@
               <a:rPr lang="fr-CH" smtClean="0"/>
               <a:pPr/>
               <a:t>9</a:t>
+            </a:fld>
+            <a:endParaRPr lang="fr-CH"/>
+          </a:p>
+        </p:txBody>
+      </p:sp>
+    </p:spTree>
+  </p:cSld>
+  <p:clrMapOvr>
+    <a:masterClrMapping/>
+  </p:clrMapOvr>
+</p:notes>
+</file>
+
+<file path=ppt/notesSlides/notesSlide3.xml><?xml version="1.0" encoding="utf-8"?>
+<p:notes xmlns:a="http://schemas.openxmlformats.org/drawingml/2006/main" xmlns:r="http://schemas.openxmlformats.org/officeDocument/2006/relationships" xmlns:p="http://schemas.openxmlformats.org/presentationml/2006/main">
+  <p:cSld>
+    <p:spTree>
+      <p:nvGrpSpPr>
+        <p:cNvPr id="1" name=""/>
+        <p:cNvGrpSpPr/>
+        <p:nvPr/>
+      </p:nvGrpSpPr>
+      <p:grpSpPr>
+        <a:xfrm>
+          <a:off x="0" y="0"/>
+          <a:ext cx="0" cy="0"/>
+          <a:chOff x="0" y="0"/>
+          <a:chExt cx="0" cy="0"/>
+        </a:xfrm>
+      </p:grpSpPr>
+      <p:sp>
+        <p:nvSpPr>
+          <p:cNvPr id="2" name="Espace réservé de l'image des diapositives 1"/>
+          <p:cNvSpPr>
+            <a:spLocks noGrp="1" noRot="1" noChangeAspect="1"/>
+          </p:cNvSpPr>
+          <p:nvPr>
+            <p:ph type="sldImg"/>
+          </p:nvPr>
+        </p:nvSpPr>
+        <p:spPr/>
+      </p:sp>
+      <p:sp>
+        <p:nvSpPr>
+          <p:cNvPr id="3" name="Espace réservé des commentaires 2"/>
+          <p:cNvSpPr>
+            <a:spLocks noGrp="1"/>
+          </p:cNvSpPr>
+          <p:nvPr>
+            <p:ph type="body" idx="1"/>
+          </p:nvPr>
+        </p:nvSpPr>
+        <p:spPr/>
+        <p:txBody>
+          <a:bodyPr>
+            <a:normAutofit/>
+          </a:bodyPr>
+          <a:lstStyle/>
+          <a:p>
+            <a:endParaRPr lang="fr-CH" dirty="0"/>
+          </a:p>
+        </p:txBody>
+      </p:sp>
+      <p:sp>
+        <p:nvSpPr>
+          <p:cNvPr id="4" name="Espace réservé du numéro de diapositive 3"/>
+          <p:cNvSpPr>
+            <a:spLocks noGrp="1"/>
+          </p:cNvSpPr>
+          <p:nvPr>
+            <p:ph type="sldNum" sz="quarter" idx="10"/>
+          </p:nvPr>
+        </p:nvSpPr>
+        <p:spPr/>
+        <p:txBody>
+          <a:bodyPr/>
+          <a:lstStyle/>
+          <a:p>
+            <a:fld id="{BA64795F-8A88-462F-B7DA-E81DC07A4301}" type="slidenum">
+              <a:rPr lang="fr-CH" smtClean="0"/>
+              <a:pPr/>
+              <a:t>10</a:t>
             </a:fld>
             <a:endParaRPr lang="fr-CH"/>
           </a:p>
@@ -4864,9 +4947,251 @@
           <a:chExt cx="0" cy="0"/>
         </a:xfrm>
       </p:grpSpPr>
-      <p:sp>
-        <p:nvSpPr>
-          <p:cNvPr id="14" name="Rectangle 4"/>
+      <p:grpSp>
+        <p:nvGrpSpPr>
+          <p:cNvPr id="2" name="Groupe 23"/>
+          <p:cNvGrpSpPr/>
+          <p:nvPr/>
+        </p:nvGrpSpPr>
+        <p:grpSpPr>
+          <a:xfrm>
+            <a:off x="1043608" y="1881052"/>
+            <a:ext cx="1116124" cy="530275"/>
+            <a:chOff x="827584" y="2240868"/>
+            <a:chExt cx="1116124" cy="530275"/>
+          </a:xfrm>
+        </p:grpSpPr>
+        <p:sp>
+          <p:nvSpPr>
+            <p:cNvPr id="22" name="Flèche droite 21"/>
+            <p:cNvSpPr/>
+            <p:nvPr/>
+          </p:nvSpPr>
+          <p:spPr bwMode="auto">
+            <a:xfrm>
+              <a:off x="827584" y="2240868"/>
+              <a:ext cx="1116124" cy="251916"/>
+            </a:xfrm>
+            <a:prstGeom prst="rightArrow">
+              <a:avLst/>
+            </a:prstGeom>
+            <a:solidFill>
+              <a:schemeClr val="accent1"/>
+            </a:solidFill>
+            <a:ln w="9525" cap="flat" cmpd="sng" algn="ctr">
+              <a:solidFill>
+                <a:schemeClr val="tx1"/>
+              </a:solidFill>
+              <a:prstDash val="solid"/>
+              <a:round/>
+              <a:headEnd type="none" w="med" len="med"/>
+              <a:tailEnd type="none" w="med" len="med"/>
+            </a:ln>
+            <a:effectLst/>
+          </p:spPr>
+          <p:txBody>
+            <a:bodyPr vert="horz" wrap="square" lIns="91440" tIns="45720" rIns="91440" bIns="45720" numCol="1" rtlCol="0" anchor="t" anchorCtr="0" compatLnSpc="1">
+              <a:prstTxWarp prst="textNoShape">
+                <a:avLst/>
+              </a:prstTxWarp>
+            </a:bodyPr>
+            <a:lstStyle/>
+            <a:p>
+              <a:pPr marL="0" marR="0" indent="0" algn="l" defTabSz="914400" rtl="0" eaLnBrk="1" fontAlgn="base" latinLnBrk="0" hangingPunct="1">
+                <a:lnSpc>
+                  <a:spcPct val="100000"/>
+                </a:lnSpc>
+                <a:spcBef>
+                  <a:spcPct val="0"/>
+                </a:spcBef>
+                <a:spcAft>
+                  <a:spcPct val="0"/>
+                </a:spcAft>
+                <a:buClrTx/>
+                <a:buSzTx/>
+                <a:buFontTx/>
+                <a:buNone/>
+                <a:tabLst/>
+              </a:pPr>
+              <a:endParaRPr kumimoji="0" lang="fr-CH" sz="1800" b="0" i="0" u="sng" strike="noStrike" cap="none" normalizeH="0" baseline="0" smtClean="0">
+                <a:ln>
+                  <a:noFill/>
+                </a:ln>
+                <a:solidFill>
+                  <a:schemeClr val="tx1"/>
+                </a:solidFill>
+                <a:effectLst/>
+                <a:latin typeface="Arial" charset="0"/>
+              </a:endParaRPr>
+            </a:p>
+          </p:txBody>
+        </p:sp>
+        <p:sp>
+          <p:nvSpPr>
+            <p:cNvPr id="23" name="Flèche droite 22"/>
+            <p:cNvSpPr/>
+            <p:nvPr/>
+          </p:nvSpPr>
+          <p:spPr bwMode="auto">
+            <a:xfrm rot="10800000">
+              <a:off x="827584" y="2519227"/>
+              <a:ext cx="1116124" cy="251916"/>
+            </a:xfrm>
+            <a:prstGeom prst="rightArrow">
+              <a:avLst/>
+            </a:prstGeom>
+            <a:solidFill>
+              <a:schemeClr val="accent1"/>
+            </a:solidFill>
+            <a:ln w="9525" cap="flat" cmpd="sng" algn="ctr">
+              <a:solidFill>
+                <a:schemeClr val="tx1"/>
+              </a:solidFill>
+              <a:prstDash val="solid"/>
+              <a:round/>
+              <a:headEnd type="none" w="med" len="med"/>
+              <a:tailEnd type="none" w="med" len="med"/>
+            </a:ln>
+            <a:effectLst/>
+          </p:spPr>
+          <p:txBody>
+            <a:bodyPr vert="horz" wrap="square" lIns="91440" tIns="45720" rIns="91440" bIns="45720" numCol="1" rtlCol="0" anchor="t" anchorCtr="0" compatLnSpc="1">
+              <a:prstTxWarp prst="textNoShape">
+                <a:avLst/>
+              </a:prstTxWarp>
+            </a:bodyPr>
+            <a:lstStyle/>
+            <a:p>
+              <a:pPr marL="0" marR="0" indent="0" algn="l" defTabSz="914400" rtl="0" eaLnBrk="1" fontAlgn="base" latinLnBrk="0" hangingPunct="1">
+                <a:lnSpc>
+                  <a:spcPct val="100000"/>
+                </a:lnSpc>
+                <a:spcBef>
+                  <a:spcPct val="0"/>
+                </a:spcBef>
+                <a:spcAft>
+                  <a:spcPct val="0"/>
+                </a:spcAft>
+                <a:buClrTx/>
+                <a:buSzTx/>
+                <a:buFontTx/>
+                <a:buNone/>
+                <a:tabLst/>
+              </a:pPr>
+              <a:endParaRPr kumimoji="0" lang="fr-CH" sz="1800" b="0" i="0" u="sng" strike="noStrike" cap="none" normalizeH="0" baseline="0" smtClean="0">
+                <a:ln>
+                  <a:noFill/>
+                </a:ln>
+                <a:solidFill>
+                  <a:schemeClr val="tx1"/>
+                </a:solidFill>
+                <a:effectLst/>
+                <a:latin typeface="Arial" charset="0"/>
+              </a:endParaRPr>
+            </a:p>
+          </p:txBody>
+        </p:sp>
+      </p:grpSp>
+      <p:sp>
+        <p:nvSpPr>
+          <p:cNvPr id="4" name="Espace réservé de la date 3"/>
+          <p:cNvSpPr>
+            <a:spLocks noGrp="1"/>
+          </p:cNvSpPr>
+          <p:nvPr>
+            <p:ph type="dt" sz="half" idx="10"/>
+          </p:nvPr>
+        </p:nvSpPr>
+        <p:spPr>
+          <a:xfrm>
+            <a:off x="457200" y="6384972"/>
+            <a:ext cx="2133600" cy="476250"/>
+          </a:xfrm>
+        </p:spPr>
+        <p:txBody>
+          <a:bodyPr/>
+          <a:lstStyle/>
+          <a:p>
+            <a:fld id="{DE3EECC3-BAC3-4A29-8636-7743FF9A3806}" type="datetime1">
+              <a:rPr lang="fr-CH" smtClean="0">
+                <a:solidFill>
+                  <a:schemeClr val="tx1">
+                    <a:lumMod val="65000"/>
+                    <a:lumOff val="35000"/>
+                  </a:schemeClr>
+                </a:solidFill>
+              </a:rPr>
+              <a:pPr/>
+              <a:t>11.06.2010</a:t>
+            </a:fld>
+            <a:endParaRPr lang="fr-FR" dirty="0">
+              <a:solidFill>
+                <a:schemeClr val="tx1">
+                  <a:lumMod val="65000"/>
+                  <a:lumOff val="35000"/>
+                </a:schemeClr>
+              </a:solidFill>
+            </a:endParaRPr>
+          </a:p>
+        </p:txBody>
+      </p:sp>
+      <p:sp>
+        <p:nvSpPr>
+          <p:cNvPr id="6" name="Espace réservé du numéro de diapositive 5"/>
+          <p:cNvSpPr>
+            <a:spLocks noGrp="1"/>
+          </p:cNvSpPr>
+          <p:nvPr>
+            <p:ph type="sldNum" sz="quarter" idx="12"/>
+          </p:nvPr>
+        </p:nvSpPr>
+        <p:spPr>
+          <a:xfrm>
+            <a:off x="6553200" y="6384972"/>
+            <a:ext cx="2133600" cy="476250"/>
+          </a:xfrm>
+        </p:spPr>
+        <p:txBody>
+          <a:bodyPr/>
+          <a:lstStyle/>
+          <a:p>
+            <a:fld id="{420F5742-7484-4AFF-BE5C-C36DF30CE89D}" type="slidenum">
+              <a:rPr lang="fr-FR" smtClean="0">
+                <a:solidFill>
+                  <a:schemeClr val="tx1">
+                    <a:lumMod val="65000"/>
+                    <a:lumOff val="35000"/>
+                  </a:schemeClr>
+                </a:solidFill>
+              </a:rPr>
+              <a:pPr/>
+              <a:t>10</a:t>
+            </a:fld>
+            <a:r>
+              <a:rPr lang="fr-FR" dirty="0" smtClean="0">
+                <a:solidFill>
+                  <a:schemeClr val="tx1">
+                    <a:lumMod val="65000"/>
+                    <a:lumOff val="35000"/>
+                  </a:schemeClr>
+                </a:solidFill>
+              </a:rPr>
+              <a:t>/13</a:t>
+            </a:r>
+            <a:endParaRPr lang="fr-FR" dirty="0">
+              <a:solidFill>
+                <a:schemeClr val="tx1">
+                  <a:lumMod val="65000"/>
+                  <a:lumOff val="35000"/>
+                </a:schemeClr>
+              </a:solidFill>
+            </a:endParaRPr>
+          </a:p>
+        </p:txBody>
+      </p:sp>
+      <p:sp>
+        <p:nvSpPr>
+          <p:cNvPr id="7" name="Rectangle 4"/>
           <p:cNvSpPr>
             <a:spLocks noChangeArrowheads="1"/>
           </p:cNvSpPr>
@@ -4909,7 +5234,7 @@
       </p:sp>
       <p:sp>
         <p:nvSpPr>
-          <p:cNvPr id="17" name="Rectangle 13"/>
+          <p:cNvPr id="8" name="Rectangle 33"/>
           <p:cNvSpPr>
             <a:spLocks noChangeArrowheads="1"/>
           </p:cNvSpPr>
@@ -4954,7 +5279,67 @@
       </p:sp>
       <p:sp>
         <p:nvSpPr>
-          <p:cNvPr id="18" name="Rectangle 14"/>
+          <p:cNvPr id="11" name="Text Box 5"/>
+          <p:cNvSpPr txBox="1">
+            <a:spLocks noChangeArrowheads="1"/>
+          </p:cNvSpPr>
+          <p:nvPr/>
+        </p:nvSpPr>
+        <p:spPr bwMode="auto">
+          <a:xfrm>
+            <a:off x="0" y="381000"/>
+            <a:ext cx="9144000" cy="396875"/>
+          </a:xfrm>
+          <a:prstGeom prst="rect">
+            <a:avLst/>
+          </a:prstGeom>
+          <a:noFill/>
+          <a:ln w="9525">
+            <a:noFill/>
+            <a:miter lim="800000"/>
+            <a:headEnd/>
+            <a:tailEnd/>
+          </a:ln>
+          <a:effectLst/>
+        </p:spPr>
+        <p:txBody>
+          <a:bodyPr>
+            <a:spAutoFit/>
+          </a:bodyPr>
+          <a:lstStyle/>
+          <a:p>
+            <a:pPr algn="ctr"/>
+            <a:r>
+              <a:rPr lang="fr-FR" sz="2000" b="1" u="none" dirty="0" smtClean="0">
+                <a:solidFill>
+                  <a:schemeClr val="bg1"/>
+                </a:solidFill>
+                <a:effectLst>
+                  <a:outerShdw blurRad="38100" dist="38100" dir="2700000" algn="tl">
+                    <a:srgbClr val="C0C0C0"/>
+                  </a:outerShdw>
+                </a:effectLst>
+                <a:latin typeface="Trebuchet MS" pitchFamily="34" charset="0"/>
+              </a:rPr>
+              <a:t>CLIENT / SERVEUR</a:t>
+            </a:r>
+            <a:endParaRPr lang="fr-FR" sz="2000" b="1" u="none" dirty="0">
+              <a:solidFill>
+                <a:schemeClr val="bg1"/>
+              </a:solidFill>
+              <a:effectLst>
+                <a:outerShdw blurRad="38100" dist="38100" dir="2700000" algn="tl">
+                  <a:srgbClr val="C0C0C0"/>
+                </a:outerShdw>
+              </a:effectLst>
+              <a:latin typeface="Trebuchet MS" pitchFamily="34" charset="0"/>
+            </a:endParaRPr>
+          </a:p>
+        </p:txBody>
+      </p:sp>
+      <p:sp>
+        <p:nvSpPr>
+          <p:cNvPr id="104" name="Rectangle 34"/>
           <p:cNvSpPr>
             <a:spLocks noChangeArrowheads="1"/>
           </p:cNvSpPr>
@@ -4962,7 +5347,7 @@
         </p:nvSpPr>
         <p:spPr bwMode="auto">
           <a:xfrm>
-            <a:off x="0" y="6629400"/>
+            <a:off x="0" y="6632622"/>
             <a:ext cx="9144000" cy="228600"/>
           </a:xfrm>
           <a:prstGeom prst="rect">
@@ -4999,6 +5384,634 @@
       </p:sp>
       <p:sp>
         <p:nvSpPr>
+          <p:cNvPr id="105" name="Espace réservé du pied de page 13"/>
+          <p:cNvSpPr>
+            <a:spLocks noGrp="1"/>
+          </p:cNvSpPr>
+          <p:nvPr>
+            <p:ph type="ftr" sz="quarter" idx="11"/>
+          </p:nvPr>
+        </p:nvSpPr>
+        <p:spPr>
+          <a:xfrm>
+            <a:off x="3124200" y="6384972"/>
+            <a:ext cx="2895600" cy="476250"/>
+          </a:xfrm>
+        </p:spPr>
+        <p:txBody>
+          <a:bodyPr/>
+          <a:lstStyle/>
+          <a:p>
+            <a:r>
+              <a:rPr lang="fr-FR" dirty="0" smtClean="0">
+                <a:solidFill>
+                  <a:schemeClr val="tx1">
+                    <a:lumMod val="65000"/>
+                    <a:lumOff val="35000"/>
+                  </a:schemeClr>
+                </a:solidFill>
+              </a:rPr>
+              <a:t>ADO – PPZ – LFH – RPN</a:t>
+            </a:r>
+          </a:p>
+        </p:txBody>
+      </p:sp>
+      <p:sp>
+        <p:nvSpPr>
+          <p:cNvPr id="36" name="Ellipse 35"/>
+          <p:cNvSpPr/>
+          <p:nvPr/>
+        </p:nvSpPr>
+        <p:spPr bwMode="auto">
+          <a:xfrm>
+            <a:off x="719572" y="1601238"/>
+            <a:ext cx="1801180" cy="1071678"/>
+          </a:xfrm>
+          <a:prstGeom prst="ellipse">
+            <a:avLst/>
+          </a:prstGeom>
+          <a:noFill/>
+          <a:ln w="9525" cap="flat" cmpd="sng" algn="ctr">
+            <a:solidFill>
+              <a:schemeClr val="tx1"/>
+            </a:solidFill>
+            <a:prstDash val="solid"/>
+            <a:round/>
+            <a:headEnd type="none" w="med" len="med"/>
+            <a:tailEnd type="none" w="med" len="med"/>
+          </a:ln>
+          <a:effectLst/>
+        </p:spPr>
+        <p:txBody>
+          <a:bodyPr vert="horz" wrap="square" lIns="91440" tIns="45720" rIns="91440" bIns="45720" numCol="1" rtlCol="0" anchor="t" anchorCtr="0" compatLnSpc="1">
+            <a:prstTxWarp prst="textNoShape">
+              <a:avLst/>
+            </a:prstTxWarp>
+          </a:bodyPr>
+          <a:lstStyle/>
+          <a:p>
+            <a:pPr marL="0" marR="0" indent="0" algn="l" defTabSz="914400" rtl="0" eaLnBrk="1" fontAlgn="base" latinLnBrk="0" hangingPunct="1">
+              <a:lnSpc>
+                <a:spcPct val="100000"/>
+              </a:lnSpc>
+              <a:spcBef>
+                <a:spcPct val="0"/>
+              </a:spcBef>
+              <a:spcAft>
+                <a:spcPct val="0"/>
+              </a:spcAft>
+              <a:buClrTx/>
+              <a:buSzTx/>
+              <a:buFontTx/>
+              <a:buNone/>
+              <a:tabLst/>
+            </a:pPr>
+            <a:endParaRPr kumimoji="0" lang="fr-CH" sz="1800" b="0" i="0" u="sng" strike="noStrike" cap="none" normalizeH="0" baseline="0" smtClean="0">
+              <a:ln>
+                <a:noFill/>
+              </a:ln>
+              <a:solidFill>
+                <a:schemeClr val="tx1"/>
+              </a:solidFill>
+              <a:effectLst/>
+              <a:latin typeface="Arial" charset="0"/>
+            </a:endParaRPr>
+          </a:p>
+        </p:txBody>
+      </p:sp>
+      <p:sp>
+        <p:nvSpPr>
+          <p:cNvPr id="43" name="Flèche droite 42"/>
+          <p:cNvSpPr/>
+          <p:nvPr/>
+        </p:nvSpPr>
+        <p:spPr bwMode="auto">
+          <a:xfrm>
+            <a:off x="4901716" y="2843262"/>
+            <a:ext cx="3630724" cy="720080"/>
+          </a:xfrm>
+          <a:prstGeom prst="rightArrow">
+            <a:avLst/>
+          </a:prstGeom>
+          <a:solidFill>
+            <a:schemeClr val="accent1"/>
+          </a:solidFill>
+          <a:ln w="9525" cap="flat" cmpd="sng" algn="ctr">
+            <a:solidFill>
+              <a:schemeClr val="tx1"/>
+            </a:solidFill>
+            <a:prstDash val="solid"/>
+            <a:round/>
+            <a:headEnd type="none" w="med" len="med"/>
+            <a:tailEnd type="none" w="med" len="med"/>
+          </a:ln>
+          <a:effectLst/>
+        </p:spPr>
+        <p:txBody>
+          <a:bodyPr vert="horz" wrap="square" lIns="91440" tIns="45720" rIns="91440" bIns="45720" numCol="1" rtlCol="0" anchor="t" anchorCtr="0" compatLnSpc="1">
+            <a:prstTxWarp prst="textNoShape">
+              <a:avLst/>
+            </a:prstTxWarp>
+          </a:bodyPr>
+          <a:lstStyle/>
+          <a:p>
+            <a:pPr marL="0" marR="0" indent="0" algn="l" defTabSz="914400" rtl="0" eaLnBrk="1" fontAlgn="base" latinLnBrk="0" hangingPunct="1">
+              <a:lnSpc>
+                <a:spcPct val="100000"/>
+              </a:lnSpc>
+              <a:spcBef>
+                <a:spcPct val="0"/>
+              </a:spcBef>
+              <a:spcAft>
+                <a:spcPct val="0"/>
+              </a:spcAft>
+              <a:buClrTx/>
+              <a:buSzTx/>
+              <a:buFontTx/>
+              <a:buNone/>
+              <a:tabLst/>
+            </a:pPr>
+            <a:endParaRPr kumimoji="0" lang="fr-CH" sz="1800" b="0" i="0" u="sng" strike="noStrike" cap="none" normalizeH="0" baseline="0" smtClean="0">
+              <a:ln>
+                <a:noFill/>
+              </a:ln>
+              <a:solidFill>
+                <a:schemeClr val="tx1"/>
+              </a:solidFill>
+              <a:effectLst/>
+              <a:latin typeface="Arial" charset="0"/>
+            </a:endParaRPr>
+          </a:p>
+        </p:txBody>
+      </p:sp>
+      <p:sp>
+        <p:nvSpPr>
+          <p:cNvPr id="46" name="Flèche droite 45"/>
+          <p:cNvSpPr/>
+          <p:nvPr/>
+        </p:nvSpPr>
+        <p:spPr bwMode="auto">
+          <a:xfrm rot="10800000">
+            <a:off x="4901716" y="4453767"/>
+            <a:ext cx="3630724" cy="1377825"/>
+          </a:xfrm>
+          <a:prstGeom prst="rightArrow">
+            <a:avLst/>
+          </a:prstGeom>
+          <a:solidFill>
+            <a:schemeClr val="accent1"/>
+          </a:solidFill>
+          <a:ln w="9525" cap="flat" cmpd="sng" algn="ctr">
+            <a:solidFill>
+              <a:schemeClr val="tx1"/>
+            </a:solidFill>
+            <a:prstDash val="solid"/>
+            <a:round/>
+            <a:headEnd type="none" w="med" len="med"/>
+            <a:tailEnd type="none" w="med" len="med"/>
+          </a:ln>
+          <a:effectLst/>
+        </p:spPr>
+        <p:txBody>
+          <a:bodyPr vert="vert270" wrap="square" lIns="91440" tIns="45720" rIns="91440" bIns="45720" numCol="1" rtlCol="0" anchor="t" anchorCtr="0" compatLnSpc="1">
+            <a:prstTxWarp prst="textNoShape">
+              <a:avLst/>
+            </a:prstTxWarp>
+          </a:bodyPr>
+          <a:lstStyle/>
+          <a:p>
+            <a:pPr marL="0" marR="0" indent="0" algn="l" defTabSz="914400" rtl="0" eaLnBrk="1" fontAlgn="base" latinLnBrk="0" hangingPunct="1">
+              <a:lnSpc>
+                <a:spcPct val="100000"/>
+              </a:lnSpc>
+              <a:spcBef>
+                <a:spcPct val="0"/>
+              </a:spcBef>
+              <a:spcAft>
+                <a:spcPct val="0"/>
+              </a:spcAft>
+              <a:buClrTx/>
+              <a:buSzTx/>
+              <a:buFontTx/>
+              <a:buNone/>
+              <a:tabLst/>
+            </a:pPr>
+            <a:endParaRPr kumimoji="0" lang="fr-CH" sz="1800" b="0" i="0" u="none" strike="noStrike" cap="none" normalizeH="0" baseline="0" dirty="0" smtClean="0">
+              <a:ln>
+                <a:noFill/>
+              </a:ln>
+              <a:solidFill>
+                <a:schemeClr val="tx1"/>
+              </a:solidFill>
+              <a:effectLst/>
+              <a:latin typeface="Arial" charset="0"/>
+            </a:endParaRPr>
+          </a:p>
+        </p:txBody>
+      </p:sp>
+      <p:sp>
+        <p:nvSpPr>
+          <p:cNvPr id="47" name="Flèche droite 46"/>
+          <p:cNvSpPr/>
+          <p:nvPr/>
+        </p:nvSpPr>
+        <p:spPr bwMode="auto">
+          <a:xfrm>
+            <a:off x="4900854" y="3825044"/>
+            <a:ext cx="3630724" cy="720080"/>
+          </a:xfrm>
+          <a:prstGeom prst="rightArrow">
+            <a:avLst/>
+          </a:prstGeom>
+          <a:solidFill>
+            <a:schemeClr val="accent1"/>
+          </a:solidFill>
+          <a:ln w="9525" cap="flat" cmpd="sng" algn="ctr">
+            <a:solidFill>
+              <a:schemeClr val="tx1"/>
+            </a:solidFill>
+            <a:prstDash val="solid"/>
+            <a:round/>
+            <a:headEnd type="none" w="med" len="med"/>
+            <a:tailEnd type="none" w="med" len="med"/>
+          </a:ln>
+          <a:effectLst/>
+        </p:spPr>
+        <p:txBody>
+          <a:bodyPr vert="horz" wrap="square" lIns="91440" tIns="45720" rIns="91440" bIns="45720" numCol="1" rtlCol="0" anchor="t" anchorCtr="0" compatLnSpc="1">
+            <a:prstTxWarp prst="textNoShape">
+              <a:avLst/>
+            </a:prstTxWarp>
+          </a:bodyPr>
+          <a:lstStyle/>
+          <a:p>
+            <a:pPr marL="0" marR="0" indent="0" algn="l" defTabSz="914400" rtl="0" eaLnBrk="1" fontAlgn="base" latinLnBrk="0" hangingPunct="1">
+              <a:lnSpc>
+                <a:spcPct val="100000"/>
+              </a:lnSpc>
+              <a:spcBef>
+                <a:spcPct val="0"/>
+              </a:spcBef>
+              <a:spcAft>
+                <a:spcPct val="0"/>
+              </a:spcAft>
+              <a:buClrTx/>
+              <a:buSzTx/>
+              <a:buFontTx/>
+              <a:buNone/>
+              <a:tabLst/>
+            </a:pPr>
+            <a:endParaRPr kumimoji="0" lang="fr-CH" sz="1800" b="0" i="0" u="none" strike="noStrike" cap="none" normalizeH="0" baseline="0" dirty="0" smtClean="0">
+              <a:ln>
+                <a:noFill/>
+              </a:ln>
+              <a:solidFill>
+                <a:schemeClr val="tx1"/>
+              </a:solidFill>
+              <a:effectLst/>
+              <a:latin typeface="Arial" charset="0"/>
+            </a:endParaRPr>
+          </a:p>
+        </p:txBody>
+      </p:sp>
+      <p:sp>
+        <p:nvSpPr>
+          <p:cNvPr id="50" name="ZoneTexte 49"/>
+          <p:cNvSpPr txBox="1"/>
+          <p:nvPr/>
+        </p:nvSpPr>
+        <p:spPr>
+          <a:xfrm>
+            <a:off x="1760877" y="4571836"/>
+            <a:ext cx="2775119" cy="369332"/>
+          </a:xfrm>
+          <a:prstGeom prst="rect">
+            <a:avLst/>
+          </a:prstGeom>
+          <a:noFill/>
+        </p:spPr>
+        <p:txBody>
+          <a:bodyPr wrap="none" rtlCol="0">
+            <a:spAutoFit/>
+          </a:bodyPr>
+          <a:lstStyle/>
+          <a:p>
+            <a:r>
+              <a:rPr lang="fr-CH" b="1" u="none" dirty="0" smtClean="0"/>
+              <a:t>Canal 1 </a:t>
+            </a:r>
+            <a:r>
+              <a:rPr lang="fr-CH" u="none" dirty="0" smtClean="0"/>
+              <a:t>: Communication</a:t>
+            </a:r>
+            <a:endParaRPr lang="fr-CH" u="none" dirty="0"/>
+          </a:p>
+        </p:txBody>
+      </p:sp>
+      <p:sp>
+        <p:nvSpPr>
+          <p:cNvPr id="51" name="Rectangle 50"/>
+          <p:cNvSpPr/>
+          <p:nvPr/>
+        </p:nvSpPr>
+        <p:spPr>
+          <a:xfrm>
+            <a:off x="1799692" y="3032956"/>
+            <a:ext cx="2403287" cy="369332"/>
+          </a:xfrm>
+          <a:prstGeom prst="rect">
+            <a:avLst/>
+          </a:prstGeom>
+        </p:spPr>
+        <p:txBody>
+          <a:bodyPr wrap="none">
+            <a:spAutoFit/>
+          </a:bodyPr>
+          <a:lstStyle/>
+          <a:p>
+            <a:r>
+              <a:rPr lang="fr-CH" b="1" u="none" dirty="0" smtClean="0"/>
+              <a:t>Canal 2 </a:t>
+            </a:r>
+            <a:r>
+              <a:rPr lang="fr-CH" u="none" dirty="0" smtClean="0"/>
+              <a:t>: Asynchrone</a:t>
+            </a:r>
+            <a:endParaRPr lang="fr-CH" u="none" dirty="0"/>
+          </a:p>
+        </p:txBody>
+      </p:sp>
+      <p:sp>
+        <p:nvSpPr>
+          <p:cNvPr id="52" name="Flèche à angle droit 51"/>
+          <p:cNvSpPr/>
+          <p:nvPr/>
+        </p:nvSpPr>
+        <p:spPr bwMode="auto">
+          <a:xfrm rot="10800000" flipH="1">
+            <a:off x="2771800" y="2070631"/>
+            <a:ext cx="3248000" cy="530276"/>
+          </a:xfrm>
+          <a:prstGeom prst="bentUpArrow">
+            <a:avLst>
+              <a:gd name="adj1" fmla="val 10630"/>
+              <a:gd name="adj2" fmla="val 16789"/>
+              <a:gd name="adj3" fmla="val 29106"/>
+            </a:avLst>
+          </a:prstGeom>
+          <a:solidFill>
+            <a:schemeClr val="tx1">
+              <a:lumMod val="95000"/>
+              <a:lumOff val="5000"/>
+            </a:schemeClr>
+          </a:solidFill>
+          <a:ln w="9525" cap="flat" cmpd="sng" algn="ctr">
+            <a:solidFill>
+              <a:schemeClr val="tx1"/>
+            </a:solidFill>
+            <a:prstDash val="solid"/>
+            <a:round/>
+            <a:headEnd type="none" w="med" len="med"/>
+            <a:tailEnd type="none" w="med" len="med"/>
+          </a:ln>
+          <a:effectLst/>
+        </p:spPr>
+        <p:txBody>
+          <a:bodyPr vert="horz" wrap="square" lIns="91440" tIns="45720" rIns="91440" bIns="45720" numCol="1" rtlCol="0" anchor="t" anchorCtr="0" compatLnSpc="1">
+            <a:prstTxWarp prst="textNoShape">
+              <a:avLst/>
+            </a:prstTxWarp>
+          </a:bodyPr>
+          <a:lstStyle/>
+          <a:p>
+            <a:pPr marL="0" marR="0" indent="0" algn="l" defTabSz="914400" rtl="0" eaLnBrk="1" fontAlgn="base" latinLnBrk="0" hangingPunct="1">
+              <a:lnSpc>
+                <a:spcPct val="100000"/>
+              </a:lnSpc>
+              <a:spcBef>
+                <a:spcPct val="0"/>
+              </a:spcBef>
+              <a:spcAft>
+                <a:spcPct val="0"/>
+              </a:spcAft>
+              <a:buClrTx/>
+              <a:buSzTx/>
+              <a:buFontTx/>
+              <a:buNone/>
+              <a:tabLst/>
+            </a:pPr>
+            <a:endParaRPr kumimoji="0" lang="fr-CH" sz="1800" b="0" i="0" u="sng" strike="noStrike" cap="none" normalizeH="0" baseline="0" smtClean="0">
+              <a:ln>
+                <a:noFill/>
+              </a:ln>
+              <a:solidFill>
+                <a:schemeClr val="tx1"/>
+              </a:solidFill>
+              <a:effectLst/>
+              <a:latin typeface="Arial" charset="0"/>
+            </a:endParaRPr>
+          </a:p>
+        </p:txBody>
+      </p:sp>
+      <p:cxnSp>
+        <p:nvCxnSpPr>
+          <p:cNvPr id="54" name="Connecteur droit 53"/>
+          <p:cNvCxnSpPr/>
+          <p:nvPr/>
+        </p:nvCxnSpPr>
+        <p:spPr bwMode="auto">
+          <a:xfrm>
+            <a:off x="4716016" y="3717032"/>
+            <a:ext cx="3970784" cy="0"/>
+          </a:xfrm>
+          <a:prstGeom prst="line">
+            <a:avLst/>
+          </a:prstGeom>
+          <a:solidFill>
+            <a:schemeClr val="accent1"/>
+          </a:solidFill>
+          <a:ln w="9525" cap="flat" cmpd="sng" algn="ctr">
+            <a:solidFill>
+              <a:schemeClr val="tx1"/>
+            </a:solidFill>
+            <a:prstDash val="dash"/>
+            <a:round/>
+            <a:headEnd type="none" w="med" len="med"/>
+            <a:tailEnd type="none" w="med" len="med"/>
+          </a:ln>
+          <a:effectLst/>
+        </p:spPr>
+      </p:cxnSp>
+    </p:spTree>
+  </p:cSld>
+  <p:clrMapOvr>
+    <a:masterClrMapping/>
+  </p:clrMapOvr>
+  <p:transition>
+    <p:fade/>
+  </p:transition>
+  <p:timing>
+    <p:tnLst>
+      <p:par>
+        <p:cTn id="1" dur="indefinite" restart="never" nodeType="tmRoot"/>
+      </p:par>
+    </p:tnLst>
+  </p:timing>
+</p:sld>
+</file>
+
+<file path=ppt/slides/slide11.xml><?xml version="1.0" encoding="utf-8"?>
+<p:sld xmlns:a="http://schemas.openxmlformats.org/drawingml/2006/main" xmlns:r="http://schemas.openxmlformats.org/officeDocument/2006/relationships" xmlns:p="http://schemas.openxmlformats.org/presentationml/2006/main">
+  <p:cSld>
+    <p:spTree>
+      <p:nvGrpSpPr>
+        <p:cNvPr id="1" name=""/>
+        <p:cNvGrpSpPr/>
+        <p:nvPr/>
+      </p:nvGrpSpPr>
+      <p:grpSpPr>
+        <a:xfrm>
+          <a:off x="0" y="0"/>
+          <a:ext cx="0" cy="0"/>
+          <a:chOff x="0" y="0"/>
+          <a:chExt cx="0" cy="0"/>
+        </a:xfrm>
+      </p:grpSpPr>
+      <p:sp>
+        <p:nvSpPr>
+          <p:cNvPr id="14" name="Rectangle 4"/>
+          <p:cNvSpPr>
+            <a:spLocks noChangeArrowheads="1"/>
+          </p:cNvSpPr>
+          <p:nvPr/>
+        </p:nvSpPr>
+        <p:spPr bwMode="auto">
+          <a:xfrm>
+            <a:off x="0" y="0"/>
+            <a:ext cx="9144000" cy="1143000"/>
+          </a:xfrm>
+          <a:prstGeom prst="rect">
+            <a:avLst/>
+          </a:prstGeom>
+          <a:gradFill rotWithShape="1">
+            <a:gsLst>
+              <a:gs pos="0">
+                <a:srgbClr val="00B400"/>
+              </a:gs>
+              <a:gs pos="100000">
+                <a:srgbClr val="006000"/>
+              </a:gs>
+            </a:gsLst>
+            <a:lin ang="5400000" scaled="1"/>
+          </a:gradFill>
+          <a:ln w="9525">
+            <a:noFill/>
+            <a:miter lim="800000"/>
+            <a:headEnd/>
+            <a:tailEnd/>
+          </a:ln>
+          <a:effectLst/>
+        </p:spPr>
+        <p:txBody>
+          <a:bodyPr wrap="none" anchor="ctr"/>
+          <a:lstStyle/>
+          <a:p>
+            <a:endParaRPr lang="fr-CH"/>
+          </a:p>
+        </p:txBody>
+      </p:sp>
+      <p:sp>
+        <p:nvSpPr>
+          <p:cNvPr id="17" name="Rectangle 13"/>
+          <p:cNvSpPr>
+            <a:spLocks noChangeArrowheads="1"/>
+          </p:cNvSpPr>
+          <p:nvPr/>
+        </p:nvSpPr>
+        <p:spPr bwMode="auto">
+          <a:xfrm>
+            <a:off x="0" y="1143000"/>
+            <a:ext cx="9144000" cy="152400"/>
+          </a:xfrm>
+          <a:prstGeom prst="rect">
+            <a:avLst/>
+          </a:prstGeom>
+          <a:gradFill rotWithShape="1">
+            <a:gsLst>
+              <a:gs pos="0">
+                <a:srgbClr val="5F5F5F"/>
+              </a:gs>
+              <a:gs pos="100000">
+                <a:srgbClr val="DDDDDD">
+                  <a:alpha val="0"/>
+                </a:srgbClr>
+              </a:gs>
+            </a:gsLst>
+            <a:lin ang="5400000" scaled="1"/>
+          </a:gradFill>
+          <a:ln w="9525">
+            <a:noFill/>
+            <a:miter lim="800000"/>
+            <a:headEnd/>
+            <a:tailEnd/>
+          </a:ln>
+          <a:effectLst/>
+        </p:spPr>
+        <p:txBody>
+          <a:bodyPr wrap="none" anchor="ctr"/>
+          <a:lstStyle/>
+          <a:p>
+            <a:endParaRPr lang="fr-CH"/>
+          </a:p>
+        </p:txBody>
+      </p:sp>
+      <p:sp>
+        <p:nvSpPr>
+          <p:cNvPr id="18" name="Rectangle 14"/>
+          <p:cNvSpPr>
+            <a:spLocks noChangeArrowheads="1"/>
+          </p:cNvSpPr>
+          <p:nvPr/>
+        </p:nvSpPr>
+        <p:spPr bwMode="auto">
+          <a:xfrm>
+            <a:off x="0" y="6629400"/>
+            <a:ext cx="9144000" cy="228600"/>
+          </a:xfrm>
+          <a:prstGeom prst="rect">
+            <a:avLst/>
+          </a:prstGeom>
+          <a:gradFill rotWithShape="1">
+            <a:gsLst>
+              <a:gs pos="0">
+                <a:srgbClr val="DDDDDD">
+                  <a:alpha val="0"/>
+                </a:srgbClr>
+              </a:gs>
+              <a:gs pos="100000">
+                <a:srgbClr val="767676"/>
+              </a:gs>
+            </a:gsLst>
+            <a:lin ang="5400000" scaled="1"/>
+          </a:gradFill>
+          <a:ln w="9525">
+            <a:noFill/>
+            <a:miter lim="800000"/>
+            <a:headEnd/>
+            <a:tailEnd/>
+          </a:ln>
+          <a:effectLst/>
+        </p:spPr>
+        <p:txBody>
+          <a:bodyPr wrap="none" anchor="ctr"/>
+          <a:lstStyle/>
+          <a:p>
+            <a:endParaRPr lang="fr-CH"/>
+          </a:p>
+        </p:txBody>
+      </p:sp>
+      <p:sp>
+        <p:nvSpPr>
           <p:cNvPr id="19" name="Espace réservé du numéro de diapositive 11"/>
           <p:cNvSpPr>
             <a:spLocks noGrp="1"/>
@@ -5027,7 +6040,7 @@
                 </a:solidFill>
               </a:rPr>
               <a:pPr/>
-              <a:t>10</a:t>
+              <a:t>11</a:t>
             </a:fld>
             <a:r>
               <a:rPr lang="fr-FR" dirty="0" smtClean="0">
@@ -5707,7 +6720,7 @@
 </p:sld>
 </file>
 
-<file path=ppt/slides/slide11.xml><?xml version="1.0" encoding="utf-8"?>
+<file path=ppt/slides/slide12.xml><?xml version="1.0" encoding="utf-8"?>
 <p:sld xmlns:a="http://schemas.openxmlformats.org/drawingml/2006/main" xmlns:r="http://schemas.openxmlformats.org/officeDocument/2006/relationships" xmlns:p="http://schemas.openxmlformats.org/presentationml/2006/main">
   <p:cSld>
     <p:spTree>
@@ -5985,7 +6998,7 @@
                 </a:solidFill>
               </a:rPr>
               <a:pPr/>
-              <a:t>11</a:t>
+              <a:t>12</a:t>
             </a:fld>
             <a:r>
               <a:rPr lang="fr-FR" dirty="0" smtClean="0">
@@ -6549,7 +7562,7 @@
 </p:sld>
 </file>
 
-<file path=ppt/slides/slide12.xml><?xml version="1.0" encoding="utf-8"?>
+<file path=ppt/slides/slide13.xml><?xml version="1.0" encoding="utf-8"?>
 <p:sld xmlns:a="http://schemas.openxmlformats.org/drawingml/2006/main" xmlns:r="http://schemas.openxmlformats.org/officeDocument/2006/relationships" xmlns:p="http://schemas.openxmlformats.org/presentationml/2006/main">
   <p:cSld>
     <p:spTree>
@@ -7574,7 +8587,7 @@
                 </a:solidFill>
               </a:rPr>
               <a:pPr/>
-              <a:t>12</a:t>
+              <a:t>13</a:t>
             </a:fld>
             <a:r>
               <a:rPr lang="fr-FR" dirty="0" smtClean="0">
@@ -14423,6 +15436,151 @@
           <a:chExt cx="0" cy="0"/>
         </a:xfrm>
       </p:grpSpPr>
+      <p:grpSp>
+        <p:nvGrpSpPr>
+          <p:cNvPr id="2" name="Groupe 23"/>
+          <p:cNvGrpSpPr/>
+          <p:nvPr/>
+        </p:nvGrpSpPr>
+        <p:grpSpPr>
+          <a:xfrm>
+            <a:off x="6012160" y="1854609"/>
+            <a:ext cx="1116124" cy="530275"/>
+            <a:chOff x="827584" y="2240868"/>
+            <a:chExt cx="1116124" cy="530275"/>
+          </a:xfrm>
+        </p:grpSpPr>
+        <p:sp>
+          <p:nvSpPr>
+            <p:cNvPr id="22" name="Flèche droite 21"/>
+            <p:cNvSpPr/>
+            <p:nvPr/>
+          </p:nvSpPr>
+          <p:spPr bwMode="auto">
+            <a:xfrm>
+              <a:off x="827584" y="2240868"/>
+              <a:ext cx="1116124" cy="251916"/>
+            </a:xfrm>
+            <a:prstGeom prst="rightArrow">
+              <a:avLst/>
+            </a:prstGeom>
+            <a:solidFill>
+              <a:schemeClr val="accent1"/>
+            </a:solidFill>
+            <a:ln w="9525" cap="flat" cmpd="sng" algn="ctr">
+              <a:solidFill>
+                <a:schemeClr val="tx1"/>
+              </a:solidFill>
+              <a:prstDash val="solid"/>
+              <a:round/>
+              <a:headEnd type="none" w="med" len="med"/>
+              <a:tailEnd type="none" w="med" len="med"/>
+            </a:ln>
+            <a:effectLst/>
+          </p:spPr>
+          <p:txBody>
+            <a:bodyPr vert="horz" wrap="square" lIns="91440" tIns="45720" rIns="91440" bIns="45720" numCol="1" rtlCol="0" anchor="t" anchorCtr="0" compatLnSpc="1">
+              <a:prstTxWarp prst="textNoShape">
+                <a:avLst/>
+              </a:prstTxWarp>
+            </a:bodyPr>
+            <a:lstStyle/>
+            <a:p>
+              <a:pPr marL="0" marR="0" indent="0" algn="l" defTabSz="914400" rtl="0" eaLnBrk="1" fontAlgn="base" latinLnBrk="0" hangingPunct="1">
+                <a:lnSpc>
+                  <a:spcPct val="100000"/>
+                </a:lnSpc>
+                <a:spcBef>
+                  <a:spcPct val="0"/>
+                </a:spcBef>
+                <a:spcAft>
+                  <a:spcPct val="0"/>
+                </a:spcAft>
+                <a:buClrTx/>
+                <a:buSzTx/>
+                <a:buFontTx/>
+                <a:buNone/>
+                <a:tabLst/>
+              </a:pPr>
+              <a:endParaRPr kumimoji="0" lang="fr-CH" sz="1800" b="0" i="0" u="sng" strike="noStrike" cap="none" normalizeH="0" baseline="0" smtClean="0">
+                <a:ln>
+                  <a:noFill/>
+                </a:ln>
+                <a:solidFill>
+                  <a:schemeClr val="tx1"/>
+                </a:solidFill>
+                <a:effectLst/>
+                <a:latin typeface="Arial" charset="0"/>
+              </a:endParaRPr>
+            </a:p>
+          </p:txBody>
+        </p:sp>
+        <p:sp>
+          <p:nvSpPr>
+            <p:cNvPr id="23" name="Flèche droite 22"/>
+            <p:cNvSpPr/>
+            <p:nvPr/>
+          </p:nvSpPr>
+          <p:spPr bwMode="auto">
+            <a:xfrm rot="10800000">
+              <a:off x="827584" y="2519227"/>
+              <a:ext cx="1116124" cy="251916"/>
+            </a:xfrm>
+            <a:prstGeom prst="rightArrow">
+              <a:avLst/>
+            </a:prstGeom>
+            <a:solidFill>
+              <a:schemeClr val="accent1"/>
+            </a:solidFill>
+            <a:ln w="9525" cap="flat" cmpd="sng" algn="ctr">
+              <a:solidFill>
+                <a:schemeClr val="tx1"/>
+              </a:solidFill>
+              <a:prstDash val="solid"/>
+              <a:round/>
+              <a:headEnd type="none" w="med" len="med"/>
+              <a:tailEnd type="none" w="med" len="med"/>
+            </a:ln>
+            <a:effectLst/>
+          </p:spPr>
+          <p:txBody>
+            <a:bodyPr vert="horz" wrap="square" lIns="91440" tIns="45720" rIns="91440" bIns="45720" numCol="1" rtlCol="0" anchor="t" anchorCtr="0" compatLnSpc="1">
+              <a:prstTxWarp prst="textNoShape">
+                <a:avLst/>
+              </a:prstTxWarp>
+            </a:bodyPr>
+            <a:lstStyle/>
+            <a:p>
+              <a:pPr marL="0" marR="0" indent="0" algn="l" defTabSz="914400" rtl="0" eaLnBrk="1" fontAlgn="base" latinLnBrk="0" hangingPunct="1">
+                <a:lnSpc>
+                  <a:spcPct val="100000"/>
+                </a:lnSpc>
+                <a:spcBef>
+                  <a:spcPct val="0"/>
+                </a:spcBef>
+                <a:spcAft>
+                  <a:spcPct val="0"/>
+                </a:spcAft>
+                <a:buClrTx/>
+                <a:buSzTx/>
+                <a:buFontTx/>
+                <a:buNone/>
+                <a:tabLst/>
+              </a:pPr>
+              <a:endParaRPr kumimoji="0" lang="fr-CH" sz="1800" b="0" i="0" u="sng" strike="noStrike" cap="none" normalizeH="0" baseline="0" smtClean="0">
+                <a:ln>
+                  <a:noFill/>
+                </a:ln>
+                <a:solidFill>
+                  <a:schemeClr val="tx1"/>
+                </a:solidFill>
+                <a:effectLst/>
+                <a:latin typeface="Arial" charset="0"/>
+              </a:endParaRPr>
+            </a:p>
+          </p:txBody>
+        </p:sp>
+      </p:grpSp>
       <p:sp>
         <p:nvSpPr>
           <p:cNvPr id="4" name="Espace réservé de la date 3"/>
@@ -14507,7 +15665,7 @@
                   </a:schemeClr>
                 </a:solidFill>
               </a:rPr>
-              <a:t>/12</a:t>
+              <a:t>/13</a:t>
             </a:r>
             <a:endParaRPr lang="fr-FR" dirty="0">
               <a:solidFill>
@@ -14670,41 +15828,6 @@
       </p:sp>
       <p:sp>
         <p:nvSpPr>
-          <p:cNvPr id="12" name="ZoneTexte 11"/>
-          <p:cNvSpPr txBox="1"/>
-          <p:nvPr/>
-        </p:nvSpPr>
-        <p:spPr>
-          <a:xfrm>
-            <a:off x="457200" y="1664732"/>
-            <a:ext cx="1172116" cy="369332"/>
-          </a:xfrm>
-          <a:prstGeom prst="rect">
-            <a:avLst/>
-          </a:prstGeom>
-          <a:noFill/>
-        </p:spPr>
-        <p:txBody>
-          <a:bodyPr wrap="none" rtlCol="0">
-            <a:spAutoFit/>
-          </a:bodyPr>
-          <a:lstStyle/>
-          <a:p>
-            <a:pPr>
-              <a:spcAft>
-                <a:spcPts val="1200"/>
-              </a:spcAft>
-            </a:pPr>
-            <a:r>
-              <a:rPr lang="fr-CH" u="none" dirty="0" smtClean="0"/>
-              <a:t>Pierre-Do</a:t>
-            </a:r>
-            <a:endParaRPr lang="fr-CH" sz="1400" i="1" u="none" dirty="0"/>
-          </a:p>
-        </p:txBody>
-      </p:sp>
-      <p:sp>
-        <p:nvSpPr>
           <p:cNvPr id="104" name="Rectangle 34"/>
           <p:cNvSpPr>
             <a:spLocks noChangeArrowheads="1"/>
@@ -14779,6 +15902,1388 @@
               </a:rPr>
               <a:t>ADO – PPZ – LFH – RPN</a:t>
             </a:r>
+          </a:p>
+        </p:txBody>
+      </p:sp>
+      <p:sp>
+        <p:nvSpPr>
+          <p:cNvPr id="10" name="Rectangle à coins arrondis 9"/>
+          <p:cNvSpPr/>
+          <p:nvPr/>
+        </p:nvSpPr>
+        <p:spPr bwMode="auto">
+          <a:xfrm>
+            <a:off x="7236296" y="1772784"/>
+            <a:ext cx="1080000" cy="720000"/>
+          </a:xfrm>
+          <a:prstGeom prst="roundRect">
+            <a:avLst/>
+          </a:prstGeom>
+          <a:solidFill>
+            <a:schemeClr val="accent1"/>
+          </a:solidFill>
+          <a:ln w="9525" cap="flat" cmpd="sng" algn="ctr">
+            <a:solidFill>
+              <a:schemeClr val="tx1"/>
+            </a:solidFill>
+            <a:prstDash val="solid"/>
+            <a:round/>
+            <a:headEnd type="none" w="med" len="med"/>
+            <a:tailEnd type="none" w="med" len="med"/>
+          </a:ln>
+          <a:effectLst/>
+        </p:spPr>
+        <p:txBody>
+          <a:bodyPr vert="horz" wrap="square" lIns="91440" tIns="45720" rIns="91440" bIns="45720" numCol="1" rtlCol="0" anchor="t" anchorCtr="0" compatLnSpc="1">
+            <a:prstTxWarp prst="textNoShape">
+              <a:avLst/>
+            </a:prstTxWarp>
+          </a:bodyPr>
+          <a:lstStyle/>
+          <a:p>
+            <a:pPr marL="0" marR="0" indent="0" algn="ctr" defTabSz="914400" rtl="0" eaLnBrk="1" fontAlgn="base" latinLnBrk="0" hangingPunct="1">
+              <a:lnSpc>
+                <a:spcPct val="100000"/>
+              </a:lnSpc>
+              <a:spcBef>
+                <a:spcPct val="0"/>
+              </a:spcBef>
+              <a:spcAft>
+                <a:spcPct val="0"/>
+              </a:spcAft>
+              <a:buClrTx/>
+              <a:buSzTx/>
+              <a:buFontTx/>
+              <a:buNone/>
+              <a:tabLst/>
+            </a:pPr>
+            <a:r>
+              <a:rPr kumimoji="0" lang="fr-CH" sz="1800" b="0" i="0" u="none" strike="noStrike" cap="none" normalizeH="0" baseline="0" dirty="0" smtClean="0">
+                <a:ln>
+                  <a:noFill/>
+                </a:ln>
+                <a:solidFill>
+                  <a:schemeClr val="tx1"/>
+                </a:solidFill>
+                <a:effectLst/>
+                <a:latin typeface="Arial" charset="0"/>
+              </a:rPr>
+              <a:t>Joueur</a:t>
+            </a:r>
+          </a:p>
+        </p:txBody>
+      </p:sp>
+      <p:sp>
+        <p:nvSpPr>
+          <p:cNvPr id="15" name="Rectangle à coins arrondis 14"/>
+          <p:cNvSpPr/>
+          <p:nvPr/>
+        </p:nvSpPr>
+        <p:spPr bwMode="auto">
+          <a:xfrm>
+            <a:off x="1738046" y="3951058"/>
+            <a:ext cx="1080120" cy="1044116"/>
+          </a:xfrm>
+          <a:prstGeom prst="roundRect">
+            <a:avLst/>
+          </a:prstGeom>
+          <a:solidFill>
+            <a:schemeClr val="accent1"/>
+          </a:solidFill>
+          <a:ln w="9525" cap="flat" cmpd="sng" algn="ctr">
+            <a:solidFill>
+              <a:schemeClr val="tx1"/>
+            </a:solidFill>
+            <a:prstDash val="solid"/>
+            <a:round/>
+            <a:headEnd type="none" w="med" len="med"/>
+            <a:tailEnd type="none" w="med" len="med"/>
+          </a:ln>
+          <a:effectLst/>
+        </p:spPr>
+        <p:txBody>
+          <a:bodyPr vert="horz" wrap="square" lIns="91440" tIns="45720" rIns="91440" bIns="45720" numCol="1" rtlCol="0" anchor="t" anchorCtr="0" compatLnSpc="1">
+            <a:prstTxWarp prst="textNoShape">
+              <a:avLst/>
+            </a:prstTxWarp>
+          </a:bodyPr>
+          <a:lstStyle/>
+          <a:p>
+            <a:pPr marL="0" marR="0" indent="0" algn="ctr" defTabSz="914400" rtl="0" eaLnBrk="1" fontAlgn="base" latinLnBrk="0" hangingPunct="1">
+              <a:lnSpc>
+                <a:spcPct val="100000"/>
+              </a:lnSpc>
+              <a:spcBef>
+                <a:spcPct val="0"/>
+              </a:spcBef>
+              <a:spcAft>
+                <a:spcPct val="0"/>
+              </a:spcAft>
+              <a:buClrTx/>
+              <a:buSzTx/>
+              <a:buFontTx/>
+              <a:buNone/>
+              <a:tabLst/>
+            </a:pPr>
+            <a:r>
+              <a:rPr kumimoji="0" lang="fr-CH" sz="1800" b="0" i="0" u="none" strike="noStrike" cap="none" normalizeH="0" baseline="0" dirty="0" smtClean="0">
+                <a:ln>
+                  <a:noFill/>
+                </a:ln>
+                <a:solidFill>
+                  <a:schemeClr val="tx1"/>
+                </a:solidFill>
+                <a:effectLst/>
+                <a:latin typeface="Arial" charset="0"/>
+              </a:rPr>
+              <a:t>Modèle</a:t>
+            </a:r>
+          </a:p>
+          <a:p>
+            <a:pPr marL="0" marR="0" indent="0" algn="ctr" defTabSz="914400" rtl="0" eaLnBrk="1" fontAlgn="base" latinLnBrk="0" hangingPunct="1">
+              <a:lnSpc>
+                <a:spcPct val="100000"/>
+              </a:lnSpc>
+              <a:spcBef>
+                <a:spcPct val="0"/>
+              </a:spcBef>
+              <a:spcAft>
+                <a:spcPct val="0"/>
+              </a:spcAft>
+              <a:buClrTx/>
+              <a:buSzTx/>
+              <a:buFontTx/>
+              <a:buNone/>
+              <a:tabLst/>
+            </a:pPr>
+            <a:r>
+              <a:rPr lang="fr-CH" u="none" dirty="0" smtClean="0"/>
+              <a:t>(Jeu)</a:t>
+            </a:r>
+            <a:endParaRPr kumimoji="0" lang="fr-CH" sz="1800" b="0" i="0" u="none" strike="noStrike" cap="none" normalizeH="0" baseline="0" dirty="0" smtClean="0">
+              <a:ln>
+                <a:noFill/>
+              </a:ln>
+              <a:solidFill>
+                <a:schemeClr val="tx1"/>
+              </a:solidFill>
+              <a:effectLst/>
+              <a:latin typeface="Arial" charset="0"/>
+            </a:endParaRPr>
+          </a:p>
+        </p:txBody>
+      </p:sp>
+      <p:sp>
+        <p:nvSpPr>
+          <p:cNvPr id="16" name="Ellipse 15"/>
+          <p:cNvSpPr/>
+          <p:nvPr/>
+        </p:nvSpPr>
+        <p:spPr bwMode="auto">
+          <a:xfrm>
+            <a:off x="1432012" y="1709080"/>
+            <a:ext cx="1692188" cy="936104"/>
+          </a:xfrm>
+          <a:prstGeom prst="ellipse">
+            <a:avLst/>
+          </a:prstGeom>
+          <a:solidFill>
+            <a:schemeClr val="accent1"/>
+          </a:solidFill>
+          <a:ln w="9525" cap="flat" cmpd="sng" algn="ctr">
+            <a:solidFill>
+              <a:schemeClr val="tx1"/>
+            </a:solidFill>
+            <a:prstDash val="solid"/>
+            <a:round/>
+            <a:headEnd type="none" w="med" len="med"/>
+            <a:tailEnd type="none" w="med" len="med"/>
+          </a:ln>
+          <a:effectLst/>
+        </p:spPr>
+        <p:txBody>
+          <a:bodyPr vert="horz" wrap="square" lIns="91440" tIns="45720" rIns="91440" bIns="45720" numCol="1" rtlCol="0" anchor="t" anchorCtr="0" compatLnSpc="1">
+            <a:prstTxWarp prst="textNoShape">
+              <a:avLst/>
+            </a:prstTxWarp>
+          </a:bodyPr>
+          <a:lstStyle/>
+          <a:p>
+            <a:pPr marL="0" marR="0" indent="0" algn="ctr" defTabSz="914400" rtl="0" eaLnBrk="1" fontAlgn="base" latinLnBrk="0" hangingPunct="1">
+              <a:lnSpc>
+                <a:spcPct val="100000"/>
+              </a:lnSpc>
+              <a:spcBef>
+                <a:spcPct val="0"/>
+              </a:spcBef>
+              <a:spcAft>
+                <a:spcPct val="0"/>
+              </a:spcAft>
+              <a:buClrTx/>
+              <a:buSzTx/>
+              <a:buFontTx/>
+              <a:buNone/>
+              <a:tabLst/>
+            </a:pPr>
+            <a:r>
+              <a:rPr kumimoji="0" lang="fr-CH" sz="1800" b="0" i="0" u="none" strike="noStrike" cap="none" normalizeH="0" baseline="0" dirty="0" smtClean="0">
+                <a:ln>
+                  <a:noFill/>
+                </a:ln>
+                <a:solidFill>
+                  <a:schemeClr val="tx1"/>
+                </a:solidFill>
+                <a:effectLst/>
+                <a:latin typeface="Arial" charset="0"/>
+              </a:rPr>
+              <a:t>Ecouteur</a:t>
+            </a:r>
+          </a:p>
+        </p:txBody>
+      </p:sp>
+      <p:sp>
+        <p:nvSpPr>
+          <p:cNvPr id="18" name="Rectangle à coins arrondis 17"/>
+          <p:cNvSpPr/>
+          <p:nvPr/>
+        </p:nvSpPr>
+        <p:spPr bwMode="auto">
+          <a:xfrm>
+            <a:off x="7236296" y="2645184"/>
+            <a:ext cx="1080000" cy="720000"/>
+          </a:xfrm>
+          <a:prstGeom prst="roundRect">
+            <a:avLst/>
+          </a:prstGeom>
+          <a:solidFill>
+            <a:schemeClr val="accent1"/>
+          </a:solidFill>
+          <a:ln w="9525" cap="flat" cmpd="sng" algn="ctr">
+            <a:solidFill>
+              <a:schemeClr val="tx1"/>
+            </a:solidFill>
+            <a:prstDash val="solid"/>
+            <a:round/>
+            <a:headEnd type="none" w="med" len="med"/>
+            <a:tailEnd type="none" w="med" len="med"/>
+          </a:ln>
+          <a:effectLst/>
+        </p:spPr>
+        <p:txBody>
+          <a:bodyPr vert="horz" wrap="square" lIns="91440" tIns="45720" rIns="91440" bIns="45720" numCol="1" rtlCol="0" anchor="t" anchorCtr="0" compatLnSpc="1">
+            <a:prstTxWarp prst="textNoShape">
+              <a:avLst/>
+            </a:prstTxWarp>
+          </a:bodyPr>
+          <a:lstStyle/>
+          <a:p>
+            <a:pPr marL="0" marR="0" indent="0" algn="ctr" defTabSz="914400" rtl="0" eaLnBrk="1" fontAlgn="base" latinLnBrk="0" hangingPunct="1">
+              <a:lnSpc>
+                <a:spcPct val="100000"/>
+              </a:lnSpc>
+              <a:spcBef>
+                <a:spcPct val="0"/>
+              </a:spcBef>
+              <a:spcAft>
+                <a:spcPct val="0"/>
+              </a:spcAft>
+              <a:buClrTx/>
+              <a:buSzTx/>
+              <a:buFontTx/>
+              <a:buNone/>
+              <a:tabLst/>
+            </a:pPr>
+            <a:r>
+              <a:rPr kumimoji="0" lang="fr-CH" sz="1800" b="0" i="0" u="none" strike="noStrike" cap="none" normalizeH="0" baseline="0" dirty="0" smtClean="0">
+                <a:ln>
+                  <a:noFill/>
+                </a:ln>
+                <a:solidFill>
+                  <a:schemeClr val="tx1"/>
+                </a:solidFill>
+                <a:effectLst/>
+                <a:latin typeface="Arial" charset="0"/>
+              </a:rPr>
+              <a:t>Joueur</a:t>
+            </a:r>
+          </a:p>
+        </p:txBody>
+      </p:sp>
+      <p:sp>
+        <p:nvSpPr>
+          <p:cNvPr id="19" name="Rectangle à coins arrondis 18"/>
+          <p:cNvSpPr/>
+          <p:nvPr/>
+        </p:nvSpPr>
+        <p:spPr bwMode="auto">
+          <a:xfrm>
+            <a:off x="7236296" y="3501008"/>
+            <a:ext cx="1080000" cy="720000"/>
+          </a:xfrm>
+          <a:prstGeom prst="roundRect">
+            <a:avLst/>
+          </a:prstGeom>
+          <a:solidFill>
+            <a:schemeClr val="accent1"/>
+          </a:solidFill>
+          <a:ln w="9525" cap="flat" cmpd="sng" algn="ctr">
+            <a:solidFill>
+              <a:schemeClr val="tx1"/>
+            </a:solidFill>
+            <a:prstDash val="solid"/>
+            <a:round/>
+            <a:headEnd type="none" w="med" len="med"/>
+            <a:tailEnd type="none" w="med" len="med"/>
+          </a:ln>
+          <a:effectLst/>
+        </p:spPr>
+        <p:txBody>
+          <a:bodyPr vert="horz" wrap="square" lIns="91440" tIns="45720" rIns="91440" bIns="45720" numCol="1" rtlCol="0" anchor="t" anchorCtr="0" compatLnSpc="1">
+            <a:prstTxWarp prst="textNoShape">
+              <a:avLst/>
+            </a:prstTxWarp>
+          </a:bodyPr>
+          <a:lstStyle/>
+          <a:p>
+            <a:pPr marL="0" marR="0" indent="0" algn="ctr" defTabSz="914400" rtl="0" eaLnBrk="1" fontAlgn="base" latinLnBrk="0" hangingPunct="1">
+              <a:lnSpc>
+                <a:spcPct val="100000"/>
+              </a:lnSpc>
+              <a:spcBef>
+                <a:spcPct val="0"/>
+              </a:spcBef>
+              <a:spcAft>
+                <a:spcPct val="0"/>
+              </a:spcAft>
+              <a:buClrTx/>
+              <a:buSzTx/>
+              <a:buFontTx/>
+              <a:buNone/>
+              <a:tabLst/>
+            </a:pPr>
+            <a:r>
+              <a:rPr kumimoji="0" lang="fr-CH" sz="1800" b="0" i="0" u="none" strike="noStrike" cap="none" normalizeH="0" baseline="0" dirty="0" smtClean="0">
+                <a:ln>
+                  <a:noFill/>
+                </a:ln>
+                <a:solidFill>
+                  <a:schemeClr val="tx1"/>
+                </a:solidFill>
+                <a:effectLst/>
+                <a:latin typeface="Arial" charset="0"/>
+              </a:rPr>
+              <a:t>Joueur</a:t>
+            </a:r>
+          </a:p>
+        </p:txBody>
+      </p:sp>
+      <p:sp>
+        <p:nvSpPr>
+          <p:cNvPr id="20" name="Rectangle à coins arrondis 19"/>
+          <p:cNvSpPr/>
+          <p:nvPr/>
+        </p:nvSpPr>
+        <p:spPr bwMode="auto">
+          <a:xfrm>
+            <a:off x="7236296" y="4365104"/>
+            <a:ext cx="1080000" cy="720000"/>
+          </a:xfrm>
+          <a:prstGeom prst="roundRect">
+            <a:avLst/>
+          </a:prstGeom>
+          <a:solidFill>
+            <a:schemeClr val="accent1"/>
+          </a:solidFill>
+          <a:ln w="9525" cap="flat" cmpd="sng" algn="ctr">
+            <a:solidFill>
+              <a:schemeClr val="tx1"/>
+            </a:solidFill>
+            <a:prstDash val="solid"/>
+            <a:round/>
+            <a:headEnd type="none" w="med" len="med"/>
+            <a:tailEnd type="none" w="med" len="med"/>
+          </a:ln>
+          <a:effectLst/>
+        </p:spPr>
+        <p:txBody>
+          <a:bodyPr vert="horz" wrap="square" lIns="91440" tIns="45720" rIns="91440" bIns="45720" numCol="1" rtlCol="0" anchor="t" anchorCtr="0" compatLnSpc="1">
+            <a:prstTxWarp prst="textNoShape">
+              <a:avLst/>
+            </a:prstTxWarp>
+          </a:bodyPr>
+          <a:lstStyle/>
+          <a:p>
+            <a:pPr marL="0" marR="0" indent="0" algn="ctr" defTabSz="914400" rtl="0" eaLnBrk="1" fontAlgn="base" latinLnBrk="0" hangingPunct="1">
+              <a:lnSpc>
+                <a:spcPct val="100000"/>
+              </a:lnSpc>
+              <a:spcBef>
+                <a:spcPct val="0"/>
+              </a:spcBef>
+              <a:spcAft>
+                <a:spcPct val="0"/>
+              </a:spcAft>
+              <a:buClrTx/>
+              <a:buSzTx/>
+              <a:buFontTx/>
+              <a:buNone/>
+              <a:tabLst/>
+            </a:pPr>
+            <a:r>
+              <a:rPr kumimoji="0" lang="fr-CH" sz="1800" b="0" i="0" u="none" strike="noStrike" cap="none" normalizeH="0" baseline="0" dirty="0" smtClean="0">
+                <a:ln>
+                  <a:noFill/>
+                </a:ln>
+                <a:solidFill>
+                  <a:schemeClr val="tx1"/>
+                </a:solidFill>
+                <a:effectLst/>
+                <a:latin typeface="Arial" charset="0"/>
+              </a:rPr>
+              <a:t>Joueur</a:t>
+            </a:r>
+          </a:p>
+        </p:txBody>
+      </p:sp>
+      <p:sp>
+        <p:nvSpPr>
+          <p:cNvPr id="21" name="Rectangle 20"/>
+          <p:cNvSpPr/>
+          <p:nvPr/>
+        </p:nvSpPr>
+        <p:spPr bwMode="auto">
+          <a:xfrm>
+            <a:off x="5688124" y="1772784"/>
+            <a:ext cx="216024" cy="3402370"/>
+          </a:xfrm>
+          <a:prstGeom prst="rect">
+            <a:avLst/>
+          </a:prstGeom>
+          <a:solidFill>
+            <a:schemeClr val="accent1"/>
+          </a:solidFill>
+          <a:ln w="9525" cap="flat" cmpd="sng" algn="ctr">
+            <a:solidFill>
+              <a:schemeClr val="tx1"/>
+            </a:solidFill>
+            <a:prstDash val="solid"/>
+            <a:round/>
+            <a:headEnd type="none" w="med" len="med"/>
+            <a:tailEnd type="none" w="med" len="med"/>
+          </a:ln>
+          <a:effectLst/>
+        </p:spPr>
+        <p:txBody>
+          <a:bodyPr vert="horz" wrap="square" lIns="91440" tIns="45720" rIns="91440" bIns="45720" numCol="1" rtlCol="0" anchor="t" anchorCtr="0" compatLnSpc="1">
+            <a:prstTxWarp prst="textNoShape">
+              <a:avLst/>
+            </a:prstTxWarp>
+          </a:bodyPr>
+          <a:lstStyle/>
+          <a:p>
+            <a:pPr marL="0" marR="0" indent="0" algn="l" defTabSz="914400" rtl="0" eaLnBrk="1" fontAlgn="base" latinLnBrk="0" hangingPunct="1">
+              <a:lnSpc>
+                <a:spcPct val="100000"/>
+              </a:lnSpc>
+              <a:spcBef>
+                <a:spcPct val="0"/>
+              </a:spcBef>
+              <a:spcAft>
+                <a:spcPct val="0"/>
+              </a:spcAft>
+              <a:buClrTx/>
+              <a:buSzTx/>
+              <a:buFontTx/>
+              <a:buNone/>
+              <a:tabLst/>
+            </a:pPr>
+            <a:endParaRPr kumimoji="0" lang="fr-CH" sz="1800" b="0" i="0" u="sng" strike="noStrike" cap="none" normalizeH="0" baseline="0" smtClean="0">
+              <a:ln>
+                <a:noFill/>
+              </a:ln>
+              <a:solidFill>
+                <a:schemeClr val="tx1"/>
+              </a:solidFill>
+              <a:effectLst/>
+              <a:latin typeface="Arial" charset="0"/>
+            </a:endParaRPr>
+          </a:p>
+        </p:txBody>
+      </p:sp>
+      <p:grpSp>
+        <p:nvGrpSpPr>
+          <p:cNvPr id="3" name="Groupe 24"/>
+          <p:cNvGrpSpPr/>
+          <p:nvPr/>
+        </p:nvGrpSpPr>
+        <p:grpSpPr>
+          <a:xfrm>
+            <a:off x="6048164" y="2754709"/>
+            <a:ext cx="1116124" cy="530275"/>
+            <a:chOff x="827584" y="2240868"/>
+            <a:chExt cx="1116124" cy="530275"/>
+          </a:xfrm>
+        </p:grpSpPr>
+        <p:sp>
+          <p:nvSpPr>
+            <p:cNvPr id="26" name="Flèche droite 25"/>
+            <p:cNvSpPr/>
+            <p:nvPr/>
+          </p:nvSpPr>
+          <p:spPr bwMode="auto">
+            <a:xfrm>
+              <a:off x="827584" y="2240868"/>
+              <a:ext cx="1116124" cy="251916"/>
+            </a:xfrm>
+            <a:prstGeom prst="rightArrow">
+              <a:avLst/>
+            </a:prstGeom>
+            <a:solidFill>
+              <a:schemeClr val="accent1"/>
+            </a:solidFill>
+            <a:ln w="9525" cap="flat" cmpd="sng" algn="ctr">
+              <a:solidFill>
+                <a:schemeClr val="tx1"/>
+              </a:solidFill>
+              <a:prstDash val="solid"/>
+              <a:round/>
+              <a:headEnd type="none" w="med" len="med"/>
+              <a:tailEnd type="none" w="med" len="med"/>
+            </a:ln>
+            <a:effectLst/>
+          </p:spPr>
+          <p:txBody>
+            <a:bodyPr vert="horz" wrap="square" lIns="91440" tIns="45720" rIns="91440" bIns="45720" numCol="1" rtlCol="0" anchor="t" anchorCtr="0" compatLnSpc="1">
+              <a:prstTxWarp prst="textNoShape">
+                <a:avLst/>
+              </a:prstTxWarp>
+            </a:bodyPr>
+            <a:lstStyle/>
+            <a:p>
+              <a:pPr marL="0" marR="0" indent="0" algn="l" defTabSz="914400" rtl="0" eaLnBrk="1" fontAlgn="base" latinLnBrk="0" hangingPunct="1">
+                <a:lnSpc>
+                  <a:spcPct val="100000"/>
+                </a:lnSpc>
+                <a:spcBef>
+                  <a:spcPct val="0"/>
+                </a:spcBef>
+                <a:spcAft>
+                  <a:spcPct val="0"/>
+                </a:spcAft>
+                <a:buClrTx/>
+                <a:buSzTx/>
+                <a:buFontTx/>
+                <a:buNone/>
+                <a:tabLst/>
+              </a:pPr>
+              <a:endParaRPr kumimoji="0" lang="fr-CH" sz="1800" b="0" i="0" u="sng" strike="noStrike" cap="none" normalizeH="0" baseline="0" smtClean="0">
+                <a:ln>
+                  <a:noFill/>
+                </a:ln>
+                <a:solidFill>
+                  <a:schemeClr val="tx1"/>
+                </a:solidFill>
+                <a:effectLst/>
+                <a:latin typeface="Arial" charset="0"/>
+              </a:endParaRPr>
+            </a:p>
+          </p:txBody>
+        </p:sp>
+        <p:sp>
+          <p:nvSpPr>
+            <p:cNvPr id="27" name="Flèche droite 26"/>
+            <p:cNvSpPr/>
+            <p:nvPr/>
+          </p:nvSpPr>
+          <p:spPr bwMode="auto">
+            <a:xfrm rot="10800000">
+              <a:off x="827584" y="2519227"/>
+              <a:ext cx="1116124" cy="251916"/>
+            </a:xfrm>
+            <a:prstGeom prst="rightArrow">
+              <a:avLst/>
+            </a:prstGeom>
+            <a:solidFill>
+              <a:schemeClr val="accent1"/>
+            </a:solidFill>
+            <a:ln w="9525" cap="flat" cmpd="sng" algn="ctr">
+              <a:solidFill>
+                <a:schemeClr val="tx1"/>
+              </a:solidFill>
+              <a:prstDash val="solid"/>
+              <a:round/>
+              <a:headEnd type="none" w="med" len="med"/>
+              <a:tailEnd type="none" w="med" len="med"/>
+            </a:ln>
+            <a:effectLst/>
+          </p:spPr>
+          <p:txBody>
+            <a:bodyPr vert="horz" wrap="square" lIns="91440" tIns="45720" rIns="91440" bIns="45720" numCol="1" rtlCol="0" anchor="t" anchorCtr="0" compatLnSpc="1">
+              <a:prstTxWarp prst="textNoShape">
+                <a:avLst/>
+              </a:prstTxWarp>
+            </a:bodyPr>
+            <a:lstStyle/>
+            <a:p>
+              <a:pPr marL="0" marR="0" indent="0" algn="l" defTabSz="914400" rtl="0" eaLnBrk="1" fontAlgn="base" latinLnBrk="0" hangingPunct="1">
+                <a:lnSpc>
+                  <a:spcPct val="100000"/>
+                </a:lnSpc>
+                <a:spcBef>
+                  <a:spcPct val="0"/>
+                </a:spcBef>
+                <a:spcAft>
+                  <a:spcPct val="0"/>
+                </a:spcAft>
+                <a:buClrTx/>
+                <a:buSzTx/>
+                <a:buFontTx/>
+                <a:buNone/>
+                <a:tabLst/>
+              </a:pPr>
+              <a:endParaRPr kumimoji="0" lang="fr-CH" sz="1800" b="0" i="0" u="sng" strike="noStrike" cap="none" normalizeH="0" baseline="0" smtClean="0">
+                <a:ln>
+                  <a:noFill/>
+                </a:ln>
+                <a:solidFill>
+                  <a:schemeClr val="tx1"/>
+                </a:solidFill>
+                <a:effectLst/>
+                <a:latin typeface="Arial" charset="0"/>
+              </a:endParaRPr>
+            </a:p>
+          </p:txBody>
+        </p:sp>
+      </p:grpSp>
+      <p:grpSp>
+        <p:nvGrpSpPr>
+          <p:cNvPr id="5" name="Groupe 27"/>
+          <p:cNvGrpSpPr/>
+          <p:nvPr/>
+        </p:nvGrpSpPr>
+        <p:grpSpPr>
+          <a:xfrm>
+            <a:off x="6012160" y="3609020"/>
+            <a:ext cx="1116124" cy="530275"/>
+            <a:chOff x="827584" y="2240868"/>
+            <a:chExt cx="1116124" cy="530275"/>
+          </a:xfrm>
+        </p:grpSpPr>
+        <p:sp>
+          <p:nvSpPr>
+            <p:cNvPr id="29" name="Flèche droite 28"/>
+            <p:cNvSpPr/>
+            <p:nvPr/>
+          </p:nvSpPr>
+          <p:spPr bwMode="auto">
+            <a:xfrm>
+              <a:off x="827584" y="2240868"/>
+              <a:ext cx="1116124" cy="251916"/>
+            </a:xfrm>
+            <a:prstGeom prst="rightArrow">
+              <a:avLst/>
+            </a:prstGeom>
+            <a:solidFill>
+              <a:schemeClr val="accent1"/>
+            </a:solidFill>
+            <a:ln w="9525" cap="flat" cmpd="sng" algn="ctr">
+              <a:solidFill>
+                <a:schemeClr val="tx1"/>
+              </a:solidFill>
+              <a:prstDash val="solid"/>
+              <a:round/>
+              <a:headEnd type="none" w="med" len="med"/>
+              <a:tailEnd type="none" w="med" len="med"/>
+            </a:ln>
+            <a:effectLst/>
+          </p:spPr>
+          <p:txBody>
+            <a:bodyPr vert="horz" wrap="square" lIns="91440" tIns="45720" rIns="91440" bIns="45720" numCol="1" rtlCol="0" anchor="t" anchorCtr="0" compatLnSpc="1">
+              <a:prstTxWarp prst="textNoShape">
+                <a:avLst/>
+              </a:prstTxWarp>
+            </a:bodyPr>
+            <a:lstStyle/>
+            <a:p>
+              <a:pPr marL="0" marR="0" indent="0" algn="l" defTabSz="914400" rtl="0" eaLnBrk="1" fontAlgn="base" latinLnBrk="0" hangingPunct="1">
+                <a:lnSpc>
+                  <a:spcPct val="100000"/>
+                </a:lnSpc>
+                <a:spcBef>
+                  <a:spcPct val="0"/>
+                </a:spcBef>
+                <a:spcAft>
+                  <a:spcPct val="0"/>
+                </a:spcAft>
+                <a:buClrTx/>
+                <a:buSzTx/>
+                <a:buFontTx/>
+                <a:buNone/>
+                <a:tabLst/>
+              </a:pPr>
+              <a:endParaRPr kumimoji="0" lang="fr-CH" sz="1800" b="0" i="0" u="sng" strike="noStrike" cap="none" normalizeH="0" baseline="0" smtClean="0">
+                <a:ln>
+                  <a:noFill/>
+                </a:ln>
+                <a:solidFill>
+                  <a:schemeClr val="tx1"/>
+                </a:solidFill>
+                <a:effectLst/>
+                <a:latin typeface="Arial" charset="0"/>
+              </a:endParaRPr>
+            </a:p>
+          </p:txBody>
+        </p:sp>
+        <p:sp>
+          <p:nvSpPr>
+            <p:cNvPr id="30" name="Flèche droite 29"/>
+            <p:cNvSpPr/>
+            <p:nvPr/>
+          </p:nvSpPr>
+          <p:spPr bwMode="auto">
+            <a:xfrm rot="10800000">
+              <a:off x="827584" y="2519227"/>
+              <a:ext cx="1116124" cy="251916"/>
+            </a:xfrm>
+            <a:prstGeom prst="rightArrow">
+              <a:avLst/>
+            </a:prstGeom>
+            <a:solidFill>
+              <a:schemeClr val="accent1"/>
+            </a:solidFill>
+            <a:ln w="9525" cap="flat" cmpd="sng" algn="ctr">
+              <a:solidFill>
+                <a:schemeClr val="tx1"/>
+              </a:solidFill>
+              <a:prstDash val="solid"/>
+              <a:round/>
+              <a:headEnd type="none" w="med" len="med"/>
+              <a:tailEnd type="none" w="med" len="med"/>
+            </a:ln>
+            <a:effectLst/>
+          </p:spPr>
+          <p:txBody>
+            <a:bodyPr vert="horz" wrap="square" lIns="91440" tIns="45720" rIns="91440" bIns="45720" numCol="1" rtlCol="0" anchor="t" anchorCtr="0" compatLnSpc="1">
+              <a:prstTxWarp prst="textNoShape">
+                <a:avLst/>
+              </a:prstTxWarp>
+            </a:bodyPr>
+            <a:lstStyle/>
+            <a:p>
+              <a:pPr marL="0" marR="0" indent="0" algn="l" defTabSz="914400" rtl="0" eaLnBrk="1" fontAlgn="base" latinLnBrk="0" hangingPunct="1">
+                <a:lnSpc>
+                  <a:spcPct val="100000"/>
+                </a:lnSpc>
+                <a:spcBef>
+                  <a:spcPct val="0"/>
+                </a:spcBef>
+                <a:spcAft>
+                  <a:spcPct val="0"/>
+                </a:spcAft>
+                <a:buClrTx/>
+                <a:buSzTx/>
+                <a:buFontTx/>
+                <a:buNone/>
+                <a:tabLst/>
+              </a:pPr>
+              <a:endParaRPr kumimoji="0" lang="fr-CH" sz="1800" b="0" i="0" u="sng" strike="noStrike" cap="none" normalizeH="0" baseline="0" smtClean="0">
+                <a:ln>
+                  <a:noFill/>
+                </a:ln>
+                <a:solidFill>
+                  <a:schemeClr val="tx1"/>
+                </a:solidFill>
+                <a:effectLst/>
+                <a:latin typeface="Arial" charset="0"/>
+              </a:endParaRPr>
+            </a:p>
+          </p:txBody>
+        </p:sp>
+      </p:grpSp>
+      <p:grpSp>
+        <p:nvGrpSpPr>
+          <p:cNvPr id="9" name="Groupe 30"/>
+          <p:cNvGrpSpPr/>
+          <p:nvPr/>
+        </p:nvGrpSpPr>
+        <p:grpSpPr>
+          <a:xfrm>
+            <a:off x="6012160" y="4473116"/>
+            <a:ext cx="1116124" cy="530275"/>
+            <a:chOff x="827584" y="2240868"/>
+            <a:chExt cx="1116124" cy="530275"/>
+          </a:xfrm>
+        </p:grpSpPr>
+        <p:sp>
+          <p:nvSpPr>
+            <p:cNvPr id="32" name="Flèche droite 31"/>
+            <p:cNvSpPr/>
+            <p:nvPr/>
+          </p:nvSpPr>
+          <p:spPr bwMode="auto">
+            <a:xfrm>
+              <a:off x="827584" y="2240868"/>
+              <a:ext cx="1116124" cy="251916"/>
+            </a:xfrm>
+            <a:prstGeom prst="rightArrow">
+              <a:avLst/>
+            </a:prstGeom>
+            <a:solidFill>
+              <a:schemeClr val="accent1"/>
+            </a:solidFill>
+            <a:ln w="9525" cap="flat" cmpd="sng" algn="ctr">
+              <a:solidFill>
+                <a:schemeClr val="tx1"/>
+              </a:solidFill>
+              <a:prstDash val="solid"/>
+              <a:round/>
+              <a:headEnd type="none" w="med" len="med"/>
+              <a:tailEnd type="none" w="med" len="med"/>
+            </a:ln>
+            <a:effectLst/>
+          </p:spPr>
+          <p:txBody>
+            <a:bodyPr vert="horz" wrap="square" lIns="91440" tIns="45720" rIns="91440" bIns="45720" numCol="1" rtlCol="0" anchor="t" anchorCtr="0" compatLnSpc="1">
+              <a:prstTxWarp prst="textNoShape">
+                <a:avLst/>
+              </a:prstTxWarp>
+            </a:bodyPr>
+            <a:lstStyle/>
+            <a:p>
+              <a:pPr marL="0" marR="0" indent="0" algn="l" defTabSz="914400" rtl="0" eaLnBrk="1" fontAlgn="base" latinLnBrk="0" hangingPunct="1">
+                <a:lnSpc>
+                  <a:spcPct val="100000"/>
+                </a:lnSpc>
+                <a:spcBef>
+                  <a:spcPct val="0"/>
+                </a:spcBef>
+                <a:spcAft>
+                  <a:spcPct val="0"/>
+                </a:spcAft>
+                <a:buClrTx/>
+                <a:buSzTx/>
+                <a:buFontTx/>
+                <a:buNone/>
+                <a:tabLst/>
+              </a:pPr>
+              <a:endParaRPr kumimoji="0" lang="fr-CH" sz="1800" b="0" i="0" u="sng" strike="noStrike" cap="none" normalizeH="0" baseline="0" smtClean="0">
+                <a:ln>
+                  <a:noFill/>
+                </a:ln>
+                <a:solidFill>
+                  <a:schemeClr val="tx1"/>
+                </a:solidFill>
+                <a:effectLst/>
+                <a:latin typeface="Arial" charset="0"/>
+              </a:endParaRPr>
+            </a:p>
+          </p:txBody>
+        </p:sp>
+        <p:sp>
+          <p:nvSpPr>
+            <p:cNvPr id="33" name="Flèche droite 32"/>
+            <p:cNvSpPr/>
+            <p:nvPr/>
+          </p:nvSpPr>
+          <p:spPr bwMode="auto">
+            <a:xfrm rot="10800000">
+              <a:off x="827584" y="2519227"/>
+              <a:ext cx="1116124" cy="251916"/>
+            </a:xfrm>
+            <a:prstGeom prst="rightArrow">
+              <a:avLst/>
+            </a:prstGeom>
+            <a:solidFill>
+              <a:schemeClr val="accent1"/>
+            </a:solidFill>
+            <a:ln w="9525" cap="flat" cmpd="sng" algn="ctr">
+              <a:solidFill>
+                <a:schemeClr val="tx1"/>
+              </a:solidFill>
+              <a:prstDash val="solid"/>
+              <a:round/>
+              <a:headEnd type="none" w="med" len="med"/>
+              <a:tailEnd type="none" w="med" len="med"/>
+            </a:ln>
+            <a:effectLst/>
+          </p:spPr>
+          <p:txBody>
+            <a:bodyPr vert="horz" wrap="square" lIns="91440" tIns="45720" rIns="91440" bIns="45720" numCol="1" rtlCol="0" anchor="t" anchorCtr="0" compatLnSpc="1">
+              <a:prstTxWarp prst="textNoShape">
+                <a:avLst/>
+              </a:prstTxWarp>
+            </a:bodyPr>
+            <a:lstStyle/>
+            <a:p>
+              <a:pPr marL="0" marR="0" indent="0" algn="l" defTabSz="914400" rtl="0" eaLnBrk="1" fontAlgn="base" latinLnBrk="0" hangingPunct="1">
+                <a:lnSpc>
+                  <a:spcPct val="100000"/>
+                </a:lnSpc>
+                <a:spcBef>
+                  <a:spcPct val="0"/>
+                </a:spcBef>
+                <a:spcAft>
+                  <a:spcPct val="0"/>
+                </a:spcAft>
+                <a:buClrTx/>
+                <a:buSzTx/>
+                <a:buFontTx/>
+                <a:buNone/>
+                <a:tabLst/>
+              </a:pPr>
+              <a:endParaRPr kumimoji="0" lang="fr-CH" sz="1800" b="0" i="0" u="sng" strike="noStrike" cap="none" normalizeH="0" baseline="0" smtClean="0">
+                <a:ln>
+                  <a:noFill/>
+                </a:ln>
+                <a:solidFill>
+                  <a:schemeClr val="tx1"/>
+                </a:solidFill>
+                <a:effectLst/>
+                <a:latin typeface="Arial" charset="0"/>
+              </a:endParaRPr>
+            </a:p>
+          </p:txBody>
+        </p:sp>
+      </p:grpSp>
+      <p:sp>
+        <p:nvSpPr>
+          <p:cNvPr id="37" name="Rectangle à coins arrondis 36"/>
+          <p:cNvSpPr/>
+          <p:nvPr/>
+        </p:nvSpPr>
+        <p:spPr bwMode="auto">
+          <a:xfrm>
+            <a:off x="2951820" y="3006625"/>
+            <a:ext cx="1393794" cy="773974"/>
+          </a:xfrm>
+          <a:prstGeom prst="roundRect">
+            <a:avLst/>
+          </a:prstGeom>
+          <a:solidFill>
+            <a:schemeClr val="accent1"/>
+          </a:solidFill>
+          <a:ln w="9525" cap="flat" cmpd="sng" algn="ctr">
+            <a:solidFill>
+              <a:schemeClr val="tx1"/>
+            </a:solidFill>
+            <a:prstDash val="solid"/>
+            <a:round/>
+            <a:headEnd type="none" w="med" len="med"/>
+            <a:tailEnd type="none" w="med" len="med"/>
+          </a:ln>
+          <a:effectLst/>
+        </p:spPr>
+        <p:txBody>
+          <a:bodyPr vert="horz" wrap="square" lIns="91440" tIns="45720" rIns="91440" bIns="45720" numCol="1" rtlCol="0" anchor="t" anchorCtr="0" compatLnSpc="1">
+            <a:prstTxWarp prst="textNoShape">
+              <a:avLst/>
+            </a:prstTxWarp>
+          </a:bodyPr>
+          <a:lstStyle/>
+          <a:p>
+            <a:pPr marL="0" marR="0" indent="0" algn="ctr" defTabSz="914400" rtl="0" eaLnBrk="1" fontAlgn="base" latinLnBrk="0" hangingPunct="1">
+              <a:lnSpc>
+                <a:spcPct val="100000"/>
+              </a:lnSpc>
+              <a:spcBef>
+                <a:spcPct val="0"/>
+              </a:spcBef>
+              <a:spcAft>
+                <a:spcPct val="0"/>
+              </a:spcAft>
+              <a:buClrTx/>
+              <a:buSzTx/>
+              <a:buFontTx/>
+              <a:buNone/>
+              <a:tabLst/>
+            </a:pPr>
+            <a:r>
+              <a:rPr kumimoji="0" lang="fr-CH" sz="1800" b="0" i="0" u="none" strike="noStrike" cap="none" normalizeH="0" baseline="0" dirty="0" smtClean="0">
+                <a:ln>
+                  <a:noFill/>
+                </a:ln>
+                <a:solidFill>
+                  <a:schemeClr val="tx1"/>
+                </a:solidFill>
+                <a:effectLst/>
+                <a:latin typeface="Arial" charset="0"/>
+              </a:rPr>
+              <a:t>Serveur</a:t>
+            </a:r>
+          </a:p>
+        </p:txBody>
+      </p:sp>
+      <p:sp>
+        <p:nvSpPr>
+          <p:cNvPr id="38" name="Flèche vers le bas 37"/>
+          <p:cNvSpPr/>
+          <p:nvPr/>
+        </p:nvSpPr>
+        <p:spPr bwMode="auto">
+          <a:xfrm>
+            <a:off x="2123728" y="2754709"/>
+            <a:ext cx="288032" cy="1106227"/>
+          </a:xfrm>
+          <a:prstGeom prst="downArrow">
+            <a:avLst/>
+          </a:prstGeom>
+          <a:solidFill>
+            <a:schemeClr val="accent1"/>
+          </a:solidFill>
+          <a:ln w="9525" cap="flat" cmpd="sng" algn="ctr">
+            <a:solidFill>
+              <a:schemeClr val="tx1"/>
+            </a:solidFill>
+            <a:prstDash val="solid"/>
+            <a:round/>
+            <a:headEnd type="none" w="med" len="med"/>
+            <a:tailEnd type="none" w="med" len="med"/>
+          </a:ln>
+          <a:effectLst/>
+        </p:spPr>
+        <p:txBody>
+          <a:bodyPr vert="horz" wrap="square" lIns="91440" tIns="45720" rIns="91440" bIns="45720" numCol="1" rtlCol="0" anchor="t" anchorCtr="0" compatLnSpc="1">
+            <a:prstTxWarp prst="textNoShape">
+              <a:avLst/>
+            </a:prstTxWarp>
+          </a:bodyPr>
+          <a:lstStyle/>
+          <a:p>
+            <a:pPr marL="0" marR="0" indent="0" algn="l" defTabSz="914400" rtl="0" eaLnBrk="1" fontAlgn="base" latinLnBrk="0" hangingPunct="1">
+              <a:lnSpc>
+                <a:spcPct val="100000"/>
+              </a:lnSpc>
+              <a:spcBef>
+                <a:spcPct val="0"/>
+              </a:spcBef>
+              <a:spcAft>
+                <a:spcPct val="0"/>
+              </a:spcAft>
+              <a:buClrTx/>
+              <a:buSzTx/>
+              <a:buFontTx/>
+              <a:buNone/>
+              <a:tabLst/>
+            </a:pPr>
+            <a:endParaRPr kumimoji="0" lang="fr-CH" sz="1800" b="0" i="0" u="sng" strike="noStrike" cap="none" normalizeH="0" baseline="0" smtClean="0">
+              <a:ln>
+                <a:noFill/>
+              </a:ln>
+              <a:solidFill>
+                <a:schemeClr val="tx1"/>
+              </a:solidFill>
+              <a:effectLst/>
+              <a:latin typeface="Arial" charset="0"/>
+            </a:endParaRPr>
+          </a:p>
+        </p:txBody>
+      </p:sp>
+      <p:sp>
+        <p:nvSpPr>
+          <p:cNvPr id="39" name="Flèche droite 38"/>
+          <p:cNvSpPr/>
+          <p:nvPr/>
+        </p:nvSpPr>
+        <p:spPr bwMode="auto">
+          <a:xfrm>
+            <a:off x="3239852" y="2060960"/>
+            <a:ext cx="2268252" cy="251916"/>
+          </a:xfrm>
+          <a:prstGeom prst="rightArrow">
+            <a:avLst/>
+          </a:prstGeom>
+          <a:solidFill>
+            <a:schemeClr val="accent1"/>
+          </a:solidFill>
+          <a:ln w="9525" cap="flat" cmpd="sng" algn="ctr">
+            <a:solidFill>
+              <a:schemeClr val="tx1"/>
+            </a:solidFill>
+            <a:prstDash val="solid"/>
+            <a:round/>
+            <a:headEnd type="none" w="med" len="med"/>
+            <a:tailEnd type="none" w="med" len="med"/>
+          </a:ln>
+          <a:effectLst/>
+        </p:spPr>
+        <p:txBody>
+          <a:bodyPr vert="horz" wrap="square" lIns="91440" tIns="45720" rIns="91440" bIns="45720" numCol="1" rtlCol="0" anchor="t" anchorCtr="0" compatLnSpc="1">
+            <a:prstTxWarp prst="textNoShape">
+              <a:avLst/>
+            </a:prstTxWarp>
+          </a:bodyPr>
+          <a:lstStyle/>
+          <a:p>
+            <a:pPr marL="0" marR="0" indent="0" algn="l" defTabSz="914400" rtl="0" eaLnBrk="1" fontAlgn="base" latinLnBrk="0" hangingPunct="1">
+              <a:lnSpc>
+                <a:spcPct val="100000"/>
+              </a:lnSpc>
+              <a:spcBef>
+                <a:spcPct val="0"/>
+              </a:spcBef>
+              <a:spcAft>
+                <a:spcPct val="0"/>
+              </a:spcAft>
+              <a:buClrTx/>
+              <a:buSzTx/>
+              <a:buFontTx/>
+              <a:buNone/>
+              <a:tabLst/>
+            </a:pPr>
+            <a:endParaRPr kumimoji="0" lang="fr-CH" sz="1800" b="0" i="0" u="sng" strike="noStrike" cap="none" normalizeH="0" baseline="0" smtClean="0">
+              <a:ln>
+                <a:noFill/>
+              </a:ln>
+              <a:solidFill>
+                <a:schemeClr val="tx1"/>
+              </a:solidFill>
+              <a:effectLst/>
+              <a:latin typeface="Arial" charset="0"/>
+            </a:endParaRPr>
+          </a:p>
+        </p:txBody>
+      </p:sp>
+      <p:grpSp>
+        <p:nvGrpSpPr>
+          <p:cNvPr id="12" name="Groupe 39"/>
+          <p:cNvGrpSpPr/>
+          <p:nvPr/>
+        </p:nvGrpSpPr>
+        <p:grpSpPr>
+          <a:xfrm>
+            <a:off x="4463988" y="3104964"/>
+            <a:ext cx="1116124" cy="530275"/>
+            <a:chOff x="827584" y="2240868"/>
+            <a:chExt cx="1116124" cy="530275"/>
+          </a:xfrm>
+        </p:grpSpPr>
+        <p:sp>
+          <p:nvSpPr>
+            <p:cNvPr id="41" name="Flèche droite 40"/>
+            <p:cNvSpPr/>
+            <p:nvPr/>
+          </p:nvSpPr>
+          <p:spPr bwMode="auto">
+            <a:xfrm>
+              <a:off x="827584" y="2240868"/>
+              <a:ext cx="1116124" cy="251916"/>
+            </a:xfrm>
+            <a:prstGeom prst="rightArrow">
+              <a:avLst/>
+            </a:prstGeom>
+            <a:solidFill>
+              <a:schemeClr val="accent1"/>
+            </a:solidFill>
+            <a:ln w="9525" cap="flat" cmpd="sng" algn="ctr">
+              <a:solidFill>
+                <a:schemeClr val="tx1"/>
+              </a:solidFill>
+              <a:prstDash val="solid"/>
+              <a:round/>
+              <a:headEnd type="none" w="med" len="med"/>
+              <a:tailEnd type="none" w="med" len="med"/>
+            </a:ln>
+            <a:effectLst/>
+          </p:spPr>
+          <p:txBody>
+            <a:bodyPr vert="horz" wrap="square" lIns="91440" tIns="45720" rIns="91440" bIns="45720" numCol="1" rtlCol="0" anchor="t" anchorCtr="0" compatLnSpc="1">
+              <a:prstTxWarp prst="textNoShape">
+                <a:avLst/>
+              </a:prstTxWarp>
+            </a:bodyPr>
+            <a:lstStyle/>
+            <a:p>
+              <a:pPr marL="0" marR="0" indent="0" algn="l" defTabSz="914400" rtl="0" eaLnBrk="1" fontAlgn="base" latinLnBrk="0" hangingPunct="1">
+                <a:lnSpc>
+                  <a:spcPct val="100000"/>
+                </a:lnSpc>
+                <a:spcBef>
+                  <a:spcPct val="0"/>
+                </a:spcBef>
+                <a:spcAft>
+                  <a:spcPct val="0"/>
+                </a:spcAft>
+                <a:buClrTx/>
+                <a:buSzTx/>
+                <a:buFontTx/>
+                <a:buNone/>
+                <a:tabLst/>
+              </a:pPr>
+              <a:endParaRPr kumimoji="0" lang="fr-CH" sz="1800" b="0" i="0" u="sng" strike="noStrike" cap="none" normalizeH="0" baseline="0" smtClean="0">
+                <a:ln>
+                  <a:noFill/>
+                </a:ln>
+                <a:solidFill>
+                  <a:schemeClr val="tx1"/>
+                </a:solidFill>
+                <a:effectLst/>
+                <a:latin typeface="Arial" charset="0"/>
+              </a:endParaRPr>
+            </a:p>
+          </p:txBody>
+        </p:sp>
+        <p:sp>
+          <p:nvSpPr>
+            <p:cNvPr id="42" name="Flèche droite 41"/>
+            <p:cNvSpPr/>
+            <p:nvPr/>
+          </p:nvSpPr>
+          <p:spPr bwMode="auto">
+            <a:xfrm rot="10800000">
+              <a:off x="827584" y="2519227"/>
+              <a:ext cx="1116124" cy="251916"/>
+            </a:xfrm>
+            <a:prstGeom prst="rightArrow">
+              <a:avLst/>
+            </a:prstGeom>
+            <a:solidFill>
+              <a:schemeClr val="accent1"/>
+            </a:solidFill>
+            <a:ln w="9525" cap="flat" cmpd="sng" algn="ctr">
+              <a:solidFill>
+                <a:schemeClr val="tx1"/>
+              </a:solidFill>
+              <a:prstDash val="solid"/>
+              <a:round/>
+              <a:headEnd type="none" w="med" len="med"/>
+              <a:tailEnd type="none" w="med" len="med"/>
+            </a:ln>
+            <a:effectLst/>
+          </p:spPr>
+          <p:txBody>
+            <a:bodyPr vert="horz" wrap="square" lIns="91440" tIns="45720" rIns="91440" bIns="45720" numCol="1" rtlCol="0" anchor="t" anchorCtr="0" compatLnSpc="1">
+              <a:prstTxWarp prst="textNoShape">
+                <a:avLst/>
+              </a:prstTxWarp>
+            </a:bodyPr>
+            <a:lstStyle/>
+            <a:p>
+              <a:pPr marL="0" marR="0" indent="0" algn="l" defTabSz="914400" rtl="0" eaLnBrk="1" fontAlgn="base" latinLnBrk="0" hangingPunct="1">
+                <a:lnSpc>
+                  <a:spcPct val="100000"/>
+                </a:lnSpc>
+                <a:spcBef>
+                  <a:spcPct val="0"/>
+                </a:spcBef>
+                <a:spcAft>
+                  <a:spcPct val="0"/>
+                </a:spcAft>
+                <a:buClrTx/>
+                <a:buSzTx/>
+                <a:buFontTx/>
+                <a:buNone/>
+                <a:tabLst/>
+              </a:pPr>
+              <a:endParaRPr kumimoji="0" lang="fr-CH" sz="1800" b="0" i="0" u="sng" strike="noStrike" cap="none" normalizeH="0" baseline="0" smtClean="0">
+                <a:ln>
+                  <a:noFill/>
+                </a:ln>
+                <a:solidFill>
+                  <a:schemeClr val="tx1"/>
+                </a:solidFill>
+                <a:effectLst/>
+                <a:latin typeface="Arial" charset="0"/>
+              </a:endParaRPr>
+            </a:p>
+          </p:txBody>
+        </p:sp>
+      </p:grpSp>
+      <p:sp>
+        <p:nvSpPr>
+          <p:cNvPr id="44" name="Flèche angle droit à deux pointes 43"/>
+          <p:cNvSpPr/>
+          <p:nvPr/>
+        </p:nvSpPr>
+        <p:spPr bwMode="auto">
+          <a:xfrm>
+            <a:off x="2951820" y="3860936"/>
+            <a:ext cx="936104" cy="918030"/>
+          </a:xfrm>
+          <a:prstGeom prst="leftUpArrow">
+            <a:avLst>
+              <a:gd name="adj1" fmla="val 8658"/>
+              <a:gd name="adj2" fmla="val 20097"/>
+              <a:gd name="adj3" fmla="val 25000"/>
+            </a:avLst>
+          </a:prstGeom>
+          <a:solidFill>
+            <a:schemeClr val="accent1"/>
+          </a:solidFill>
+          <a:ln w="9525" cap="flat" cmpd="sng" algn="ctr">
+            <a:solidFill>
+              <a:schemeClr val="tx1"/>
+            </a:solidFill>
+            <a:prstDash val="solid"/>
+            <a:round/>
+            <a:headEnd type="none" w="med" len="med"/>
+            <a:tailEnd type="none" w="med" len="med"/>
+          </a:ln>
+          <a:effectLst/>
+        </p:spPr>
+        <p:txBody>
+          <a:bodyPr vert="horz" wrap="square" lIns="91440" tIns="45720" rIns="91440" bIns="45720" numCol="1" rtlCol="0" anchor="t" anchorCtr="0" compatLnSpc="1">
+            <a:prstTxWarp prst="textNoShape">
+              <a:avLst/>
+            </a:prstTxWarp>
+          </a:bodyPr>
+          <a:lstStyle/>
+          <a:p>
+            <a:pPr marL="0" marR="0" indent="0" algn="l" defTabSz="914400" rtl="0" eaLnBrk="1" fontAlgn="base" latinLnBrk="0" hangingPunct="1">
+              <a:lnSpc>
+                <a:spcPct val="100000"/>
+              </a:lnSpc>
+              <a:spcBef>
+                <a:spcPct val="0"/>
+              </a:spcBef>
+              <a:spcAft>
+                <a:spcPct val="0"/>
+              </a:spcAft>
+              <a:buClrTx/>
+              <a:buSzTx/>
+              <a:buFontTx/>
+              <a:buNone/>
+              <a:tabLst/>
+            </a:pPr>
+            <a:endParaRPr kumimoji="0" lang="fr-CH" sz="1800" b="0" i="0" u="sng" strike="noStrike" cap="none" normalizeH="0" baseline="0" smtClean="0">
+              <a:ln>
+                <a:noFill/>
+              </a:ln>
+              <a:solidFill>
+                <a:schemeClr val="tx1"/>
+              </a:solidFill>
+              <a:effectLst/>
+              <a:latin typeface="Arial" charset="0"/>
+            </a:endParaRPr>
+          </a:p>
+        </p:txBody>
+      </p:sp>
+      <p:sp>
+        <p:nvSpPr>
+          <p:cNvPr id="45" name="ZoneTexte 44"/>
+          <p:cNvSpPr txBox="1"/>
+          <p:nvPr/>
+        </p:nvSpPr>
+        <p:spPr>
+          <a:xfrm>
+            <a:off x="4893275" y="5265204"/>
+            <a:ext cx="1838965" cy="369332"/>
+          </a:xfrm>
+          <a:prstGeom prst="rect">
+            <a:avLst/>
+          </a:prstGeom>
+          <a:noFill/>
+        </p:spPr>
+        <p:txBody>
+          <a:bodyPr wrap="none" rtlCol="0">
+            <a:spAutoFit/>
+          </a:bodyPr>
+          <a:lstStyle/>
+          <a:p>
+            <a:r>
+              <a:rPr lang="fr-CH" i="1" u="none" dirty="0" smtClean="0"/>
+              <a:t>Couche Réseau</a:t>
+            </a:r>
+            <a:endParaRPr lang="fr-CH" i="1" u="none" dirty="0"/>
           </a:p>
         </p:txBody>
       </p:sp>

</xml_diff>